<commit_message>
updated the presentation with minor language changes.
</commit_message>
<xml_diff>
--- a/Gov_templates/USB_whitelist.pptx
+++ b/Gov_templates/USB_whitelist.pptx
@@ -106,7 +106,27 @@
       </a:defRPr>
     </a:lvl9pPr>
   </p:defaultTextStyle>
+  <p:extLst>
+    <p:ext uri="{EFAFB233-063F-42B5-8137-9DF3F51BA10A}">
+      <p15:sldGuideLst xmlns:p15="http://schemas.microsoft.com/office/powerpoint/2012/main">
+        <p15:guide id="1" orient="horz" pos="2160">
+          <p15:clr>
+            <a:srgbClr val="A4A3A4"/>
+          </p15:clr>
+        </p15:guide>
+        <p15:guide id="2" pos="2880">
+          <p15:clr>
+            <a:srgbClr val="A4A3A4"/>
+          </p15:clr>
+        </p15:guide>
+      </p15:sldGuideLst>
+    </p:ext>
+  </p:extLst>
 </p:presentation>
+</file>
+
+<file path=ppt/revisionInfo.xml><?xml version="1.0" encoding="utf-8"?>
+<p1510:revInfo xmlns:a="http://schemas.openxmlformats.org/drawingml/2006/main" xmlns:r="http://schemas.openxmlformats.org/officeDocument/2006/relationships" xmlns:p1510="http://schemas.microsoft.com/office/powerpoint/2015/10/main"/>
 </file>
 
 <file path=ppt/slideLayouts/slideLayout1.xml><?xml version="1.0" encoding="utf-8"?>
@@ -147,10 +167,9 @@
           <a:lstStyle/>
           <a:p>
             <a:r>
-              <a:rPr lang="en-US" smtClean="0"/>
+              <a:rPr lang="en-US"/>
               <a:t>Click to edit Master title style</a:t>
             </a:r>
-            <a:endParaRPr lang="en-US"/>
           </a:p>
         </p:txBody>
       </p:sp>
@@ -266,10 +285,9 @@
           </a:lstStyle>
           <a:p>
             <a:r>
-              <a:rPr lang="en-US" smtClean="0"/>
+              <a:rPr lang="en-US"/>
               <a:t>Click to edit Master subtitle style</a:t>
             </a:r>
-            <a:endParaRPr lang="en-US"/>
           </a:p>
         </p:txBody>
       </p:sp>
@@ -291,7 +309,7 @@
             <a:fld id="{1D8BD707-D9CF-40AE-B4C6-C98DA3205C09}" type="datetimeFigureOut">
               <a:rPr lang="en-US" smtClean="0"/>
               <a:pPr/>
-              <a:t>12/15/2017</a:t>
+              <a:t>12/16/2017</a:t>
             </a:fld>
             <a:endParaRPr lang="en-US"/>
           </a:p>
@@ -381,10 +399,9 @@
           <a:lstStyle/>
           <a:p>
             <a:r>
-              <a:rPr lang="en-US" smtClean="0"/>
+              <a:rPr lang="en-US"/>
               <a:t>Click to edit Master title style</a:t>
             </a:r>
-            <a:endParaRPr lang="en-US"/>
           </a:p>
         </p:txBody>
       </p:sp>
@@ -405,38 +422,37 @@
           <a:p>
             <a:pPr lvl="0"/>
             <a:r>
-              <a:rPr lang="en-US" smtClean="0"/>
+              <a:rPr lang="en-US"/>
               <a:t>Click to edit Master text styles</a:t>
             </a:r>
           </a:p>
           <a:p>
             <a:pPr lvl="1"/>
             <a:r>
-              <a:rPr lang="en-US" smtClean="0"/>
+              <a:rPr lang="en-US"/>
               <a:t>Second level</a:t>
             </a:r>
           </a:p>
           <a:p>
             <a:pPr lvl="2"/>
             <a:r>
-              <a:rPr lang="en-US" smtClean="0"/>
+              <a:rPr lang="en-US"/>
               <a:t>Third level</a:t>
             </a:r>
           </a:p>
           <a:p>
             <a:pPr lvl="3"/>
             <a:r>
-              <a:rPr lang="en-US" smtClean="0"/>
+              <a:rPr lang="en-US"/>
               <a:t>Fourth level</a:t>
             </a:r>
           </a:p>
           <a:p>
             <a:pPr lvl="4"/>
             <a:r>
-              <a:rPr lang="en-US" smtClean="0"/>
+              <a:rPr lang="en-US"/>
               <a:t>Fifth level</a:t>
             </a:r>
-            <a:endParaRPr lang="en-US"/>
           </a:p>
         </p:txBody>
       </p:sp>
@@ -458,7 +474,7 @@
             <a:fld id="{1D8BD707-D9CF-40AE-B4C6-C98DA3205C09}" type="datetimeFigureOut">
               <a:rPr lang="en-US" smtClean="0"/>
               <a:pPr/>
-              <a:t>12/15/2017</a:t>
+              <a:t>12/16/2017</a:t>
             </a:fld>
             <a:endParaRPr lang="en-US"/>
           </a:p>
@@ -553,10 +569,9 @@
           <a:lstStyle/>
           <a:p>
             <a:r>
-              <a:rPr lang="en-US" smtClean="0"/>
+              <a:rPr lang="en-US"/>
               <a:t>Click to edit Master title style</a:t>
             </a:r>
-            <a:endParaRPr lang="en-US"/>
           </a:p>
         </p:txBody>
       </p:sp>
@@ -582,38 +597,37 @@
           <a:p>
             <a:pPr lvl="0"/>
             <a:r>
-              <a:rPr lang="en-US" smtClean="0"/>
+              <a:rPr lang="en-US"/>
               <a:t>Click to edit Master text styles</a:t>
             </a:r>
           </a:p>
           <a:p>
             <a:pPr lvl="1"/>
             <a:r>
-              <a:rPr lang="en-US" smtClean="0"/>
+              <a:rPr lang="en-US"/>
               <a:t>Second level</a:t>
             </a:r>
           </a:p>
           <a:p>
             <a:pPr lvl="2"/>
             <a:r>
-              <a:rPr lang="en-US" smtClean="0"/>
+              <a:rPr lang="en-US"/>
               <a:t>Third level</a:t>
             </a:r>
           </a:p>
           <a:p>
             <a:pPr lvl="3"/>
             <a:r>
-              <a:rPr lang="en-US" smtClean="0"/>
+              <a:rPr lang="en-US"/>
               <a:t>Fourth level</a:t>
             </a:r>
           </a:p>
           <a:p>
             <a:pPr lvl="4"/>
             <a:r>
-              <a:rPr lang="en-US" smtClean="0"/>
+              <a:rPr lang="en-US"/>
               <a:t>Fifth level</a:t>
             </a:r>
-            <a:endParaRPr lang="en-US"/>
           </a:p>
         </p:txBody>
       </p:sp>
@@ -635,7 +649,7 @@
             <a:fld id="{1D8BD707-D9CF-40AE-B4C6-C98DA3205C09}" type="datetimeFigureOut">
               <a:rPr lang="en-US" smtClean="0"/>
               <a:pPr/>
-              <a:t>12/15/2017</a:t>
+              <a:t>12/16/2017</a:t>
             </a:fld>
             <a:endParaRPr lang="en-US"/>
           </a:p>
@@ -725,10 +739,9 @@
           <a:lstStyle/>
           <a:p>
             <a:r>
-              <a:rPr lang="en-US" smtClean="0"/>
+              <a:rPr lang="en-US"/>
               <a:t>Click to edit Master title style</a:t>
             </a:r>
-            <a:endParaRPr lang="en-US"/>
           </a:p>
         </p:txBody>
       </p:sp>
@@ -749,38 +762,37 @@
           <a:p>
             <a:pPr lvl="0"/>
             <a:r>
-              <a:rPr lang="en-US" smtClean="0"/>
+              <a:rPr lang="en-US"/>
               <a:t>Click to edit Master text styles</a:t>
             </a:r>
           </a:p>
           <a:p>
             <a:pPr lvl="1"/>
             <a:r>
-              <a:rPr lang="en-US" smtClean="0"/>
+              <a:rPr lang="en-US"/>
               <a:t>Second level</a:t>
             </a:r>
           </a:p>
           <a:p>
             <a:pPr lvl="2"/>
             <a:r>
-              <a:rPr lang="en-US" smtClean="0"/>
+              <a:rPr lang="en-US"/>
               <a:t>Third level</a:t>
             </a:r>
           </a:p>
           <a:p>
             <a:pPr lvl="3"/>
             <a:r>
-              <a:rPr lang="en-US" smtClean="0"/>
+              <a:rPr lang="en-US"/>
               <a:t>Fourth level</a:t>
             </a:r>
           </a:p>
           <a:p>
             <a:pPr lvl="4"/>
             <a:r>
-              <a:rPr lang="en-US" smtClean="0"/>
+              <a:rPr lang="en-US"/>
               <a:t>Fifth level</a:t>
             </a:r>
-            <a:endParaRPr lang="en-US"/>
           </a:p>
         </p:txBody>
       </p:sp>
@@ -802,7 +814,7 @@
             <a:fld id="{1D8BD707-D9CF-40AE-B4C6-C98DA3205C09}" type="datetimeFigureOut">
               <a:rPr lang="en-US" smtClean="0"/>
               <a:pPr/>
-              <a:t>12/15/2017</a:t>
+              <a:t>12/16/2017</a:t>
             </a:fld>
             <a:endParaRPr lang="en-US"/>
           </a:p>
@@ -901,10 +913,9 @@
           </a:lstStyle>
           <a:p>
             <a:r>
-              <a:rPr lang="en-US" smtClean="0"/>
+              <a:rPr lang="en-US"/>
               <a:t>Click to edit Master title style</a:t>
             </a:r>
-            <a:endParaRPr lang="en-US"/>
           </a:p>
         </p:txBody>
       </p:sp>
@@ -1021,7 +1032,7 @@
           <a:p>
             <a:pPr lvl="0"/>
             <a:r>
-              <a:rPr lang="en-US" smtClean="0"/>
+              <a:rPr lang="en-US"/>
               <a:t>Click to edit Master text styles</a:t>
             </a:r>
           </a:p>
@@ -1045,7 +1056,7 @@
             <a:fld id="{1D8BD707-D9CF-40AE-B4C6-C98DA3205C09}" type="datetimeFigureOut">
               <a:rPr lang="en-US" smtClean="0"/>
               <a:pPr/>
-              <a:t>12/15/2017</a:t>
+              <a:t>12/16/2017</a:t>
             </a:fld>
             <a:endParaRPr lang="en-US"/>
           </a:p>
@@ -1135,10 +1146,9 @@
           <a:lstStyle/>
           <a:p>
             <a:r>
-              <a:rPr lang="en-US" smtClean="0"/>
+              <a:rPr lang="en-US"/>
               <a:t>Click to edit Master title style</a:t>
             </a:r>
-            <a:endParaRPr lang="en-US"/>
           </a:p>
         </p:txBody>
       </p:sp>
@@ -1192,38 +1202,37 @@
           <a:p>
             <a:pPr lvl="0"/>
             <a:r>
-              <a:rPr lang="en-US" smtClean="0"/>
+              <a:rPr lang="en-US"/>
               <a:t>Click to edit Master text styles</a:t>
             </a:r>
           </a:p>
           <a:p>
             <a:pPr lvl="1"/>
             <a:r>
-              <a:rPr lang="en-US" smtClean="0"/>
+              <a:rPr lang="en-US"/>
               <a:t>Second level</a:t>
             </a:r>
           </a:p>
           <a:p>
             <a:pPr lvl="2"/>
             <a:r>
-              <a:rPr lang="en-US" smtClean="0"/>
+              <a:rPr lang="en-US"/>
               <a:t>Third level</a:t>
             </a:r>
           </a:p>
           <a:p>
             <a:pPr lvl="3"/>
             <a:r>
-              <a:rPr lang="en-US" smtClean="0"/>
+              <a:rPr lang="en-US"/>
               <a:t>Fourth level</a:t>
             </a:r>
           </a:p>
           <a:p>
             <a:pPr lvl="4"/>
             <a:r>
-              <a:rPr lang="en-US" smtClean="0"/>
+              <a:rPr lang="en-US"/>
               <a:t>Fifth level</a:t>
             </a:r>
-            <a:endParaRPr lang="en-US"/>
           </a:p>
         </p:txBody>
       </p:sp>
@@ -1277,38 +1286,37 @@
           <a:p>
             <a:pPr lvl="0"/>
             <a:r>
-              <a:rPr lang="en-US" smtClean="0"/>
+              <a:rPr lang="en-US"/>
               <a:t>Click to edit Master text styles</a:t>
             </a:r>
           </a:p>
           <a:p>
             <a:pPr lvl="1"/>
             <a:r>
-              <a:rPr lang="en-US" smtClean="0"/>
+              <a:rPr lang="en-US"/>
               <a:t>Second level</a:t>
             </a:r>
           </a:p>
           <a:p>
             <a:pPr lvl="2"/>
             <a:r>
-              <a:rPr lang="en-US" smtClean="0"/>
+              <a:rPr lang="en-US"/>
               <a:t>Third level</a:t>
             </a:r>
           </a:p>
           <a:p>
             <a:pPr lvl="3"/>
             <a:r>
-              <a:rPr lang="en-US" smtClean="0"/>
+              <a:rPr lang="en-US"/>
               <a:t>Fourth level</a:t>
             </a:r>
           </a:p>
           <a:p>
             <a:pPr lvl="4"/>
             <a:r>
-              <a:rPr lang="en-US" smtClean="0"/>
+              <a:rPr lang="en-US"/>
               <a:t>Fifth level</a:t>
             </a:r>
-            <a:endParaRPr lang="en-US"/>
           </a:p>
         </p:txBody>
       </p:sp>
@@ -1330,7 +1338,7 @@
             <a:fld id="{1D8BD707-D9CF-40AE-B4C6-C98DA3205C09}" type="datetimeFigureOut">
               <a:rPr lang="en-US" smtClean="0"/>
               <a:pPr/>
-              <a:t>12/15/2017</a:t>
+              <a:t>12/16/2017</a:t>
             </a:fld>
             <a:endParaRPr lang="en-US"/>
           </a:p>
@@ -1424,10 +1432,9 @@
           </a:lstStyle>
           <a:p>
             <a:r>
-              <a:rPr lang="en-US" smtClean="0"/>
+              <a:rPr lang="en-US"/>
               <a:t>Click to edit Master title style</a:t>
             </a:r>
-            <a:endParaRPr lang="en-US"/>
           </a:p>
         </p:txBody>
       </p:sp>
@@ -1490,7 +1497,7 @@
           <a:p>
             <a:pPr lvl="0"/>
             <a:r>
-              <a:rPr lang="en-US" smtClean="0"/>
+              <a:rPr lang="en-US"/>
               <a:t>Click to edit Master text styles</a:t>
             </a:r>
           </a:p>
@@ -1546,38 +1553,37 @@
           <a:p>
             <a:pPr lvl="0"/>
             <a:r>
-              <a:rPr lang="en-US" smtClean="0"/>
+              <a:rPr lang="en-US"/>
               <a:t>Click to edit Master text styles</a:t>
             </a:r>
           </a:p>
           <a:p>
             <a:pPr lvl="1"/>
             <a:r>
-              <a:rPr lang="en-US" smtClean="0"/>
+              <a:rPr lang="en-US"/>
               <a:t>Second level</a:t>
             </a:r>
           </a:p>
           <a:p>
             <a:pPr lvl="2"/>
             <a:r>
-              <a:rPr lang="en-US" smtClean="0"/>
+              <a:rPr lang="en-US"/>
               <a:t>Third level</a:t>
             </a:r>
           </a:p>
           <a:p>
             <a:pPr lvl="3"/>
             <a:r>
-              <a:rPr lang="en-US" smtClean="0"/>
+              <a:rPr lang="en-US"/>
               <a:t>Fourth level</a:t>
             </a:r>
           </a:p>
           <a:p>
             <a:pPr lvl="4"/>
             <a:r>
-              <a:rPr lang="en-US" smtClean="0"/>
+              <a:rPr lang="en-US"/>
               <a:t>Fifth level</a:t>
             </a:r>
-            <a:endParaRPr lang="en-US"/>
           </a:p>
         </p:txBody>
       </p:sp>
@@ -1640,7 +1646,7 @@
           <a:p>
             <a:pPr lvl="0"/>
             <a:r>
-              <a:rPr lang="en-US" smtClean="0"/>
+              <a:rPr lang="en-US"/>
               <a:t>Click to edit Master text styles</a:t>
             </a:r>
           </a:p>
@@ -1696,38 +1702,37 @@
           <a:p>
             <a:pPr lvl="0"/>
             <a:r>
-              <a:rPr lang="en-US" smtClean="0"/>
+              <a:rPr lang="en-US"/>
               <a:t>Click to edit Master text styles</a:t>
             </a:r>
           </a:p>
           <a:p>
             <a:pPr lvl="1"/>
             <a:r>
-              <a:rPr lang="en-US" smtClean="0"/>
+              <a:rPr lang="en-US"/>
               <a:t>Second level</a:t>
             </a:r>
           </a:p>
           <a:p>
             <a:pPr lvl="2"/>
             <a:r>
-              <a:rPr lang="en-US" smtClean="0"/>
+              <a:rPr lang="en-US"/>
               <a:t>Third level</a:t>
             </a:r>
           </a:p>
           <a:p>
             <a:pPr lvl="3"/>
             <a:r>
-              <a:rPr lang="en-US" smtClean="0"/>
+              <a:rPr lang="en-US"/>
               <a:t>Fourth level</a:t>
             </a:r>
           </a:p>
           <a:p>
             <a:pPr lvl="4"/>
             <a:r>
-              <a:rPr lang="en-US" smtClean="0"/>
+              <a:rPr lang="en-US"/>
               <a:t>Fifth level</a:t>
             </a:r>
-            <a:endParaRPr lang="en-US"/>
           </a:p>
         </p:txBody>
       </p:sp>
@@ -1749,7 +1754,7 @@
             <a:fld id="{1D8BD707-D9CF-40AE-B4C6-C98DA3205C09}" type="datetimeFigureOut">
               <a:rPr lang="en-US" smtClean="0"/>
               <a:pPr/>
-              <a:t>12/15/2017</a:t>
+              <a:t>12/16/2017</a:t>
             </a:fld>
             <a:endParaRPr lang="en-US"/>
           </a:p>
@@ -1839,10 +1844,9 @@
           <a:lstStyle/>
           <a:p>
             <a:r>
-              <a:rPr lang="en-US" smtClean="0"/>
+              <a:rPr lang="en-US"/>
               <a:t>Click to edit Master title style</a:t>
             </a:r>
-            <a:endParaRPr lang="en-US"/>
           </a:p>
         </p:txBody>
       </p:sp>
@@ -1864,7 +1868,7 @@
             <a:fld id="{1D8BD707-D9CF-40AE-B4C6-C98DA3205C09}" type="datetimeFigureOut">
               <a:rPr lang="en-US" smtClean="0"/>
               <a:pPr/>
-              <a:t>12/15/2017</a:t>
+              <a:t>12/16/2017</a:t>
             </a:fld>
             <a:endParaRPr lang="en-US"/>
           </a:p>
@@ -1956,7 +1960,7 @@
             <a:fld id="{1D8BD707-D9CF-40AE-B4C6-C98DA3205C09}" type="datetimeFigureOut">
               <a:rPr lang="en-US" smtClean="0"/>
               <a:pPr/>
-              <a:t>12/15/2017</a:t>
+              <a:t>12/16/2017</a:t>
             </a:fld>
             <a:endParaRPr lang="en-US"/>
           </a:p>
@@ -2055,10 +2059,9 @@
           </a:lstStyle>
           <a:p>
             <a:r>
-              <a:rPr lang="en-US" smtClean="0"/>
+              <a:rPr lang="en-US"/>
               <a:t>Click to edit Master title style</a:t>
             </a:r>
-            <a:endParaRPr lang="en-US"/>
           </a:p>
         </p:txBody>
       </p:sp>
@@ -2112,38 +2115,37 @@
           <a:p>
             <a:pPr lvl="0"/>
             <a:r>
-              <a:rPr lang="en-US" smtClean="0"/>
+              <a:rPr lang="en-US"/>
               <a:t>Click to edit Master text styles</a:t>
             </a:r>
           </a:p>
           <a:p>
             <a:pPr lvl="1"/>
             <a:r>
-              <a:rPr lang="en-US" smtClean="0"/>
+              <a:rPr lang="en-US"/>
               <a:t>Second level</a:t>
             </a:r>
           </a:p>
           <a:p>
             <a:pPr lvl="2"/>
             <a:r>
-              <a:rPr lang="en-US" smtClean="0"/>
+              <a:rPr lang="en-US"/>
               <a:t>Third level</a:t>
             </a:r>
           </a:p>
           <a:p>
             <a:pPr lvl="3"/>
             <a:r>
-              <a:rPr lang="en-US" smtClean="0"/>
+              <a:rPr lang="en-US"/>
               <a:t>Fourth level</a:t>
             </a:r>
           </a:p>
           <a:p>
             <a:pPr lvl="4"/>
             <a:r>
-              <a:rPr lang="en-US" smtClean="0"/>
+              <a:rPr lang="en-US"/>
               <a:t>Fifth level</a:t>
             </a:r>
-            <a:endParaRPr lang="en-US"/>
           </a:p>
         </p:txBody>
       </p:sp>
@@ -2206,7 +2208,7 @@
           <a:p>
             <a:pPr lvl="0"/>
             <a:r>
-              <a:rPr lang="en-US" smtClean="0"/>
+              <a:rPr lang="en-US"/>
               <a:t>Click to edit Master text styles</a:t>
             </a:r>
           </a:p>
@@ -2230,7 +2232,7 @@
             <a:fld id="{1D8BD707-D9CF-40AE-B4C6-C98DA3205C09}" type="datetimeFigureOut">
               <a:rPr lang="en-US" smtClean="0"/>
               <a:pPr/>
-              <a:t>12/15/2017</a:t>
+              <a:t>12/16/2017</a:t>
             </a:fld>
             <a:endParaRPr lang="en-US"/>
           </a:p>
@@ -2329,10 +2331,9 @@
           </a:lstStyle>
           <a:p>
             <a:r>
-              <a:rPr lang="en-US" smtClean="0"/>
+              <a:rPr lang="en-US"/>
               <a:t>Click to edit Master title style</a:t>
             </a:r>
-            <a:endParaRPr lang="en-US"/>
           </a:p>
         </p:txBody>
       </p:sp>
@@ -2456,7 +2457,7 @@
           <a:p>
             <a:pPr lvl="0"/>
             <a:r>
-              <a:rPr lang="en-US" smtClean="0"/>
+              <a:rPr lang="en-US"/>
               <a:t>Click to edit Master text styles</a:t>
             </a:r>
           </a:p>
@@ -2480,7 +2481,7 @@
             <a:fld id="{1D8BD707-D9CF-40AE-B4C6-C98DA3205C09}" type="datetimeFigureOut">
               <a:rPr lang="en-US" smtClean="0"/>
               <a:pPr/>
-              <a:t>12/15/2017</a:t>
+              <a:t>12/16/2017</a:t>
             </a:fld>
             <a:endParaRPr lang="en-US"/>
           </a:p>
@@ -2585,10 +2586,9 @@
           <a:lstStyle/>
           <a:p>
             <a:r>
-              <a:rPr lang="en-US" smtClean="0"/>
+              <a:rPr lang="en-US"/>
               <a:t>Click to edit Master title style</a:t>
             </a:r>
-            <a:endParaRPr lang="en-US"/>
           </a:p>
         </p:txBody>
       </p:sp>
@@ -2619,38 +2619,37 @@
           <a:p>
             <a:pPr lvl="0"/>
             <a:r>
-              <a:rPr lang="en-US" smtClean="0"/>
+              <a:rPr lang="en-US"/>
               <a:t>Click to edit Master text styles</a:t>
             </a:r>
           </a:p>
           <a:p>
             <a:pPr lvl="1"/>
             <a:r>
-              <a:rPr lang="en-US" smtClean="0"/>
+              <a:rPr lang="en-US"/>
               <a:t>Second level</a:t>
             </a:r>
           </a:p>
           <a:p>
             <a:pPr lvl="2"/>
             <a:r>
-              <a:rPr lang="en-US" smtClean="0"/>
+              <a:rPr lang="en-US"/>
               <a:t>Third level</a:t>
             </a:r>
           </a:p>
           <a:p>
             <a:pPr lvl="3"/>
             <a:r>
-              <a:rPr lang="en-US" smtClean="0"/>
+              <a:rPr lang="en-US"/>
               <a:t>Fourth level</a:t>
             </a:r>
           </a:p>
           <a:p>
             <a:pPr lvl="4"/>
             <a:r>
-              <a:rPr lang="en-US" smtClean="0"/>
+              <a:rPr lang="en-US"/>
               <a:t>Fifth level</a:t>
             </a:r>
-            <a:endParaRPr lang="en-US"/>
           </a:p>
         </p:txBody>
       </p:sp>
@@ -2690,7 +2689,7 @@
             <a:fld id="{1D8BD707-D9CF-40AE-B4C6-C98DA3205C09}" type="datetimeFigureOut">
               <a:rPr lang="en-US" smtClean="0"/>
               <a:pPr/>
-              <a:t>12/15/2017</a:t>
+              <a:t>12/16/2017</a:t>
             </a:fld>
             <a:endParaRPr lang="en-US"/>
           </a:p>
@@ -3084,7 +3083,7 @@
           <a:lstStyle/>
           <a:p>
             <a:r>
-              <a:rPr lang="en-IN" sz="2000" b="1" dirty="0" smtClean="0">
+              <a:rPr lang="en-IN" sz="2000" b="1" dirty="0">
                 <a:latin typeface="+mn-lt"/>
               </a:rPr>
               <a:t>SMART INDIA HACKATHON ‘18</a:t>
@@ -3121,11 +3120,11 @@
               <a:buNone/>
             </a:pPr>
             <a:r>
-              <a:rPr lang="en-IN" sz="1600" b="1" dirty="0" smtClean="0"/>
+              <a:rPr lang="en-IN" sz="1600" b="1" dirty="0"/>
               <a:t>Ministry Category</a:t>
             </a:r>
             <a:r>
-              <a:rPr lang="en-IN" sz="1600" dirty="0" smtClean="0"/>
+              <a:rPr lang="en-IN" sz="1600" dirty="0"/>
               <a:t>: Ministry of Defence</a:t>
             </a:r>
           </a:p>
@@ -3134,79 +3133,65 @@
               <a:buNone/>
             </a:pPr>
             <a:r>
-              <a:rPr lang="en-IN" sz="1600" b="1" dirty="0" smtClean="0"/>
+              <a:rPr lang="en-IN" sz="1600" b="1" dirty="0"/>
               <a:t>Problem Statement</a:t>
             </a:r>
             <a:r>
-              <a:rPr lang="en-IN" sz="1600" dirty="0" smtClean="0"/>
-              <a:t>: Prototype/application for whitelisting of USB devices in OFB which can be subsequently used on internet as well as on intranet</a:t>
-            </a:r>
-            <a:r>
-              <a:rPr lang="en-IN" sz="1600" dirty="0" smtClean="0"/>
-              <a:t>				</a:t>
-            </a:r>
-            <a:endParaRPr lang="en-IN" sz="1600" dirty="0" smtClean="0"/>
+              <a:rPr lang="en-IN" sz="1600" dirty="0"/>
+              <a:t>: Prototype/application for whitelisting of USB devices in OFB which can be subsequently used on internet as well as on intranet				</a:t>
+            </a:r>
           </a:p>
           <a:p>
             <a:pPr marL="0" indent="0">
               <a:buNone/>
             </a:pPr>
             <a:r>
-              <a:rPr lang="en-IN" sz="1600" b="1" dirty="0" smtClean="0"/>
-              <a:t>Problem </a:t>
-            </a:r>
-            <a:r>
-              <a:rPr lang="en-IN" sz="1600" b="1" dirty="0" smtClean="0"/>
-              <a:t>Code</a:t>
-            </a:r>
-            <a:r>
-              <a:rPr lang="en-IN" sz="1600" dirty="0" smtClean="0"/>
+              <a:rPr lang="en-IN" sz="1600" b="1" dirty="0"/>
+              <a:t>Problem Code</a:t>
+            </a:r>
+            <a:r>
+              <a:rPr lang="en-IN" sz="1600" dirty="0"/>
               <a:t>:				</a:t>
             </a:r>
             <a:r>
-              <a:rPr lang="en-IN" sz="1600" b="1" dirty="0" smtClean="0"/>
+              <a:rPr lang="en-IN" sz="1600" b="1" dirty="0"/>
               <a:t>Team Name: </a:t>
             </a:r>
-            <a:endParaRPr lang="en-IN" sz="1600" b="1" dirty="0" smtClean="0"/>
           </a:p>
           <a:p>
             <a:pPr marL="0" indent="0">
               <a:buNone/>
             </a:pPr>
             <a:r>
-              <a:rPr lang="en-IN" sz="1600" b="1" dirty="0" smtClean="0"/>
+              <a:rPr lang="en-IN" sz="1600" b="1" dirty="0"/>
               <a:t>Team Leader Name</a:t>
             </a:r>
             <a:r>
-              <a:rPr lang="en-IN" sz="1600" dirty="0" smtClean="0"/>
+              <a:rPr lang="en-IN" sz="1600" dirty="0"/>
               <a:t>: </a:t>
             </a:r>
             <a:r>
-              <a:rPr lang="en-IN" sz="1600" dirty="0" err="1" smtClean="0"/>
+              <a:rPr lang="en-IN" sz="1600" dirty="0" err="1"/>
               <a:t>Akshata</a:t>
             </a:r>
             <a:r>
-              <a:rPr lang="en-IN" sz="1600" dirty="0" smtClean="0"/>
+              <a:rPr lang="en-IN" sz="1600" dirty="0"/>
               <a:t> </a:t>
             </a:r>
             <a:r>
-              <a:rPr lang="en-IN" sz="1600" dirty="0" err="1" smtClean="0"/>
+              <a:rPr lang="en-IN" sz="1600" dirty="0" err="1"/>
               <a:t>Jahagirdar</a:t>
             </a:r>
             <a:r>
               <a:rPr lang="en-IN" sz="1600" dirty="0"/>
-              <a:t>	</a:t>
-            </a:r>
-            <a:r>
-              <a:rPr lang="en-IN" sz="1600" dirty="0" smtClean="0"/>
-              <a:t>	</a:t>
-            </a:r>
-            <a:r>
-              <a:rPr lang="en-IN" sz="1600" b="1" dirty="0" smtClean="0"/>
+              <a:t>		</a:t>
+            </a:r>
+            <a:r>
+              <a:rPr lang="en-IN" sz="1600" b="1" dirty="0"/>
               <a:t>College Code</a:t>
             </a:r>
             <a:r>
-              <a:rPr lang="en-IN" sz="1600" dirty="0" smtClean="0"/>
+              <a:rPr lang="en-IN" sz="1600" dirty="0"/>
               <a:t>:</a:t>
             </a:r>
             <a:endParaRPr lang="en-US" sz="1600" dirty="0"/>
@@ -3237,7 +3222,7 @@
           <a:p>
             <a:pPr algn="ctr"/>
             <a:r>
-              <a:rPr lang="en-IN" sz="2000" b="1" dirty="0" smtClean="0"/>
+              <a:rPr lang="en-IN" sz="2000" b="1" dirty="0"/>
               <a:t>IDEA / SOLUTION / PROTOTYPE</a:t>
             </a:r>
             <a:endParaRPr lang="en-US" sz="2000" b="1" dirty="0"/>
@@ -3253,7 +3238,7 @@
         <p:spPr>
           <a:xfrm>
             <a:off x="215900" y="2438400"/>
-            <a:ext cx="8686800" cy="3970318"/>
+            <a:ext cx="8686800" cy="4247317"/>
           </a:xfrm>
           <a:prstGeom prst="rect">
             <a:avLst/>
@@ -3281,7 +3266,15 @@
             </a:pPr>
             <a:r>
               <a:rPr lang="en-IN" dirty="0"/>
-              <a:t>This can be implemented using Blockchain system which provides encryption and tamper-proof dataset e.g. – Hyperledger.</a:t>
+              <a:t>This can be implemented using Blockchain system which provides tamper-proof dataset e.g. – </a:t>
+            </a:r>
+            <a:r>
+              <a:rPr lang="en-IN" dirty="0" err="1"/>
+              <a:t>Hyperledger</a:t>
+            </a:r>
+            <a:r>
+              <a:rPr lang="en-IN" dirty="0"/>
+              <a:t>. We will implement encryption on top of blockchain infrastructure</a:t>
             </a:r>
           </a:p>
           <a:p>
@@ -3291,11 +3284,7 @@
             </a:pPr>
             <a:r>
               <a:rPr lang="en-IN" dirty="0"/>
-              <a:t>When the storage device is connected to the computer a program will extract the MAC address and check  if it is present on the database. If  MAC address is not on the white list then the OS event will notify the user regarding the same and block it. This along with the Blockchain system protects the computer connected on the internet or intranet from suspicious storage devices. The program used, handles the connectivity of storage devices with the computer</a:t>
-            </a:r>
-            <a:r>
-              <a:rPr lang="en-IN" dirty="0" smtClean="0"/>
-              <a:t>.</a:t>
+              <a:t>When the storage device is connected to the computer a program will extract the MAC address and check  if it is present on the database. A local probabilistic database (e.g. like bloom filter) will be used to check if the MAC address is while listed. If  MAC address is not on the white list then the OS event will notify the user regarding the same and block it. Use of Probabilistic database will allow the system to work on internet/intranet or disconnected computers from the unauthorized storage devices. The program used, handles the connectivity of storage devices with the computer.</a:t>
             </a:r>
           </a:p>
           <a:p>
@@ -3304,16 +3293,9 @@
               <a:buChar char="•"/>
             </a:pPr>
             <a:r>
-              <a:rPr lang="en-IN" dirty="0" smtClean="0"/>
-              <a:t>Another level of security will be an encrypted file on storage device which can be decrypted only using a key provided by the organisation. This file will be decrypted if the device is on the whitelist.</a:t>
-            </a:r>
-          </a:p>
-          <a:p>
-            <a:pPr marL="285750" indent="-285750">
-              <a:buFont typeface="Arial" pitchFamily="34" charset="0"/>
-              <a:buChar char="•"/>
-            </a:pPr>
-            <a:endParaRPr lang="en-IN" dirty="0"/>
+              <a:rPr lang="en-IN" dirty="0"/>
+              <a:t>Another level of security will be creating  an encrypted filesystem on storage device. Filesystem will get decrypted automatically when a whitelisted storage device is connected to an authorized computer. If decrypted correctly the data transfer or access between storage device and computer is possible.</a:t>
+            </a:r>
           </a:p>
         </p:txBody>
       </p:sp>
@@ -3327,13 +3309,6 @@
   <p:clrMapOvr>
     <a:masterClrMapping/>
   </p:clrMapOvr>
-  <p:timing>
-    <p:tnLst>
-      <p:par>
-        <p:cTn id="1" dur="indefinite" restart="never" nodeType="tmRoot"/>
-      </p:par>
-    </p:tnLst>
-  </p:timing>
 </p:sld>
 </file>
 
@@ -3382,7 +3357,7 @@
             </a:pPr>
             <a:r>
               <a:rPr lang="en-IN" dirty="0"/>
-              <a:t>The file will be transferred to the storage device when it is connected to the blockchain system for the first time for registration on the database. </a:t>
+              <a:t>The encrypted filesystem will be created on the storage device when it is connected to the blockchain system for the first time for registration on the database. </a:t>
             </a:r>
           </a:p>
           <a:p>
@@ -3392,7 +3367,7 @@
             </a:pPr>
             <a:r>
               <a:rPr lang="en-IN" dirty="0"/>
-              <a:t>If decrypted correctly the data transfer or access between storage device and computer is possible.</a:t>
+              <a:t>The computers which are offline  will use a probabilistic database of authorized MAC addresses (e.g. like Bloom filter). The driver program on the computer will check the storage device against this probabilistic database. The driver program will block the devices which are not on the whitelist. </a:t>
             </a:r>
           </a:p>
           <a:p>
@@ -3401,32 +3376,8 @@
               <a:buChar char="•"/>
             </a:pPr>
             <a:r>
-              <a:rPr lang="en-IN" dirty="0" smtClean="0"/>
-              <a:t>The </a:t>
-            </a:r>
-            <a:r>
-              <a:rPr lang="en-IN" dirty="0" smtClean="0"/>
-              <a:t>computers which are offline  will use a probabilistic data-structure like Bloom filter.</a:t>
-            </a:r>
-          </a:p>
-          <a:p>
-            <a:pPr marL="285750" indent="-285750">
-              <a:buFont typeface="Arial" pitchFamily="34" charset="0"/>
-              <a:buChar char="•"/>
-            </a:pPr>
-            <a:r>
-              <a:rPr lang="en-IN" dirty="0" smtClean="0"/>
-              <a:t>This structure will block the devices which are not on the whitelist. This structure is called by the program. </a:t>
-            </a:r>
-          </a:p>
-          <a:p>
-            <a:pPr marL="285750" indent="-285750">
-              <a:buFont typeface="Arial" pitchFamily="34" charset="0"/>
-              <a:buChar char="•"/>
-            </a:pPr>
-            <a:r>
-              <a:rPr lang="en-IN" dirty="0" smtClean="0"/>
-              <a:t>The Bloom filter will be updated when it is connected to the internet periodically.</a:t>
+              <a:rPr lang="en-IN" dirty="0"/>
+              <a:t>The Bloom filter database will be updated when it is connected to the internet periodically.</a:t>
             </a:r>
             <a:endParaRPr lang="en-US" dirty="0"/>
           </a:p>
@@ -3471,7 +3422,7 @@
           </a:lstStyle>
           <a:p>
             <a:r>
-              <a:rPr lang="en-IN" sz="2000" b="1" dirty="0" smtClean="0"/>
+              <a:rPr lang="en-IN" sz="2000" b="1" dirty="0"/>
               <a:t>TECHNOLOGY STACK</a:t>
             </a:r>
             <a:endParaRPr lang="en-US" sz="2000" b="1" dirty="0"/>
@@ -3505,9 +3456,14 @@
               <a:buChar char="•"/>
             </a:pPr>
             <a:r>
-              <a:rPr lang="en-IN" dirty="0" smtClean="0"/>
-              <a:t>Blockchain distributed database </a:t>
-            </a:r>
+              <a:rPr lang="en-IN" dirty="0"/>
+              <a:t>Opensource Blockchain distributed database  like </a:t>
+            </a:r>
+            <a:r>
+              <a:rPr lang="en-IN" dirty="0" err="1"/>
+              <a:t>Hyperle</a:t>
+            </a:r>
+            <a:endParaRPr lang="en-IN" dirty="0"/>
           </a:p>
           <a:p>
             <a:pPr marL="285750" indent="-285750">
@@ -3515,8 +3471,8 @@
               <a:buChar char="•"/>
             </a:pPr>
             <a:r>
-              <a:rPr lang="en-IN" dirty="0" smtClean="0"/>
-              <a:t>Web Server</a:t>
+              <a:rPr lang="en-IN" dirty="0"/>
+              <a:t>Web application based on blockchain database</a:t>
             </a:r>
           </a:p>
           <a:p>
@@ -3525,7 +3481,7 @@
               <a:buChar char="•"/>
             </a:pPr>
             <a:r>
-              <a:rPr lang="en-IN" dirty="0" smtClean="0"/>
+              <a:rPr lang="en-IN" dirty="0"/>
               <a:t>Browser based admin front-end</a:t>
             </a:r>
           </a:p>
@@ -3535,8 +3491,8 @@
               <a:buChar char="•"/>
             </a:pPr>
             <a:r>
-              <a:rPr lang="en-IN" dirty="0" smtClean="0"/>
-              <a:t>Windows service for handling device driver </a:t>
+              <a:rPr lang="en-IN" dirty="0"/>
+              <a:t>Windows service for detecting/blocking  connected USB storage device</a:t>
             </a:r>
           </a:p>
           <a:p>
@@ -3545,7 +3501,7 @@
               <a:buChar char="•"/>
             </a:pPr>
             <a:r>
-              <a:rPr lang="en-IN" dirty="0" smtClean="0"/>
+              <a:rPr lang="en-IN" dirty="0"/>
               <a:t>E-mail / SMS notification service</a:t>
             </a:r>
           </a:p>
@@ -3590,7 +3546,7 @@
           </a:lstStyle>
           <a:p>
             <a:r>
-              <a:rPr lang="en-IN" sz="2000" b="1" dirty="0" smtClean="0"/>
+              <a:rPr lang="en-IN" sz="2000" b="1" dirty="0"/>
               <a:t>DEPENDENCIES / SHOW STOPPER</a:t>
             </a:r>
             <a:endParaRPr lang="en-US" sz="2000" b="1" dirty="0"/>
@@ -3624,7 +3580,7 @@
             </a:pPr>
             <a:r>
               <a:rPr lang="en-IN" dirty="0"/>
-              <a:t>Probabilistic data structures are not 100% accurate.</a:t>
+              <a:t>Probabilistic data structures are not 100% accurate. In extremely rare case authorized device may get blocked if computer is offline</a:t>
             </a:r>
           </a:p>
           <a:p>
@@ -3634,19 +3590,21 @@
             </a:pPr>
             <a:r>
               <a:rPr lang="en-IN" dirty="0"/>
-              <a:t>The offline devices have to be connected to the internet or intranet for updating it frequently. This can give access to the devices which have been removed from the whitelist and won’t give access to the newly added devices.</a:t>
-            </a:r>
-          </a:p>
-          <a:p>
-            <a:pPr marL="285750" indent="-285750">
-              <a:buFont typeface="Arial" pitchFamily="34" charset="0"/>
-              <a:buChar char="•"/>
-            </a:pPr>
+              <a:t>The offline devices have to be connected to the internet or intranet for updating it </a:t>
+            </a:r>
+            <a:r>
+              <a:rPr lang="en-IN" dirty="0" err="1"/>
+              <a:t>periodicatlly</a:t>
+            </a:r>
             <a:r>
               <a:rPr lang="en-IN" dirty="0"/>
-              <a:t>It takes a lot of time to transfer the updates to every  distributed database.</a:t>
-            </a:r>
-            <a:endParaRPr lang="en-US" dirty="0"/>
+              <a:t>. This can give access to the devices which have been removed from the whitelist and won’t give access to the newly added </a:t>
+            </a:r>
+            <a:r>
+              <a:rPr lang="en-IN"/>
+              <a:t>devices.</a:t>
+            </a:r>
+            <a:endParaRPr lang="en-IN" dirty="0"/>
           </a:p>
         </p:txBody>
       </p:sp>
@@ -3660,13 +3618,6 @@
   <p:clrMapOvr>
     <a:masterClrMapping/>
   </p:clrMapOvr>
-  <p:timing>
-    <p:tnLst>
-      <p:par>
-        <p:cTn id="1" dur="indefinite" restart="never" nodeType="tmRoot"/>
-      </p:par>
-    </p:tnLst>
-  </p:timing>
 </p:sld>
 </file>
 
@@ -3710,7 +3661,7 @@
           <a:lstStyle/>
           <a:p>
             <a:r>
-              <a:rPr lang="en-IN" sz="2000" b="1" dirty="0" smtClean="0"/>
+              <a:rPr lang="en-IN" sz="2000" b="1" dirty="0"/>
               <a:t>FLOWCHARTS</a:t>
             </a:r>
             <a:endParaRPr lang="en-US" sz="2000" b="1" dirty="0"/>
@@ -3745,11 +3696,11 @@
           <a:lstStyle/>
           <a:p>
             <a:r>
-              <a:rPr lang="en-IN" sz="1600" b="1" dirty="0" smtClean="0"/>
+              <a:rPr lang="en-IN" sz="1600" b="1" dirty="0"/>
               <a:t>User</a:t>
             </a:r>
             <a:r>
-              <a:rPr lang="en-IN" sz="1600" dirty="0" smtClean="0"/>
+              <a:rPr lang="en-IN" sz="1600" dirty="0"/>
               <a:t> machine with storage device connected</a:t>
             </a:r>
             <a:endParaRPr lang="en-US" sz="1600" dirty="0"/>
@@ -3784,7 +3735,7 @@
           <a:lstStyle/>
           <a:p>
             <a:r>
-              <a:rPr lang="en-IN" sz="1600" dirty="0" smtClean="0"/>
+              <a:rPr lang="en-IN" sz="1600" dirty="0"/>
               <a:t>Acquire mac address of the storage device</a:t>
             </a:r>
             <a:endParaRPr lang="en-US" sz="1600" dirty="0"/>
@@ -3819,7 +3770,7 @@
           <a:lstStyle/>
           <a:p>
             <a:r>
-              <a:rPr lang="en-IN" sz="1600" dirty="0" smtClean="0"/>
+              <a:rPr lang="en-IN" sz="1600" dirty="0"/>
               <a:t>Calculate hash of the  mac address</a:t>
             </a:r>
             <a:endParaRPr lang="en-US" sz="1600" dirty="0"/>
@@ -3854,7 +3805,7 @@
           <a:lstStyle/>
           <a:p>
             <a:r>
-              <a:rPr lang="en-IN" sz="1600" dirty="0" smtClean="0"/>
+              <a:rPr lang="en-IN" sz="1600" dirty="0"/>
               <a:t>Query to check the existence of hash in the database</a:t>
             </a:r>
             <a:endParaRPr lang="en-US" sz="1600" dirty="0"/>
@@ -3924,7 +3875,7 @@
           <a:lstStyle/>
           <a:p>
             <a:r>
-              <a:rPr lang="en-IN" sz="1600" dirty="0" smtClean="0"/>
+              <a:rPr lang="en-IN" sz="1600" dirty="0"/>
               <a:t>If it exists?</a:t>
             </a:r>
             <a:endParaRPr lang="en-US" sz="1600" dirty="0"/>
@@ -3959,7 +3910,7 @@
           <a:lstStyle/>
           <a:p>
             <a:r>
-              <a:rPr lang="en-IN" sz="1600" dirty="0" smtClean="0"/>
+              <a:rPr lang="en-IN" sz="1600" dirty="0"/>
               <a:t>Block</a:t>
             </a:r>
             <a:endParaRPr lang="en-US" sz="1600" dirty="0"/>
@@ -3994,7 +3945,7 @@
           <a:lstStyle/>
           <a:p>
             <a:r>
-              <a:rPr lang="en-IN" sz="1600" dirty="0" smtClean="0"/>
+              <a:rPr lang="en-IN" sz="1600" dirty="0"/>
               <a:t>File decryption</a:t>
             </a:r>
             <a:endParaRPr lang="en-US" sz="1600" dirty="0"/>
@@ -4029,7 +3980,7 @@
           <a:lstStyle/>
           <a:p>
             <a:r>
-              <a:rPr lang="en-IN" sz="1600" dirty="0" smtClean="0"/>
+              <a:rPr lang="en-IN" sz="1600" dirty="0"/>
               <a:t>Successful  decryption?</a:t>
             </a:r>
             <a:endParaRPr lang="en-US" sz="1600" dirty="0"/>
@@ -4064,7 +4015,7 @@
           <a:lstStyle/>
           <a:p>
             <a:r>
-              <a:rPr lang="en-IN" sz="1600" dirty="0" smtClean="0"/>
+              <a:rPr lang="en-IN" sz="1600" dirty="0"/>
               <a:t>Allow data transfer</a:t>
             </a:r>
             <a:endParaRPr lang="en-US" sz="1600" dirty="0"/>
@@ -4094,7 +4045,7 @@
           <a:lstStyle/>
           <a:p>
             <a:r>
-              <a:rPr lang="en-IN" dirty="0" smtClean="0"/>
+              <a:rPr lang="en-IN" dirty="0"/>
               <a:t>offline</a:t>
             </a:r>
             <a:endParaRPr lang="en-US" dirty="0"/>
@@ -4528,7 +4479,7 @@
           <a:lstStyle/>
           <a:p>
             <a:r>
-              <a:rPr lang="en-IN" dirty="0" smtClean="0"/>
+              <a:rPr lang="en-IN" dirty="0"/>
               <a:t>Yes</a:t>
             </a:r>
             <a:endParaRPr lang="en-US" dirty="0"/>
@@ -4558,7 +4509,7 @@
           <a:lstStyle/>
           <a:p>
             <a:r>
-              <a:rPr lang="en-IN" dirty="0" smtClean="0"/>
+              <a:rPr lang="en-IN" dirty="0"/>
               <a:t>No</a:t>
             </a:r>
             <a:endParaRPr lang="en-US" dirty="0"/>
@@ -4588,7 +4539,7 @@
           <a:lstStyle/>
           <a:p>
             <a:r>
-              <a:rPr lang="en-IN" dirty="0" smtClean="0"/>
+              <a:rPr lang="en-IN" dirty="0"/>
               <a:t>No</a:t>
             </a:r>
             <a:endParaRPr lang="en-US" dirty="0"/>
@@ -4618,7 +4569,7 @@
           <a:lstStyle/>
           <a:p>
             <a:r>
-              <a:rPr lang="en-IN" dirty="0" smtClean="0"/>
+              <a:rPr lang="en-IN" dirty="0"/>
               <a:t>Yes</a:t>
             </a:r>
             <a:endParaRPr lang="en-US" dirty="0"/>
@@ -4653,11 +4604,11 @@
           <a:lstStyle/>
           <a:p>
             <a:r>
-              <a:rPr lang="en-IN" sz="1600" b="1" dirty="0" smtClean="0"/>
+              <a:rPr lang="en-IN" sz="1600" b="1" dirty="0"/>
               <a:t>Admin</a:t>
             </a:r>
             <a:r>
-              <a:rPr lang="en-IN" sz="1600" dirty="0" smtClean="0"/>
+              <a:rPr lang="en-IN" sz="1600" dirty="0"/>
               <a:t> machine with storage device connected</a:t>
             </a:r>
             <a:endParaRPr lang="en-US" sz="1600" dirty="0"/>
@@ -4692,7 +4643,7 @@
           <a:lstStyle/>
           <a:p>
             <a:r>
-              <a:rPr lang="en-IN" sz="1600" dirty="0" smtClean="0"/>
+              <a:rPr lang="en-IN" sz="1600" dirty="0"/>
               <a:t>Acquire mac address of the storage device</a:t>
             </a:r>
             <a:endParaRPr lang="en-US" sz="1600" dirty="0"/>
@@ -4727,7 +4678,7 @@
           <a:lstStyle/>
           <a:p>
             <a:r>
-              <a:rPr lang="en-IN" sz="1600" dirty="0" smtClean="0"/>
+              <a:rPr lang="en-IN" sz="1600" dirty="0"/>
               <a:t>Calculate hash of the  mac address</a:t>
             </a:r>
             <a:endParaRPr lang="en-US" sz="1600" dirty="0"/>
@@ -4836,7 +4787,7 @@
           <a:lstStyle/>
           <a:p>
             <a:r>
-              <a:rPr lang="en-IN" sz="1600" dirty="0" smtClean="0"/>
+              <a:rPr lang="en-IN" sz="1600" dirty="0"/>
               <a:t>Add to database</a:t>
             </a:r>
             <a:endParaRPr lang="en-US" sz="1600" dirty="0"/>
@@ -4871,7 +4822,7 @@
           <a:lstStyle/>
           <a:p>
             <a:r>
-              <a:rPr lang="en-IN" sz="1600" dirty="0" smtClean="0"/>
+              <a:rPr lang="en-IN" sz="1600" dirty="0"/>
               <a:t>Put the encrypted file in USB</a:t>
             </a:r>
             <a:endParaRPr lang="en-US" sz="1600" dirty="0"/>
@@ -4960,13 +4911,6 @@
   <p:clrMapOvr>
     <a:masterClrMapping/>
   </p:clrMapOvr>
-  <p:timing>
-    <p:tnLst>
-      <p:par>
-        <p:cTn id="1" dur="indefinite" restart="never" nodeType="tmRoot"/>
-      </p:par>
-    </p:tnLst>
-  </p:timing>
 </p:sld>
 </file>
 

</xml_diff>

<commit_message>
added some more details to ppt
</commit_message>
<xml_diff>
--- a/Gov_templates/USB_whitelist.pptx
+++ b/Gov_templates/USB_whitelist.pptx
@@ -10,8 +10,8 @@
   <p:sldIdLst>
     <p:sldId id="256" r:id="rId2"/>
     <p:sldId id="257" r:id="rId3"/>
-    <p:sldId id="258" r:id="rId4"/>
-    <p:sldId id="259" r:id="rId5"/>
+    <p:sldId id="259" r:id="rId4"/>
+    <p:sldId id="258" r:id="rId5"/>
   </p:sldIdLst>
   <p:sldSz cx="9144000" cy="6858000" type="screen4x3"/>
   <p:notesSz cx="6858000" cy="9144000"/>
@@ -11291,7 +11291,7 @@
               <a:buNone/>
             </a:pPr>
             <a:r>
-              <a:rPr lang="en-IN" sz="1600" b="1" i="0" u="none" strike="noStrike" cap="none" dirty="0">
+              <a:rPr lang="en-IN" sz="1800" b="1" i="0" u="none" strike="noStrike" cap="none" dirty="0">
                 <a:solidFill>
                   <a:schemeClr val="dk1"/>
                 </a:solidFill>
@@ -11303,7 +11303,7 @@
               <a:t>Ministry Category</a:t>
             </a:r>
             <a:r>
-              <a:rPr lang="en-IN" sz="1600" b="0" i="0" u="none" strike="noStrike" cap="none" dirty="0">
+              <a:rPr lang="en-IN" sz="1800" b="0" i="0" u="none" strike="noStrike" cap="none" dirty="0">
                 <a:solidFill>
                   <a:schemeClr val="dk1"/>
                 </a:solidFill>
@@ -11331,7 +11331,7 @@
               <a:buNone/>
             </a:pPr>
             <a:r>
-              <a:rPr lang="en-IN" sz="1600" b="1" i="0" u="none" strike="noStrike" cap="none" dirty="0">
+              <a:rPr lang="en-IN" sz="1800" b="1" i="0" u="none" strike="noStrike" cap="none" dirty="0">
                 <a:solidFill>
                   <a:schemeClr val="dk1"/>
                 </a:solidFill>
@@ -11343,7 +11343,7 @@
               <a:t>Problem Statement</a:t>
             </a:r>
             <a:r>
-              <a:rPr lang="en-IN" sz="1600" b="0" i="0" u="none" strike="noStrike" cap="none" dirty="0">
+              <a:rPr lang="en-IN" sz="1800" b="0" i="0" u="none" strike="noStrike" cap="none" dirty="0">
                 <a:solidFill>
                   <a:schemeClr val="dk1"/>
                 </a:solidFill>
@@ -11352,7 +11352,31 @@
                 <a:cs typeface="Calibri"/>
                 <a:sym typeface="Calibri"/>
               </a:rPr>
-              <a:t>: Prototype/application for whitelisting of USB devices in OFB which can be subsequently used on internet as well as on intranet				</a:t>
+              <a:t>: Prototype/application for whitelisting of USB devices in OFB which can be subsequently used on internet as well as on </a:t>
+            </a:r>
+            <a:r>
+              <a:rPr lang="en-IN" sz="1800" b="0" i="0" u="none" strike="noStrike" cap="none" dirty="0" smtClean="0">
+                <a:solidFill>
+                  <a:schemeClr val="dk1"/>
+                </a:solidFill>
+                <a:latin typeface="Calibri"/>
+                <a:ea typeface="Calibri"/>
+                <a:cs typeface="Calibri"/>
+                <a:sym typeface="Calibri"/>
+              </a:rPr>
+              <a:t>intranet.</a:t>
+            </a:r>
+            <a:r>
+              <a:rPr lang="en-IN" sz="1800" b="0" i="0" u="none" strike="noStrike" cap="none" dirty="0">
+                <a:solidFill>
+                  <a:schemeClr val="dk1"/>
+                </a:solidFill>
+                <a:latin typeface="Calibri"/>
+                <a:ea typeface="Calibri"/>
+                <a:cs typeface="Calibri"/>
+                <a:sym typeface="Calibri"/>
+              </a:rPr>
+              <a:t>	</a:t>
             </a:r>
           </a:p>
           <a:p>
@@ -11371,7 +11395,7 @@
               <a:buNone/>
             </a:pPr>
             <a:r>
-              <a:rPr lang="en-IN" sz="1600" b="1" i="0" u="none" strike="noStrike" cap="none" dirty="0">
+              <a:rPr lang="en-IN" sz="1800" b="1" i="0" u="none" strike="noStrike" cap="none" dirty="0">
                 <a:solidFill>
                   <a:schemeClr val="dk1"/>
                 </a:solidFill>
@@ -11383,7 +11407,7 @@
               <a:t>Problem Code</a:t>
             </a:r>
             <a:r>
-              <a:rPr lang="en-IN" sz="1600" b="0" i="0" u="none" strike="noStrike" cap="none" dirty="0" smtClean="0">
+              <a:rPr lang="en-IN" sz="1800" b="0" i="0" u="none" strike="noStrike" cap="none" dirty="0" smtClean="0">
                 <a:solidFill>
                   <a:schemeClr val="dk1"/>
                 </a:solidFill>
@@ -11395,7 +11419,7 @@
               <a:t>:  #MOD7</a:t>
             </a:r>
             <a:r>
-              <a:rPr lang="en-IN" sz="1600" b="0" i="0" u="none" strike="noStrike" cap="none" dirty="0">
+              <a:rPr lang="en-IN" sz="1800" b="0" i="0" u="none" strike="noStrike" cap="none" dirty="0">
                 <a:solidFill>
                   <a:schemeClr val="dk1"/>
                 </a:solidFill>
@@ -11407,7 +11431,7 @@
               <a:t>			</a:t>
             </a:r>
             <a:r>
-              <a:rPr lang="en-IN" sz="1600" b="1" i="0" u="none" strike="noStrike" cap="none" dirty="0">
+              <a:rPr lang="en-IN" sz="1800" b="0" i="0" u="none" strike="noStrike" cap="none" dirty="0" smtClean="0">
                 <a:solidFill>
                   <a:schemeClr val="dk1"/>
                 </a:solidFill>
@@ -11416,8 +11440,53 @@
                 <a:cs typeface="Calibri"/>
                 <a:sym typeface="Calibri"/>
               </a:rPr>
-              <a:t>Team Name: </a:t>
+              <a:t>	</a:t>
             </a:r>
+            <a:r>
+              <a:rPr lang="en-IN" sz="1800" b="1" i="0" u="none" strike="noStrike" cap="none" dirty="0" smtClean="0">
+                <a:solidFill>
+                  <a:schemeClr val="dk1"/>
+                </a:solidFill>
+                <a:latin typeface="Calibri"/>
+                <a:ea typeface="Calibri"/>
+                <a:cs typeface="Calibri"/>
+                <a:sym typeface="Calibri"/>
+              </a:rPr>
+              <a:t>Team </a:t>
+            </a:r>
+            <a:r>
+              <a:rPr lang="en-IN" sz="1800" b="1" i="0" u="none" strike="noStrike" cap="none" dirty="0">
+                <a:solidFill>
+                  <a:schemeClr val="dk1"/>
+                </a:solidFill>
+                <a:latin typeface="Calibri"/>
+                <a:ea typeface="Calibri"/>
+                <a:cs typeface="Calibri"/>
+                <a:sym typeface="Calibri"/>
+              </a:rPr>
+              <a:t>Name: </a:t>
+            </a:r>
+            <a:r>
+              <a:rPr lang="en-IN" sz="1800" b="1" i="0" u="none" strike="noStrike" cap="none" dirty="0" smtClean="0">
+                <a:solidFill>
+                  <a:schemeClr val="dk1"/>
+                </a:solidFill>
+                <a:latin typeface="Calibri"/>
+                <a:ea typeface="Calibri"/>
+                <a:cs typeface="Calibri"/>
+                <a:sym typeface="Calibri"/>
+              </a:rPr>
+              <a:t> X-GEN</a:t>
+            </a:r>
+            <a:endParaRPr lang="en-IN" sz="1800" b="1" i="0" u="none" strike="noStrike" cap="none" dirty="0">
+              <a:solidFill>
+                <a:schemeClr val="dk1"/>
+              </a:solidFill>
+              <a:latin typeface="Calibri"/>
+              <a:ea typeface="Calibri"/>
+              <a:cs typeface="Calibri"/>
+              <a:sym typeface="Calibri"/>
+            </a:endParaRPr>
           </a:p>
           <a:p>
             <a:pPr marL="0" marR="0" lvl="0" indent="-101600" algn="l" rtl="0">
@@ -11432,7 +11501,7 @@
               <a:buNone/>
             </a:pPr>
             <a:r>
-              <a:rPr lang="en-IN" sz="1600" b="1" i="0" u="none" strike="noStrike" cap="none" dirty="0">
+              <a:rPr lang="en-IN" sz="1800" b="1" i="0" u="none" strike="noStrike" cap="none" dirty="0">
                 <a:solidFill>
                   <a:schemeClr val="dk1"/>
                 </a:solidFill>
@@ -11444,7 +11513,7 @@
               <a:t>Team Leader Name</a:t>
             </a:r>
             <a:r>
-              <a:rPr lang="en-IN" sz="1600" b="0" i="0" u="none" strike="noStrike" cap="none" dirty="0">
+              <a:rPr lang="en-IN" sz="1800" b="0" i="0" u="none" strike="noStrike" cap="none" dirty="0">
                 <a:solidFill>
                   <a:schemeClr val="dk1"/>
                 </a:solidFill>
@@ -11456,7 +11525,7 @@
               <a:t>: </a:t>
             </a:r>
             <a:r>
-              <a:rPr lang="en-IN" sz="1600" b="0" i="0" u="none" strike="noStrike" cap="none" dirty="0" err="1" smtClean="0">
+              <a:rPr lang="en-IN" sz="1800" b="0" i="0" u="none" strike="noStrike" cap="none" dirty="0" err="1" smtClean="0">
                 <a:solidFill>
                   <a:schemeClr val="dk1"/>
                 </a:solidFill>
@@ -11468,7 +11537,7 @@
               <a:t>Akshata</a:t>
             </a:r>
             <a:r>
-              <a:rPr lang="en-IN" sz="1600" b="0" i="0" u="none" strike="noStrike" cap="none" dirty="0" smtClean="0">
+              <a:rPr lang="en-IN" sz="1800" b="0" i="0" u="none" strike="noStrike" cap="none" dirty="0" smtClean="0">
                 <a:solidFill>
                   <a:schemeClr val="dk1"/>
                 </a:solidFill>
@@ -11480,7 +11549,7 @@
               <a:t>  </a:t>
             </a:r>
             <a:r>
-              <a:rPr lang="en-IN" sz="1600" b="0" i="0" u="none" strike="noStrike" cap="none" dirty="0" err="1" smtClean="0">
+              <a:rPr lang="en-IN" sz="1800" b="0" i="0" u="none" strike="noStrike" cap="none" dirty="0" err="1" smtClean="0">
                 <a:solidFill>
                   <a:schemeClr val="dk1"/>
                 </a:solidFill>
@@ -11492,7 +11561,7 @@
               <a:t>Jahagirdar</a:t>
             </a:r>
             <a:r>
-              <a:rPr lang="en-IN" sz="1600" b="0" i="0" u="none" strike="noStrike" cap="none" dirty="0">
+              <a:rPr lang="en-IN" sz="1800" b="0" i="0" u="none" strike="noStrike" cap="none" dirty="0">
                 <a:solidFill>
                   <a:schemeClr val="dk1"/>
                 </a:solidFill>
@@ -11504,7 +11573,7 @@
               <a:t>		</a:t>
             </a:r>
             <a:r>
-              <a:rPr lang="en-IN" sz="1600" b="1" i="0" u="none" strike="noStrike" cap="none" dirty="0">
+              <a:rPr lang="en-IN" sz="1800" b="1" i="0" u="none" strike="noStrike" cap="none" dirty="0">
                 <a:solidFill>
                   <a:schemeClr val="dk1"/>
                 </a:solidFill>
@@ -11516,7 +11585,7 @@
               <a:t>College Code</a:t>
             </a:r>
             <a:r>
-              <a:rPr lang="en-IN" sz="1600" b="0" i="0" u="none" strike="noStrike" cap="none" dirty="0">
+              <a:rPr lang="en-IN" sz="1800" b="0" i="0" u="none" strike="noStrike" cap="none" dirty="0">
                 <a:solidFill>
                   <a:schemeClr val="dk1"/>
                 </a:solidFill>
@@ -11538,7 +11607,7 @@
         </p:nvSpPr>
         <p:spPr>
           <a:xfrm>
-            <a:off x="2120900" y="2013010"/>
+            <a:off x="2095624" y="2164794"/>
             <a:ext cx="4800600" cy="400110"/>
           </a:xfrm>
           <a:prstGeom prst="rect">
@@ -11562,7 +11631,7 @@
               <a:buNone/>
             </a:pPr>
             <a:r>
-              <a:rPr lang="en-IN" sz="2000" b="1" i="0" u="none" strike="noStrike" cap="none">
+              <a:rPr lang="en-IN" sz="2000" b="1" i="0" u="none" strike="noStrike" cap="none" dirty="0">
                 <a:solidFill>
                   <a:schemeClr val="dk1"/>
                 </a:solidFill>
@@ -11584,8 +11653,8 @@
         </p:nvSpPr>
         <p:spPr>
           <a:xfrm>
-            <a:off x="215900" y="2399265"/>
-            <a:ext cx="8686800" cy="4247317"/>
+            <a:off x="215900" y="2564904"/>
+            <a:ext cx="8686800" cy="4081678"/>
           </a:xfrm>
           <a:prstGeom prst="rect">
             <a:avLst/>
@@ -12966,6 +13035,64 @@
 </file>
 
 <file path=ppt/slides/slide3.xml><?xml version="1.0" encoding="utf-8"?>
+<p:sld xmlns:a="http://schemas.openxmlformats.org/drawingml/2006/main" xmlns:r="http://schemas.openxmlformats.org/officeDocument/2006/relationships" xmlns:p="http://schemas.openxmlformats.org/presentationml/2006/main">
+  <p:cSld>
+    <p:spTree>
+      <p:nvGrpSpPr>
+        <p:cNvPr id="1" name=""/>
+        <p:cNvGrpSpPr/>
+        <p:nvPr/>
+      </p:nvGrpSpPr>
+      <p:grpSpPr>
+        <a:xfrm>
+          <a:off x="0" y="0"/>
+          <a:ext cx="0" cy="0"/>
+          <a:chOff x="0" y="0"/>
+          <a:chExt cx="0" cy="0"/>
+        </a:xfrm>
+      </p:grpSpPr>
+      <p:sp>
+        <p:nvSpPr>
+          <p:cNvPr id="2" name="Title 1"/>
+          <p:cNvSpPr>
+            <a:spLocks noGrp="1"/>
+          </p:cNvSpPr>
+          <p:nvPr>
+            <p:ph type="title"/>
+          </p:nvPr>
+        </p:nvSpPr>
+        <p:spPr>
+          <a:xfrm>
+            <a:off x="457200" y="274638"/>
+            <a:ext cx="8229600" cy="490066"/>
+          </a:xfrm>
+        </p:spPr>
+        <p:txBody>
+          <a:bodyPr/>
+          <a:lstStyle/>
+          <a:p>
+            <a:r>
+              <a:rPr lang="en-IN" sz="2000" b="1" dirty="0" smtClean="0"/>
+              <a:t>NOVELTY</a:t>
+            </a:r>
+            <a:endParaRPr lang="en-US" sz="2000" b="1" dirty="0"/>
+          </a:p>
+        </p:txBody>
+      </p:sp>
+    </p:spTree>
+    <p:extLst>
+      <p:ext uri="{BB962C8B-B14F-4D97-AF65-F5344CB8AC3E}">
+        <p14:creationId xmlns:p14="http://schemas.microsoft.com/office/powerpoint/2010/main" val="356556655"/>
+      </p:ext>
+    </p:extLst>
+  </p:cSld>
+  <p:clrMapOvr>
+    <a:masterClrMapping/>
+  </p:clrMapOvr>
+</p:sld>
+</file>
+
+<file path=ppt/slides/slide4.xml><?xml version="1.0" encoding="utf-8"?>
 <p:sld xmlns:a="http://schemas.openxmlformats.org/drawingml/2006/main" xmlns:r="http://schemas.openxmlformats.org/officeDocument/2006/relationships" xmlns:p="http://schemas.openxmlformats.org/presentationml/2006/main">
   <p:cSld>
     <p:spTree>
@@ -14433,64 +14560,6 @@
         </p:txBody>
       </p:sp>
     </p:spTree>
-  </p:cSld>
-  <p:clrMapOvr>
-    <a:masterClrMapping/>
-  </p:clrMapOvr>
-</p:sld>
-</file>
-
-<file path=ppt/slides/slide4.xml><?xml version="1.0" encoding="utf-8"?>
-<p:sld xmlns:a="http://schemas.openxmlformats.org/drawingml/2006/main" xmlns:r="http://schemas.openxmlformats.org/officeDocument/2006/relationships" xmlns:p="http://schemas.openxmlformats.org/presentationml/2006/main">
-  <p:cSld>
-    <p:spTree>
-      <p:nvGrpSpPr>
-        <p:cNvPr id="1" name=""/>
-        <p:cNvGrpSpPr/>
-        <p:nvPr/>
-      </p:nvGrpSpPr>
-      <p:grpSpPr>
-        <a:xfrm>
-          <a:off x="0" y="0"/>
-          <a:ext cx="0" cy="0"/>
-          <a:chOff x="0" y="0"/>
-          <a:chExt cx="0" cy="0"/>
-        </a:xfrm>
-      </p:grpSpPr>
-      <p:sp>
-        <p:nvSpPr>
-          <p:cNvPr id="2" name="Title 1"/>
-          <p:cNvSpPr>
-            <a:spLocks noGrp="1"/>
-          </p:cNvSpPr>
-          <p:nvPr>
-            <p:ph type="title"/>
-          </p:nvPr>
-        </p:nvSpPr>
-        <p:spPr>
-          <a:xfrm>
-            <a:off x="457200" y="274638"/>
-            <a:ext cx="8229600" cy="778098"/>
-          </a:xfrm>
-        </p:spPr>
-        <p:txBody>
-          <a:bodyPr/>
-          <a:lstStyle/>
-          <a:p>
-            <a:r>
-              <a:rPr lang="en-IN" sz="2000" dirty="0" smtClean="0"/>
-              <a:t>NOVELTY</a:t>
-            </a:r>
-            <a:endParaRPr lang="en-US" sz="2000" dirty="0"/>
-          </a:p>
-        </p:txBody>
-      </p:sp>
-    </p:spTree>
-    <p:extLst>
-      <p:ext uri="{BB962C8B-B14F-4D97-AF65-F5344CB8AC3E}">
-        <p14:creationId xmlns:p14="http://schemas.microsoft.com/office/powerpoint/2010/main" val="356556655"/>
-      </p:ext>
-    </p:extLst>
   </p:cSld>
   <p:clrMapOvr>
     <a:masterClrMapping/>

</xml_diff>

<commit_message>
minor changes in flowchart
</commit_message>
<xml_diff>
--- a/Gov_templates/USB_whitelist.pptx
+++ b/Gov_templates/USB_whitelist.pptx
@@ -13053,29 +13053,114 @@
       </p:grpSpPr>
       <p:sp>
         <p:nvSpPr>
-          <p:cNvPr id="2" name="Title 1"/>
+          <p:cNvPr id="3" name="Text Placeholder 2"/>
           <p:cNvSpPr>
             <a:spLocks noGrp="1"/>
           </p:cNvSpPr>
           <p:nvPr>
-            <p:ph type="title"/>
+            <p:ph type="body" idx="1"/>
           </p:nvPr>
         </p:nvSpPr>
         <p:spPr>
           <a:xfrm>
-            <a:off x="457200" y="274638"/>
-            <a:ext cx="8229600" cy="490066"/>
+            <a:off x="457200" y="1268760"/>
+            <a:ext cx="4038600" cy="4857403"/>
           </a:xfrm>
         </p:spPr>
         <p:txBody>
           <a:bodyPr/>
           <a:lstStyle/>
           <a:p>
+            <a:pPr marL="177800" indent="0">
+              <a:buNone/>
+            </a:pPr>
+            <a:endParaRPr lang="en-US" dirty="0"/>
+          </a:p>
+        </p:txBody>
+      </p:sp>
+      <p:sp>
+        <p:nvSpPr>
+          <p:cNvPr id="4" name="Text Placeholder 3"/>
+          <p:cNvSpPr>
+            <a:spLocks noGrp="1"/>
+          </p:cNvSpPr>
+          <p:nvPr>
+            <p:ph type="body" idx="2"/>
+          </p:nvPr>
+        </p:nvSpPr>
+        <p:spPr>
+          <a:xfrm>
+            <a:off x="4648200" y="1268760"/>
+            <a:ext cx="4038600" cy="4857403"/>
+          </a:xfrm>
+        </p:spPr>
+        <p:txBody>
+          <a:bodyPr/>
+          <a:lstStyle/>
+          <a:p>
+            <a:endParaRPr lang="en-US" dirty="0"/>
+          </a:p>
+        </p:txBody>
+      </p:sp>
+      <p:sp>
+        <p:nvSpPr>
+          <p:cNvPr id="5" name="TextBox 4"/>
+          <p:cNvSpPr txBox="1"/>
+          <p:nvPr/>
+        </p:nvSpPr>
+        <p:spPr>
+          <a:xfrm>
+            <a:off x="467544" y="846584"/>
+            <a:ext cx="4032448" cy="369332"/>
+          </a:xfrm>
+          <a:prstGeom prst="rect">
+            <a:avLst/>
+          </a:prstGeom>
+          <a:noFill/>
+        </p:spPr>
+        <p:txBody>
+          <a:bodyPr wrap="square" rtlCol="0">
+            <a:spAutoFit/>
+          </a:bodyPr>
+          <a:lstStyle/>
+          <a:p>
+            <a:pPr algn="ctr"/>
             <a:r>
-              <a:rPr lang="en-IN" sz="2000" b="1" dirty="0" smtClean="0"/>
+              <a:rPr lang="en-IN" sz="1800" b="1" dirty="0" smtClean="0"/>
               <a:t>NOVELTY</a:t>
             </a:r>
-            <a:endParaRPr lang="en-US" sz="2000" b="1" dirty="0"/>
+            <a:endParaRPr lang="en-US" sz="1800" b="1" dirty="0"/>
+          </a:p>
+        </p:txBody>
+      </p:sp>
+      <p:sp>
+        <p:nvSpPr>
+          <p:cNvPr id="6" name="TextBox 5"/>
+          <p:cNvSpPr txBox="1"/>
+          <p:nvPr/>
+        </p:nvSpPr>
+        <p:spPr>
+          <a:xfrm>
+            <a:off x="4676304" y="845095"/>
+            <a:ext cx="4032448" cy="369332"/>
+          </a:xfrm>
+          <a:prstGeom prst="rect">
+            <a:avLst/>
+          </a:prstGeom>
+          <a:noFill/>
+        </p:spPr>
+        <p:txBody>
+          <a:bodyPr wrap="square" rtlCol="0">
+            <a:spAutoFit/>
+          </a:bodyPr>
+          <a:lstStyle/>
+          <a:p>
+            <a:pPr algn="ctr"/>
+            <a:r>
+              <a:rPr lang="en-IN" sz="1800" b="1" dirty="0" smtClean="0"/>
+              <a:t>SECURITY</a:t>
+            </a:r>
+            <a:endParaRPr lang="en-US" sz="1800" b="1" dirty="0"/>
           </a:p>
         </p:txBody>
       </p:sp>
@@ -13371,7 +13456,7 @@
         <p:spPr>
           <a:xfrm>
             <a:off x="469899" y="2790110"/>
-            <a:ext cx="2429687" cy="830997"/>
+            <a:ext cx="1905001" cy="1088836"/>
           </a:xfrm>
           <a:prstGeom prst="rect">
             <a:avLst/>
@@ -13443,7 +13528,7 @@
         </p:nvSpPr>
         <p:spPr>
           <a:xfrm>
-            <a:off x="1195387" y="4191000"/>
+            <a:off x="482600" y="4191000"/>
             <a:ext cx="1111250" cy="338554"/>
           </a:xfrm>
           <a:prstGeom prst="rect">
@@ -13473,7 +13558,7 @@
               <a:buNone/>
             </a:pPr>
             <a:r>
-              <a:rPr lang="en-IN" sz="1600">
+              <a:rPr lang="en-IN" sz="1600" dirty="0">
                 <a:solidFill>
                   <a:schemeClr val="dk1"/>
                 </a:solidFill>
@@ -13495,7 +13580,7 @@
         </p:nvSpPr>
         <p:spPr>
           <a:xfrm>
-            <a:off x="3492500" y="4191000"/>
+            <a:off x="2150270" y="4333353"/>
             <a:ext cx="685800" cy="338554"/>
           </a:xfrm>
           <a:prstGeom prst="rect">
@@ -13525,7 +13610,7 @@
               <a:buNone/>
             </a:pPr>
             <a:r>
-              <a:rPr lang="en-IN" sz="1600">
+              <a:rPr lang="en-IN" sz="1600" dirty="0">
                 <a:solidFill>
                   <a:schemeClr val="dk1"/>
                 </a:solidFill>
@@ -13541,14 +13626,87 @@
       </p:sp>
       <p:sp>
         <p:nvSpPr>
-          <p:cNvPr id="109" name="Shape 109"/>
+          <p:cNvPr id="110" name="Shape 110"/>
           <p:cNvSpPr txBox="1"/>
           <p:nvPr/>
         </p:nvSpPr>
         <p:spPr>
           <a:xfrm>
-            <a:off x="482600" y="4927262"/>
-            <a:ext cx="1425575" cy="338554"/>
+            <a:off x="1089024" y="5612318"/>
+            <a:ext cx="2258840" cy="338554"/>
+          </a:xfrm>
+          <a:prstGeom prst="rect">
+            <a:avLst/>
+          </a:prstGeom>
+          <a:noFill/>
+          <a:ln w="9525" cap="flat" cmpd="sng">
+            <a:solidFill>
+              <a:schemeClr val="dk1"/>
+            </a:solidFill>
+            <a:prstDash val="solid"/>
+            <a:round/>
+            <a:headEnd type="none" w="med" len="med"/>
+            <a:tailEnd type="none" w="med" len="med"/>
+          </a:ln>
+        </p:spPr>
+        <p:txBody>
+          <a:bodyPr wrap="square" lIns="91425" tIns="45700" rIns="91425" bIns="45700" anchor="t" anchorCtr="0">
+            <a:noAutofit/>
+          </a:bodyPr>
+          <a:lstStyle/>
+          <a:p>
+            <a:pPr marL="0" marR="0" lvl="0" indent="0" algn="ctr" rtl="0">
+              <a:spcBef>
+                <a:spcPts val="0"/>
+              </a:spcBef>
+              <a:buNone/>
+            </a:pPr>
+            <a:r>
+              <a:rPr lang="en-IN" sz="1600" dirty="0" smtClean="0">
+                <a:solidFill>
+                  <a:schemeClr val="dk1"/>
+                </a:solidFill>
+                <a:latin typeface="Calibri"/>
+                <a:ea typeface="Calibri"/>
+                <a:cs typeface="Calibri"/>
+                <a:sym typeface="Calibri"/>
+              </a:rPr>
+              <a:t>File</a:t>
+            </a:r>
+            <a:r>
+              <a:rPr lang="en-IN" sz="1600" dirty="0" smtClean="0">
+                <a:solidFill>
+                  <a:schemeClr val="dk1"/>
+                </a:solidFill>
+                <a:latin typeface="Calibri"/>
+                <a:ea typeface="Calibri"/>
+                <a:cs typeface="Calibri"/>
+                <a:sym typeface="Calibri"/>
+              </a:rPr>
+              <a:t> decryption</a:t>
+            </a:r>
+            <a:endParaRPr lang="en-IN" sz="1600" dirty="0">
+              <a:solidFill>
+                <a:schemeClr val="dk1"/>
+              </a:solidFill>
+              <a:latin typeface="Calibri"/>
+              <a:ea typeface="Calibri"/>
+              <a:cs typeface="Calibri"/>
+              <a:sym typeface="Calibri"/>
+            </a:endParaRPr>
+          </a:p>
+        </p:txBody>
+      </p:sp>
+      <p:sp>
+        <p:nvSpPr>
+          <p:cNvPr id="111" name="Shape 111"/>
+          <p:cNvSpPr txBox="1"/>
+          <p:nvPr/>
+        </p:nvSpPr>
+        <p:spPr>
+          <a:xfrm>
+            <a:off x="3779912" y="5612318"/>
+            <a:ext cx="2172975" cy="338554"/>
           </a:xfrm>
           <a:prstGeom prst="rect">
             <a:avLst/>
@@ -13577,7 +13735,7 @@
               <a:buNone/>
             </a:pPr>
             <a:r>
-              <a:rPr lang="en-IN" sz="1600">
+              <a:rPr lang="en-IN" sz="1600" dirty="0" smtClean="0">
                 <a:solidFill>
                   <a:schemeClr val="dk1"/>
                 </a:solidFill>
@@ -13586,112 +13744,17 @@
                 <a:cs typeface="Calibri"/>
                 <a:sym typeface="Calibri"/>
               </a:rPr>
-              <a:t>File decryption</a:t>
+              <a:t>Successful decryption?</a:t>
             </a:r>
-          </a:p>
-        </p:txBody>
-      </p:sp>
-      <p:sp>
-        <p:nvSpPr>
-          <p:cNvPr id="110" name="Shape 110"/>
-          <p:cNvSpPr txBox="1"/>
-          <p:nvPr/>
-        </p:nvSpPr>
-        <p:spPr>
-          <a:xfrm>
-            <a:off x="893762" y="5612318"/>
-            <a:ext cx="2162176" cy="338554"/>
-          </a:xfrm>
-          <a:prstGeom prst="rect">
-            <a:avLst/>
-          </a:prstGeom>
-          <a:noFill/>
-          <a:ln w="9525" cap="flat" cmpd="sng">
-            <a:solidFill>
-              <a:schemeClr val="dk1"/>
-            </a:solidFill>
-            <a:prstDash val="solid"/>
-            <a:round/>
-            <a:headEnd type="none" w="med" len="med"/>
-            <a:tailEnd type="none" w="med" len="med"/>
-          </a:ln>
-        </p:spPr>
-        <p:txBody>
-          <a:bodyPr wrap="square" lIns="91425" tIns="45700" rIns="91425" bIns="45700" anchor="t" anchorCtr="0">
-            <a:noAutofit/>
-          </a:bodyPr>
-          <a:lstStyle/>
-          <a:p>
-            <a:pPr marL="0" marR="0" lvl="0" indent="0" algn="l" rtl="0">
-              <a:spcBef>
-                <a:spcPts val="0"/>
-              </a:spcBef>
-              <a:buNone/>
-            </a:pPr>
-            <a:r>
-              <a:rPr lang="en-IN" sz="1600">
-                <a:solidFill>
-                  <a:schemeClr val="dk1"/>
-                </a:solidFill>
-                <a:latin typeface="Calibri"/>
-                <a:ea typeface="Calibri"/>
-                <a:cs typeface="Calibri"/>
-                <a:sym typeface="Calibri"/>
-              </a:rPr>
-              <a:t>Successful  decryption?</a:t>
-            </a:r>
-          </a:p>
-        </p:txBody>
-      </p:sp>
-      <p:sp>
-        <p:nvSpPr>
-          <p:cNvPr id="111" name="Shape 111"/>
-          <p:cNvSpPr txBox="1"/>
-          <p:nvPr/>
-        </p:nvSpPr>
-        <p:spPr>
-          <a:xfrm>
-            <a:off x="469900" y="6312692"/>
-            <a:ext cx="1905000" cy="338554"/>
-          </a:xfrm>
-          <a:prstGeom prst="rect">
-            <a:avLst/>
-          </a:prstGeom>
-          <a:noFill/>
-          <a:ln w="9525" cap="flat" cmpd="sng">
-            <a:solidFill>
-              <a:schemeClr val="dk1"/>
-            </a:solidFill>
-            <a:prstDash val="solid"/>
-            <a:round/>
-            <a:headEnd type="none" w="med" len="med"/>
-            <a:tailEnd type="none" w="med" len="med"/>
-          </a:ln>
-        </p:spPr>
-        <p:txBody>
-          <a:bodyPr wrap="square" lIns="91425" tIns="45700" rIns="91425" bIns="45700" anchor="t" anchorCtr="0">
-            <a:noAutofit/>
-          </a:bodyPr>
-          <a:lstStyle/>
-          <a:p>
-            <a:pPr marL="0" marR="0" lvl="0" indent="0" algn="l" rtl="0">
-              <a:spcBef>
-                <a:spcPts val="0"/>
-              </a:spcBef>
-              <a:buNone/>
-            </a:pPr>
-            <a:r>
-              <a:rPr lang="en-IN" sz="1600">
-                <a:solidFill>
-                  <a:schemeClr val="dk1"/>
-                </a:solidFill>
-                <a:latin typeface="Calibri"/>
-                <a:ea typeface="Calibri"/>
-                <a:cs typeface="Calibri"/>
-                <a:sym typeface="Calibri"/>
-              </a:rPr>
-              <a:t>Allow data transfer</a:t>
-            </a:r>
+            <a:endParaRPr lang="en-IN" sz="1600" dirty="0">
+              <a:solidFill>
+                <a:schemeClr val="dk1"/>
+              </a:solidFill>
+              <a:latin typeface="Calibri"/>
+              <a:ea typeface="Calibri"/>
+              <a:cs typeface="Calibri"/>
+              <a:sym typeface="Calibri"/>
+            </a:endParaRPr>
           </a:p>
         </p:txBody>
       </p:sp>
@@ -13783,8 +13846,8 @@
         </p:nvCxnSpPr>
         <p:spPr>
           <a:xfrm>
-            <a:off x="1598612" y="3614935"/>
-            <a:ext cx="0" cy="569893"/>
+            <a:off x="1043608" y="3868529"/>
+            <a:ext cx="0" cy="322471"/>
           </a:xfrm>
           <a:prstGeom prst="straightConnector1">
             <a:avLst/>
@@ -13804,16 +13867,13 @@
       <p:cxnSp>
         <p:nvCxnSpPr>
           <p:cNvPr id="119" name="Shape 119"/>
-          <p:cNvCxnSpPr>
-            <a:stCxn id="107" idx="3"/>
-            <a:endCxn id="108" idx="1"/>
-          </p:cNvCxnSpPr>
+          <p:cNvCxnSpPr/>
           <p:nvPr/>
         </p:nvCxnSpPr>
         <p:spPr>
           <a:xfrm>
-            <a:off x="2306637" y="4360277"/>
-            <a:ext cx="1185900" cy="0"/>
+            <a:off x="1600200" y="4417697"/>
+            <a:ext cx="550070" cy="0"/>
           </a:xfrm>
           <a:prstGeom prst="straightConnector1">
             <a:avLst/>
@@ -13838,34 +13898,8 @@
         </p:nvCxnSpPr>
         <p:spPr>
           <a:xfrm>
-            <a:off x="1598612" y="4529554"/>
-            <a:ext cx="0" cy="397708"/>
-          </a:xfrm>
-          <a:prstGeom prst="straightConnector1">
-            <a:avLst/>
-          </a:prstGeom>
-          <a:noFill/>
-          <a:ln w="9525" cap="flat" cmpd="sng">
-            <a:solidFill>
-              <a:schemeClr val="dk1"/>
-            </a:solidFill>
-            <a:prstDash val="solid"/>
-            <a:round/>
-            <a:headEnd type="none" w="med" len="med"/>
-            <a:tailEnd type="stealth" w="lg" len="lg"/>
-          </a:ln>
-        </p:spPr>
-      </p:cxnSp>
-      <p:cxnSp>
-        <p:nvCxnSpPr>
-          <p:cNvPr id="121" name="Shape 121"/>
-          <p:cNvCxnSpPr/>
-          <p:nvPr/>
-        </p:nvCxnSpPr>
-        <p:spPr>
-          <a:xfrm>
-            <a:off x="1600200" y="5265816"/>
-            <a:ext cx="0" cy="342325"/>
+            <a:off x="1303002" y="4529554"/>
+            <a:ext cx="0" cy="1082764"/>
           </a:xfrm>
           <a:prstGeom prst="straightConnector1">
             <a:avLst/>
@@ -13885,42 +13919,15 @@
       <p:cxnSp>
         <p:nvCxnSpPr>
           <p:cNvPr id="122" name="Shape 122"/>
-          <p:cNvCxnSpPr/>
+          <p:cNvCxnSpPr>
+            <a:stCxn id="110" idx="3"/>
+          </p:cNvCxnSpPr>
           <p:nvPr/>
         </p:nvCxnSpPr>
         <p:spPr>
           <a:xfrm>
-            <a:off x="1638300" y="5970367"/>
-            <a:ext cx="0" cy="342325"/>
-          </a:xfrm>
-          <a:prstGeom prst="straightConnector1">
-            <a:avLst/>
-          </a:prstGeom>
-          <a:noFill/>
-          <a:ln w="9525" cap="flat" cmpd="sng">
-            <a:solidFill>
-              <a:schemeClr val="dk1"/>
-            </a:solidFill>
-            <a:prstDash val="solid"/>
-            <a:round/>
-            <a:headEnd type="none" w="med" len="med"/>
-            <a:tailEnd type="stealth" w="lg" len="lg"/>
-          </a:ln>
-        </p:spPr>
-      </p:cxnSp>
-      <p:cxnSp>
-        <p:nvCxnSpPr>
-          <p:cNvPr id="123" name="Shape 123"/>
-          <p:cNvCxnSpPr>
-            <a:stCxn id="110" idx="3"/>
-            <a:endCxn id="108" idx="2"/>
-          </p:cNvCxnSpPr>
-          <p:nvPr/>
-        </p:nvCxnSpPr>
-        <p:spPr>
-          <a:xfrm rot="10800000" flipH="1">
-            <a:off x="3055938" y="4529695"/>
-            <a:ext cx="779400" cy="1251900"/>
+            <a:off x="3347864" y="5781595"/>
+            <a:ext cx="432048" cy="0"/>
           </a:xfrm>
           <a:prstGeom prst="straightConnector1">
             <a:avLst/>
@@ -13945,8 +13952,8 @@
         </p:nvSpPr>
         <p:spPr>
           <a:xfrm>
-            <a:off x="936624" y="4567654"/>
-            <a:ext cx="563563" cy="369332"/>
+            <a:off x="683568" y="4612415"/>
+            <a:ext cx="619434" cy="369332"/>
           </a:xfrm>
           <a:prstGeom prst="rect">
             <a:avLst/>
@@ -13969,7 +13976,7 @@
               <a:buNone/>
             </a:pPr>
             <a:r>
-              <a:rPr lang="en-IN" sz="1800">
+              <a:rPr lang="en-IN" sz="1600" dirty="0" smtClean="0">
                 <a:solidFill>
                   <a:schemeClr val="dk1"/>
                 </a:solidFill>
@@ -13980,6 +13987,15 @@
               </a:rPr>
               <a:t>Yes</a:t>
             </a:r>
+            <a:endParaRPr lang="en-IN" sz="1600" dirty="0">
+              <a:solidFill>
+                <a:schemeClr val="dk1"/>
+              </a:solidFill>
+              <a:latin typeface="Calibri"/>
+              <a:ea typeface="Calibri"/>
+              <a:cs typeface="Calibri"/>
+              <a:sym typeface="Calibri"/>
+            </a:endParaRPr>
           </a:p>
         </p:txBody>
       </p:sp>
@@ -13991,7 +14007,7 @@
         </p:nvSpPr>
         <p:spPr>
           <a:xfrm>
-            <a:off x="2611833" y="4016751"/>
+            <a:off x="1593850" y="4360277"/>
             <a:ext cx="575470" cy="369332"/>
           </a:xfrm>
           <a:prstGeom prst="rect">
@@ -14015,7 +14031,19 @@
               <a:buNone/>
             </a:pPr>
             <a:r>
-              <a:rPr lang="en-IN" sz="1800">
+              <a:rPr lang="en-IN" sz="1600" dirty="0">
+                <a:solidFill>
+                  <a:schemeClr val="dk1"/>
+                </a:solidFill>
+                <a:latin typeface="Calibri"/>
+                <a:ea typeface="Calibri"/>
+                <a:cs typeface="Calibri"/>
+                <a:sym typeface="Calibri"/>
+              </a:rPr>
+              <a:t> </a:t>
+            </a:r>
+            <a:r>
+              <a:rPr lang="en-IN" sz="1600" dirty="0" smtClean="0">
                 <a:solidFill>
                   <a:schemeClr val="dk1"/>
                 </a:solidFill>
@@ -14026,6 +14054,15 @@
               </a:rPr>
               <a:t>No</a:t>
             </a:r>
+            <a:endParaRPr lang="en-IN" sz="1600" dirty="0">
+              <a:solidFill>
+                <a:schemeClr val="dk1"/>
+              </a:solidFill>
+              <a:latin typeface="Calibri"/>
+              <a:ea typeface="Calibri"/>
+              <a:cs typeface="Calibri"/>
+              <a:sym typeface="Calibri"/>
+            </a:endParaRPr>
           </a:p>
         </p:txBody>
       </p:sp>
@@ -14037,8 +14074,8 @@
         </p:nvSpPr>
         <p:spPr>
           <a:xfrm>
-            <a:off x="3543300" y="4936986"/>
-            <a:ext cx="546100" cy="369332"/>
+            <a:off x="2978940" y="4487241"/>
+            <a:ext cx="510550" cy="369332"/>
           </a:xfrm>
           <a:prstGeom prst="rect">
             <a:avLst/>
@@ -14061,7 +14098,7 @@
               <a:buNone/>
             </a:pPr>
             <a:r>
-              <a:rPr lang="en-IN" sz="1800">
+              <a:rPr lang="en-IN" sz="1600" dirty="0">
                 <a:solidFill>
                   <a:schemeClr val="dk1"/>
                 </a:solidFill>
@@ -14083,8 +14120,8 @@
         </p:nvSpPr>
         <p:spPr>
           <a:xfrm>
-            <a:off x="1751012" y="5950872"/>
-            <a:ext cx="838200" cy="369332"/>
+            <a:off x="4499847" y="5966790"/>
+            <a:ext cx="499120" cy="369332"/>
           </a:xfrm>
           <a:prstGeom prst="rect">
             <a:avLst/>
@@ -14107,7 +14144,7 @@
               <a:buNone/>
             </a:pPr>
             <a:r>
-              <a:rPr lang="en-IN" sz="1800">
+              <a:rPr lang="en-IN" sz="1600" dirty="0">
                 <a:solidFill>
                   <a:schemeClr val="dk1"/>
                 </a:solidFill>
@@ -14531,8 +14568,8 @@
         </p:nvSpPr>
         <p:spPr>
           <a:xfrm>
-            <a:off x="1751012" y="2447785"/>
-            <a:ext cx="1792288" cy="338554"/>
+            <a:off x="482600" y="2447785"/>
+            <a:ext cx="820402" cy="338554"/>
           </a:xfrm>
           <a:prstGeom prst="rect">
             <a:avLst/>
@@ -14550,12 +14587,779 @@
                 <a:latin typeface="Calibri" pitchFamily="34" charset="0"/>
                 <a:cs typeface="Calibri" pitchFamily="34" charset="0"/>
               </a:rPr>
-              <a:t>Online / Offline</a:t>
+              <a:t>Offline </a:t>
             </a:r>
             <a:endParaRPr lang="en-US" sz="1600" dirty="0">
               <a:latin typeface="Calibri" pitchFamily="34" charset="0"/>
               <a:cs typeface="Calibri" pitchFamily="34" charset="0"/>
             </a:endParaRPr>
+          </a:p>
+        </p:txBody>
+      </p:sp>
+      <p:sp>
+        <p:nvSpPr>
+          <p:cNvPr id="41" name="Shape 105"/>
+          <p:cNvSpPr txBox="1"/>
+          <p:nvPr/>
+        </p:nvSpPr>
+        <p:spPr>
+          <a:xfrm>
+            <a:off x="2527300" y="2807849"/>
+            <a:ext cx="1905001" cy="1088836"/>
+          </a:xfrm>
+          <a:prstGeom prst="rect">
+            <a:avLst/>
+          </a:prstGeom>
+          <a:noFill/>
+          <a:ln w="9525" cap="flat" cmpd="sng">
+            <a:solidFill>
+              <a:schemeClr val="dk1"/>
+            </a:solidFill>
+            <a:prstDash val="solid"/>
+            <a:round/>
+            <a:headEnd type="none" w="med" len="med"/>
+            <a:tailEnd type="none" w="med" len="med"/>
+          </a:ln>
+        </p:spPr>
+        <p:txBody>
+          <a:bodyPr wrap="square" lIns="91425" tIns="45700" rIns="91425" bIns="45700" anchor="t" anchorCtr="0">
+            <a:noAutofit/>
+          </a:bodyPr>
+          <a:lstStyle/>
+          <a:p>
+            <a:pPr marL="0" marR="0" lvl="0" indent="0" algn="l" rtl="0">
+              <a:spcBef>
+                <a:spcPts val="0"/>
+              </a:spcBef>
+              <a:buNone/>
+            </a:pPr>
+            <a:r>
+              <a:rPr lang="en-IN" sz="1600" dirty="0">
+                <a:solidFill>
+                  <a:schemeClr val="dk1"/>
+                </a:solidFill>
+                <a:latin typeface="Calibri"/>
+                <a:ea typeface="Calibri"/>
+                <a:cs typeface="Calibri"/>
+                <a:sym typeface="Calibri"/>
+              </a:rPr>
+              <a:t>Query to check the existence of hash in </a:t>
+            </a:r>
+            <a:r>
+              <a:rPr lang="en-IN" sz="1600" dirty="0" smtClean="0">
+                <a:solidFill>
+                  <a:schemeClr val="dk1"/>
+                </a:solidFill>
+                <a:latin typeface="Calibri"/>
+                <a:ea typeface="Calibri"/>
+                <a:cs typeface="Calibri"/>
+                <a:sym typeface="Calibri"/>
+              </a:rPr>
+              <a:t>the probabilistic database</a:t>
+            </a:r>
+            <a:endParaRPr lang="en-IN" sz="1600" dirty="0">
+              <a:solidFill>
+                <a:schemeClr val="dk1"/>
+              </a:solidFill>
+              <a:latin typeface="Calibri"/>
+              <a:ea typeface="Calibri"/>
+              <a:cs typeface="Calibri"/>
+              <a:sym typeface="Calibri"/>
+            </a:endParaRPr>
+          </a:p>
+        </p:txBody>
+      </p:sp>
+      <p:cxnSp>
+        <p:nvCxnSpPr>
+          <p:cNvPr id="9" name="Straight Connector 8"/>
+          <p:cNvCxnSpPr/>
+          <p:nvPr/>
+        </p:nvCxnSpPr>
+        <p:spPr>
+          <a:xfrm>
+            <a:off x="1581150" y="2596921"/>
+            <a:ext cx="1864487" cy="0"/>
+          </a:xfrm>
+          <a:prstGeom prst="line">
+            <a:avLst/>
+          </a:prstGeom>
+          <a:ln>
+            <a:solidFill>
+              <a:schemeClr val="tx1"/>
+            </a:solidFill>
+          </a:ln>
+        </p:spPr>
+        <p:style>
+          <a:lnRef idx="1">
+            <a:schemeClr val="accent1"/>
+          </a:lnRef>
+          <a:fillRef idx="0">
+            <a:schemeClr val="accent1"/>
+          </a:fillRef>
+          <a:effectRef idx="0">
+            <a:schemeClr val="accent1"/>
+          </a:effectRef>
+          <a:fontRef idx="minor">
+            <a:schemeClr val="tx1"/>
+          </a:fontRef>
+        </p:style>
+      </p:cxnSp>
+      <p:cxnSp>
+        <p:nvCxnSpPr>
+          <p:cNvPr id="11" name="Straight Arrow Connector 10"/>
+          <p:cNvCxnSpPr/>
+          <p:nvPr/>
+        </p:nvCxnSpPr>
+        <p:spPr>
+          <a:xfrm>
+            <a:off x="3445637" y="2596921"/>
+            <a:ext cx="0" cy="189418"/>
+          </a:xfrm>
+          <a:prstGeom prst="straightConnector1">
+            <a:avLst/>
+          </a:prstGeom>
+          <a:ln>
+            <a:solidFill>
+              <a:schemeClr val="tx1"/>
+            </a:solidFill>
+            <a:tailEnd type="arrow"/>
+          </a:ln>
+        </p:spPr>
+        <p:style>
+          <a:lnRef idx="1">
+            <a:schemeClr val="accent1"/>
+          </a:lnRef>
+          <a:fillRef idx="0">
+            <a:schemeClr val="accent1"/>
+          </a:fillRef>
+          <a:effectRef idx="0">
+            <a:schemeClr val="accent1"/>
+          </a:effectRef>
+          <a:fontRef idx="minor">
+            <a:schemeClr val="tx1"/>
+          </a:fontRef>
+        </p:style>
+      </p:cxnSp>
+      <p:sp>
+        <p:nvSpPr>
+          <p:cNvPr id="46" name="TextBox 45"/>
+          <p:cNvSpPr txBox="1"/>
+          <p:nvPr/>
+        </p:nvSpPr>
+        <p:spPr>
+          <a:xfrm>
+            <a:off x="3563601" y="2437029"/>
+            <a:ext cx="868699" cy="338554"/>
+          </a:xfrm>
+          <a:prstGeom prst="rect">
+            <a:avLst/>
+          </a:prstGeom>
+          <a:noFill/>
+        </p:spPr>
+        <p:txBody>
+          <a:bodyPr wrap="square" rtlCol="0">
+            <a:spAutoFit/>
+          </a:bodyPr>
+          <a:lstStyle/>
+          <a:p>
+            <a:r>
+              <a:rPr lang="en-IN" sz="1600" dirty="0" smtClean="0">
+                <a:latin typeface="Calibri" pitchFamily="34" charset="0"/>
+                <a:cs typeface="Calibri" pitchFamily="34" charset="0"/>
+              </a:rPr>
+              <a:t>Online </a:t>
+            </a:r>
+            <a:endParaRPr lang="en-US" sz="1600" dirty="0">
+              <a:latin typeface="Calibri" pitchFamily="34" charset="0"/>
+              <a:cs typeface="Calibri" pitchFamily="34" charset="0"/>
+            </a:endParaRPr>
+          </a:p>
+        </p:txBody>
+      </p:sp>
+      <p:sp>
+        <p:nvSpPr>
+          <p:cNvPr id="54" name="Shape 105"/>
+          <p:cNvSpPr txBox="1"/>
+          <p:nvPr/>
+        </p:nvSpPr>
+        <p:spPr>
+          <a:xfrm>
+            <a:off x="3563600" y="4296858"/>
+            <a:ext cx="1872495" cy="1140120"/>
+          </a:xfrm>
+          <a:prstGeom prst="rect">
+            <a:avLst/>
+          </a:prstGeom>
+          <a:noFill/>
+          <a:ln w="9525" cap="flat" cmpd="sng">
+            <a:solidFill>
+              <a:schemeClr val="dk1"/>
+            </a:solidFill>
+            <a:prstDash val="solid"/>
+            <a:round/>
+            <a:headEnd type="none" w="med" len="med"/>
+            <a:tailEnd type="none" w="med" len="med"/>
+          </a:ln>
+        </p:spPr>
+        <p:txBody>
+          <a:bodyPr wrap="square" lIns="91425" tIns="45700" rIns="91425" bIns="45700" anchor="t" anchorCtr="0">
+            <a:noAutofit/>
+          </a:bodyPr>
+          <a:lstStyle/>
+          <a:p>
+            <a:pPr lvl="0"/>
+            <a:r>
+              <a:rPr lang="en-IN" sz="1600" dirty="0">
+                <a:solidFill>
+                  <a:schemeClr val="dk1"/>
+                </a:solidFill>
+                <a:latin typeface="Calibri"/>
+                <a:ea typeface="Calibri"/>
+                <a:cs typeface="Calibri"/>
+                <a:sym typeface="Calibri"/>
+              </a:rPr>
+              <a:t>Query to check the existence of hash in the </a:t>
+            </a:r>
+            <a:r>
+              <a:rPr lang="en-IN" sz="1600" dirty="0" smtClean="0">
+                <a:solidFill>
+                  <a:schemeClr val="dk1"/>
+                </a:solidFill>
+                <a:latin typeface="Calibri"/>
+                <a:ea typeface="Calibri"/>
+                <a:cs typeface="Calibri"/>
+                <a:sym typeface="Calibri"/>
+              </a:rPr>
+              <a:t>local database for confirmation</a:t>
+            </a:r>
+            <a:endParaRPr lang="en-IN" sz="1600" dirty="0">
+              <a:solidFill>
+                <a:schemeClr val="dk1"/>
+              </a:solidFill>
+              <a:latin typeface="Calibri"/>
+              <a:ea typeface="Calibri"/>
+              <a:cs typeface="Calibri"/>
+              <a:sym typeface="Calibri"/>
+            </a:endParaRPr>
+          </a:p>
+        </p:txBody>
+      </p:sp>
+      <p:cxnSp>
+        <p:nvCxnSpPr>
+          <p:cNvPr id="55" name="Shape 117"/>
+          <p:cNvCxnSpPr/>
+          <p:nvPr/>
+        </p:nvCxnSpPr>
+        <p:spPr>
+          <a:xfrm>
+            <a:off x="2629520" y="3896685"/>
+            <a:ext cx="0" cy="436668"/>
+          </a:xfrm>
+          <a:prstGeom prst="straightConnector1">
+            <a:avLst/>
+          </a:prstGeom>
+          <a:noFill/>
+          <a:ln w="9525" cap="flat" cmpd="sng">
+            <a:solidFill>
+              <a:schemeClr val="dk1"/>
+            </a:solidFill>
+            <a:prstDash val="solid"/>
+            <a:round/>
+            <a:headEnd type="none" w="med" len="med"/>
+            <a:tailEnd type="stealth" w="lg" len="lg"/>
+          </a:ln>
+        </p:spPr>
+      </p:cxnSp>
+      <p:sp>
+        <p:nvSpPr>
+          <p:cNvPr id="56" name="Shape 125"/>
+          <p:cNvSpPr txBox="1"/>
+          <p:nvPr/>
+        </p:nvSpPr>
+        <p:spPr>
+          <a:xfrm>
+            <a:off x="1693471" y="3916354"/>
+            <a:ext cx="1362858" cy="436669"/>
+          </a:xfrm>
+          <a:prstGeom prst="rect">
+            <a:avLst/>
+          </a:prstGeom>
+          <a:noFill/>
+          <a:ln>
+            <a:noFill/>
+          </a:ln>
+        </p:spPr>
+        <p:txBody>
+          <a:bodyPr wrap="square" lIns="91425" tIns="45700" rIns="91425" bIns="45700" anchor="t" anchorCtr="0">
+            <a:noAutofit/>
+          </a:bodyPr>
+          <a:lstStyle/>
+          <a:p>
+            <a:pPr marL="0" marR="0" lvl="0" indent="0" algn="l" rtl="0">
+              <a:spcBef>
+                <a:spcPts val="0"/>
+              </a:spcBef>
+              <a:buNone/>
+            </a:pPr>
+            <a:r>
+              <a:rPr lang="en-IN" sz="1600" dirty="0" smtClean="0">
+                <a:solidFill>
+                  <a:schemeClr val="dk1"/>
+                </a:solidFill>
+                <a:latin typeface="Calibri"/>
+                <a:ea typeface="Calibri"/>
+                <a:cs typeface="Calibri"/>
+                <a:sym typeface="Calibri"/>
+              </a:rPr>
+              <a:t>Definitely   No</a:t>
+            </a:r>
+            <a:endParaRPr lang="en-IN" sz="1600" dirty="0">
+              <a:solidFill>
+                <a:schemeClr val="dk1"/>
+              </a:solidFill>
+              <a:latin typeface="Calibri"/>
+              <a:ea typeface="Calibri"/>
+              <a:cs typeface="Calibri"/>
+              <a:sym typeface="Calibri"/>
+            </a:endParaRPr>
+          </a:p>
+        </p:txBody>
+      </p:sp>
+      <p:cxnSp>
+        <p:nvCxnSpPr>
+          <p:cNvPr id="64" name="Shape 121"/>
+          <p:cNvCxnSpPr/>
+          <p:nvPr/>
+        </p:nvCxnSpPr>
+        <p:spPr>
+          <a:xfrm>
+            <a:off x="4010650" y="3896685"/>
+            <a:ext cx="0" cy="389496"/>
+          </a:xfrm>
+          <a:prstGeom prst="straightConnector1">
+            <a:avLst/>
+          </a:prstGeom>
+          <a:noFill/>
+          <a:ln w="9525" cap="flat" cmpd="sng">
+            <a:solidFill>
+              <a:schemeClr val="dk1"/>
+            </a:solidFill>
+            <a:prstDash val="solid"/>
+            <a:round/>
+            <a:headEnd type="none" w="med" len="med"/>
+            <a:tailEnd type="stealth" w="lg" len="lg"/>
+          </a:ln>
+        </p:spPr>
+      </p:cxnSp>
+      <p:sp>
+        <p:nvSpPr>
+          <p:cNvPr id="67" name="Shape 125"/>
+          <p:cNvSpPr txBox="1"/>
+          <p:nvPr/>
+        </p:nvSpPr>
+        <p:spPr>
+          <a:xfrm>
+            <a:off x="4085745" y="3905687"/>
+            <a:ext cx="1206335" cy="436669"/>
+          </a:xfrm>
+          <a:prstGeom prst="rect">
+            <a:avLst/>
+          </a:prstGeom>
+          <a:noFill/>
+          <a:ln>
+            <a:noFill/>
+          </a:ln>
+        </p:spPr>
+        <p:txBody>
+          <a:bodyPr wrap="square" lIns="91425" tIns="45700" rIns="91425" bIns="45700" anchor="t" anchorCtr="0">
+            <a:noAutofit/>
+          </a:bodyPr>
+          <a:lstStyle/>
+          <a:p>
+            <a:pPr marL="0" marR="0" lvl="0" indent="0" algn="l" rtl="0">
+              <a:spcBef>
+                <a:spcPts val="0"/>
+              </a:spcBef>
+              <a:buNone/>
+            </a:pPr>
+            <a:r>
+              <a:rPr lang="en-IN" sz="1600" dirty="0" smtClean="0">
+                <a:solidFill>
+                  <a:schemeClr val="dk1"/>
+                </a:solidFill>
+                <a:latin typeface="Calibri"/>
+                <a:ea typeface="Calibri"/>
+                <a:cs typeface="Calibri"/>
+                <a:sym typeface="Calibri"/>
+              </a:rPr>
+              <a:t>Possibly Yes</a:t>
+            </a:r>
+            <a:endParaRPr lang="en-IN" sz="1600" dirty="0">
+              <a:solidFill>
+                <a:schemeClr val="dk1"/>
+              </a:solidFill>
+              <a:latin typeface="Calibri"/>
+              <a:ea typeface="Calibri"/>
+              <a:cs typeface="Calibri"/>
+              <a:sym typeface="Calibri"/>
+            </a:endParaRPr>
+          </a:p>
+        </p:txBody>
+      </p:sp>
+      <p:cxnSp>
+        <p:nvCxnSpPr>
+          <p:cNvPr id="68" name="Shape 123"/>
+          <p:cNvCxnSpPr>
+            <a:endCxn id="108" idx="3"/>
+          </p:cNvCxnSpPr>
+          <p:nvPr/>
+        </p:nvCxnSpPr>
+        <p:spPr>
+          <a:xfrm flipH="1" flipV="1">
+            <a:off x="2836070" y="4502630"/>
+            <a:ext cx="727530" cy="1"/>
+          </a:xfrm>
+          <a:prstGeom prst="straightConnector1">
+            <a:avLst/>
+          </a:prstGeom>
+          <a:noFill/>
+          <a:ln w="9525" cap="flat" cmpd="sng">
+            <a:solidFill>
+              <a:schemeClr val="dk1"/>
+            </a:solidFill>
+            <a:prstDash val="solid"/>
+            <a:round/>
+            <a:headEnd type="none" w="med" len="med"/>
+            <a:tailEnd type="stealth" w="lg" len="lg"/>
+          </a:ln>
+        </p:spPr>
+      </p:cxnSp>
+      <p:cxnSp>
+        <p:nvCxnSpPr>
+          <p:cNvPr id="74" name="Straight Connector 73"/>
+          <p:cNvCxnSpPr/>
+          <p:nvPr/>
+        </p:nvCxnSpPr>
+        <p:spPr>
+          <a:xfrm>
+            <a:off x="2978940" y="5222822"/>
+            <a:ext cx="600837" cy="0"/>
+          </a:xfrm>
+          <a:prstGeom prst="line">
+            <a:avLst/>
+          </a:prstGeom>
+          <a:ln>
+            <a:solidFill>
+              <a:schemeClr val="tx1"/>
+            </a:solidFill>
+          </a:ln>
+        </p:spPr>
+        <p:style>
+          <a:lnRef idx="1">
+            <a:schemeClr val="accent1"/>
+          </a:lnRef>
+          <a:fillRef idx="0">
+            <a:schemeClr val="accent1"/>
+          </a:fillRef>
+          <a:effectRef idx="0">
+            <a:schemeClr val="accent1"/>
+          </a:effectRef>
+          <a:fontRef idx="minor">
+            <a:schemeClr val="tx1"/>
+          </a:fontRef>
+        </p:style>
+      </p:cxnSp>
+      <p:cxnSp>
+        <p:nvCxnSpPr>
+          <p:cNvPr id="77" name="Shape 121"/>
+          <p:cNvCxnSpPr/>
+          <p:nvPr/>
+        </p:nvCxnSpPr>
+        <p:spPr>
+          <a:xfrm>
+            <a:off x="2978940" y="5222822"/>
+            <a:ext cx="0" cy="389496"/>
+          </a:xfrm>
+          <a:prstGeom prst="straightConnector1">
+            <a:avLst/>
+          </a:prstGeom>
+          <a:noFill/>
+          <a:ln w="9525" cap="flat" cmpd="sng">
+            <a:solidFill>
+              <a:schemeClr val="dk1"/>
+            </a:solidFill>
+            <a:prstDash val="solid"/>
+            <a:round/>
+            <a:headEnd type="none" w="med" len="med"/>
+            <a:tailEnd type="stealth" w="lg" len="lg"/>
+          </a:ln>
+        </p:spPr>
+      </p:cxnSp>
+      <p:sp>
+        <p:nvSpPr>
+          <p:cNvPr id="78" name="Shape 126"/>
+          <p:cNvSpPr txBox="1"/>
+          <p:nvPr/>
+        </p:nvSpPr>
+        <p:spPr>
+          <a:xfrm>
+            <a:off x="2387600" y="5081943"/>
+            <a:ext cx="510550" cy="369332"/>
+          </a:xfrm>
+          <a:prstGeom prst="rect">
+            <a:avLst/>
+          </a:prstGeom>
+          <a:noFill/>
+          <a:ln>
+            <a:noFill/>
+          </a:ln>
+        </p:spPr>
+        <p:txBody>
+          <a:bodyPr wrap="square" lIns="91425" tIns="45700" rIns="91425" bIns="45700" anchor="t" anchorCtr="0">
+            <a:noAutofit/>
+          </a:bodyPr>
+          <a:lstStyle/>
+          <a:p>
+            <a:pPr marL="0" marR="0" lvl="0" indent="0" algn="l" rtl="0">
+              <a:spcBef>
+                <a:spcPts val="0"/>
+              </a:spcBef>
+              <a:buNone/>
+            </a:pPr>
+            <a:r>
+              <a:rPr lang="en-IN" sz="1600" dirty="0" smtClean="0">
+                <a:solidFill>
+                  <a:schemeClr val="dk1"/>
+                </a:solidFill>
+                <a:latin typeface="Calibri"/>
+                <a:ea typeface="Calibri"/>
+                <a:cs typeface="Calibri"/>
+                <a:sym typeface="Calibri"/>
+              </a:rPr>
+              <a:t>Yes</a:t>
+            </a:r>
+            <a:endParaRPr lang="en-IN" sz="1600" dirty="0">
+              <a:solidFill>
+                <a:schemeClr val="dk1"/>
+              </a:solidFill>
+              <a:latin typeface="Calibri"/>
+              <a:ea typeface="Calibri"/>
+              <a:cs typeface="Calibri"/>
+              <a:sym typeface="Calibri"/>
+            </a:endParaRPr>
+          </a:p>
+        </p:txBody>
+      </p:sp>
+      <p:sp>
+        <p:nvSpPr>
+          <p:cNvPr id="79" name="Shape 111"/>
+          <p:cNvSpPr txBox="1"/>
+          <p:nvPr/>
+        </p:nvSpPr>
+        <p:spPr>
+          <a:xfrm>
+            <a:off x="3779912" y="6289261"/>
+            <a:ext cx="1905000" cy="338554"/>
+          </a:xfrm>
+          <a:prstGeom prst="rect">
+            <a:avLst/>
+          </a:prstGeom>
+          <a:noFill/>
+          <a:ln w="9525" cap="flat" cmpd="sng">
+            <a:solidFill>
+              <a:schemeClr val="dk1"/>
+            </a:solidFill>
+            <a:prstDash val="solid"/>
+            <a:round/>
+            <a:headEnd type="none" w="med" len="med"/>
+            <a:tailEnd type="none" w="med" len="med"/>
+          </a:ln>
+        </p:spPr>
+        <p:txBody>
+          <a:bodyPr wrap="square" lIns="91425" tIns="45700" rIns="91425" bIns="45700" anchor="t" anchorCtr="0">
+            <a:noAutofit/>
+          </a:bodyPr>
+          <a:lstStyle/>
+          <a:p>
+            <a:pPr marL="0" marR="0" lvl="0" indent="0" algn="l" rtl="0">
+              <a:spcBef>
+                <a:spcPts val="0"/>
+              </a:spcBef>
+              <a:buNone/>
+            </a:pPr>
+            <a:r>
+              <a:rPr lang="en-IN" sz="1600" dirty="0" smtClean="0">
+                <a:solidFill>
+                  <a:schemeClr val="dk1"/>
+                </a:solidFill>
+                <a:latin typeface="Calibri"/>
+                <a:ea typeface="Calibri"/>
+                <a:cs typeface="Calibri"/>
+                <a:sym typeface="Calibri"/>
+              </a:rPr>
+              <a:t>Allow data transfer</a:t>
+            </a:r>
+            <a:endParaRPr lang="en-IN" sz="1600" dirty="0">
+              <a:solidFill>
+                <a:schemeClr val="dk1"/>
+              </a:solidFill>
+              <a:latin typeface="Calibri"/>
+              <a:ea typeface="Calibri"/>
+              <a:cs typeface="Calibri"/>
+              <a:sym typeface="Calibri"/>
+            </a:endParaRPr>
+          </a:p>
+        </p:txBody>
+      </p:sp>
+      <p:cxnSp>
+        <p:nvCxnSpPr>
+          <p:cNvPr id="83" name="Shape 117"/>
+          <p:cNvCxnSpPr/>
+          <p:nvPr/>
+        </p:nvCxnSpPr>
+        <p:spPr>
+          <a:xfrm>
+            <a:off x="4502055" y="5966790"/>
+            <a:ext cx="0" cy="322471"/>
+          </a:xfrm>
+          <a:prstGeom prst="straightConnector1">
+            <a:avLst/>
+          </a:prstGeom>
+          <a:noFill/>
+          <a:ln w="9525" cap="flat" cmpd="sng">
+            <a:solidFill>
+              <a:schemeClr val="dk1"/>
+            </a:solidFill>
+            <a:prstDash val="solid"/>
+            <a:round/>
+            <a:headEnd type="none" w="med" len="med"/>
+            <a:tailEnd type="stealth" w="lg" len="lg"/>
+          </a:ln>
+        </p:spPr>
+      </p:cxnSp>
+      <p:cxnSp>
+        <p:nvCxnSpPr>
+          <p:cNvPr id="84" name="Shape 121"/>
+          <p:cNvCxnSpPr>
+            <a:stCxn id="111" idx="3"/>
+          </p:cNvCxnSpPr>
+          <p:nvPr/>
+        </p:nvCxnSpPr>
+        <p:spPr>
+          <a:xfrm>
+            <a:off x="5952887" y="5781595"/>
+            <a:ext cx="419313" cy="0"/>
+          </a:xfrm>
+          <a:prstGeom prst="straightConnector1">
+            <a:avLst/>
+          </a:prstGeom>
+          <a:noFill/>
+          <a:ln w="9525" cap="flat" cmpd="sng">
+            <a:solidFill>
+              <a:schemeClr val="dk1"/>
+            </a:solidFill>
+            <a:prstDash val="solid"/>
+            <a:round/>
+            <a:headEnd type="none" w="med" len="med"/>
+            <a:tailEnd type="stealth" w="lg" len="lg"/>
+          </a:ln>
+        </p:spPr>
+      </p:cxnSp>
+      <p:sp>
+        <p:nvSpPr>
+          <p:cNvPr id="88" name="Shape 108"/>
+          <p:cNvSpPr txBox="1"/>
+          <p:nvPr/>
+        </p:nvSpPr>
+        <p:spPr>
+          <a:xfrm>
+            <a:off x="6349999" y="5628236"/>
+            <a:ext cx="685800" cy="338554"/>
+          </a:xfrm>
+          <a:prstGeom prst="rect">
+            <a:avLst/>
+          </a:prstGeom>
+          <a:noFill/>
+          <a:ln w="9525" cap="flat" cmpd="sng">
+            <a:solidFill>
+              <a:schemeClr val="dk1"/>
+            </a:solidFill>
+            <a:prstDash val="solid"/>
+            <a:round/>
+            <a:headEnd type="none" w="med" len="med"/>
+            <a:tailEnd type="none" w="med" len="med"/>
+          </a:ln>
+        </p:spPr>
+        <p:txBody>
+          <a:bodyPr wrap="square" lIns="91425" tIns="45700" rIns="91425" bIns="45700" anchor="t" anchorCtr="0">
+            <a:noAutofit/>
+          </a:bodyPr>
+          <a:lstStyle/>
+          <a:p>
+            <a:pPr marL="0" marR="0" lvl="0" indent="0" algn="l" rtl="0">
+              <a:spcBef>
+                <a:spcPts val="0"/>
+              </a:spcBef>
+              <a:buNone/>
+            </a:pPr>
+            <a:r>
+              <a:rPr lang="en-IN" sz="1600" dirty="0">
+                <a:solidFill>
+                  <a:schemeClr val="dk1"/>
+                </a:solidFill>
+                <a:latin typeface="Calibri"/>
+                <a:ea typeface="Calibri"/>
+                <a:cs typeface="Calibri"/>
+                <a:sym typeface="Calibri"/>
+              </a:rPr>
+              <a:t>Block</a:t>
+            </a:r>
+          </a:p>
+        </p:txBody>
+      </p:sp>
+      <p:sp>
+        <p:nvSpPr>
+          <p:cNvPr id="89" name="Shape 126"/>
+          <p:cNvSpPr txBox="1"/>
+          <p:nvPr/>
+        </p:nvSpPr>
+        <p:spPr>
+          <a:xfrm>
+            <a:off x="5991537" y="5266609"/>
+            <a:ext cx="510550" cy="369332"/>
+          </a:xfrm>
+          <a:prstGeom prst="rect">
+            <a:avLst/>
+          </a:prstGeom>
+          <a:noFill/>
+          <a:ln>
+            <a:noFill/>
+          </a:ln>
+        </p:spPr>
+        <p:txBody>
+          <a:bodyPr wrap="square" lIns="91425" tIns="45700" rIns="91425" bIns="45700" anchor="t" anchorCtr="0">
+            <a:noAutofit/>
+          </a:bodyPr>
+          <a:lstStyle/>
+          <a:p>
+            <a:pPr marL="0" marR="0" lvl="0" indent="0" algn="l" rtl="0">
+              <a:spcBef>
+                <a:spcPts val="0"/>
+              </a:spcBef>
+              <a:buNone/>
+            </a:pPr>
+            <a:r>
+              <a:rPr lang="en-IN" sz="1600" dirty="0">
+                <a:solidFill>
+                  <a:schemeClr val="dk1"/>
+                </a:solidFill>
+                <a:latin typeface="Calibri"/>
+                <a:ea typeface="Calibri"/>
+                <a:cs typeface="Calibri"/>
+                <a:sym typeface="Calibri"/>
+              </a:rPr>
+              <a:t>No</a:t>
+            </a:r>
           </a:p>
         </p:txBody>
       </p:sp>

</xml_diff>

<commit_message>
added novelty and security
</commit_message>
<xml_diff>
--- a/Gov_templates/USB_whitelist.pptx
+++ b/Gov_templates/USB_whitelist.pptx
@@ -9,9 +9,9 @@
   </p:notesMasterIdLst>
   <p:sldIdLst>
     <p:sldId id="256" r:id="rId2"/>
-    <p:sldId id="257" r:id="rId3"/>
-    <p:sldId id="259" r:id="rId4"/>
-    <p:sldId id="258" r:id="rId5"/>
+    <p:sldId id="258" r:id="rId3"/>
+    <p:sldId id="257" r:id="rId4"/>
+    <p:sldId id="259" r:id="rId5"/>
   </p:sldIdLst>
   <p:sldSz cx="9144000" cy="6858000" type="screen4x3"/>
   <p:notesSz cx="6858000" cy="9144000"/>
@@ -610,7 +610,7 @@
   <p:cSld>
     <p:spTree>
       <p:nvGrpSpPr>
-        <p:cNvPr id="1" name="Shape 88"/>
+        <p:cNvPr id="1" name="Shape 97"/>
         <p:cNvGrpSpPr/>
         <p:nvPr/>
       </p:nvGrpSpPr>
@@ -624,7 +624,7 @@
       </p:grpSpPr>
       <p:sp>
         <p:nvSpPr>
-          <p:cNvPr id="89" name="Shape 89"/>
+          <p:cNvPr id="98" name="Shape 98"/>
           <p:cNvSpPr txBox="1">
             <a:spLocks noGrp="1"/>
           </p:cNvSpPr>
@@ -663,7 +663,7 @@
       </p:sp>
       <p:sp>
         <p:nvSpPr>
-          <p:cNvPr id="90" name="Shape 90"/>
+          <p:cNvPr id="99" name="Shape 99"/>
           <p:cNvSpPr>
             <a:spLocks noGrp="1" noRot="1" noChangeAspect="1"/>
           </p:cNvSpPr>
@@ -715,7 +715,7 @@
   <p:cSld>
     <p:spTree>
       <p:nvGrpSpPr>
-        <p:cNvPr id="1" name="Shape 97"/>
+        <p:cNvPr id="1" name="Shape 88"/>
         <p:cNvGrpSpPr/>
         <p:nvPr/>
       </p:nvGrpSpPr>
@@ -729,7 +729,7 @@
       </p:grpSpPr>
       <p:sp>
         <p:nvSpPr>
-          <p:cNvPr id="98" name="Shape 98"/>
+          <p:cNvPr id="89" name="Shape 89"/>
           <p:cNvSpPr txBox="1">
             <a:spLocks noGrp="1"/>
           </p:cNvSpPr>
@@ -768,7 +768,7 @@
       </p:sp>
       <p:sp>
         <p:nvSpPr>
-          <p:cNvPr id="99" name="Shape 99"/>
+          <p:cNvPr id="90" name="Shape 90"/>
           <p:cNvSpPr>
             <a:spLocks noGrp="1" noRot="1" noChangeAspect="1"/>
           </p:cNvSpPr>
@@ -12306,882 +12306,6 @@
   <p:cSld>
     <p:spTree>
       <p:nvGrpSpPr>
-        <p:cNvPr id="1" name="Shape 91"/>
-        <p:cNvGrpSpPr/>
-        <p:nvPr/>
-      </p:nvGrpSpPr>
-      <p:grpSpPr>
-        <a:xfrm>
-          <a:off x="0" y="0"/>
-          <a:ext cx="0" cy="0"/>
-          <a:chOff x="0" y="0"/>
-          <a:chExt cx="0" cy="0"/>
-        </a:xfrm>
-      </p:grpSpPr>
-      <p:sp>
-        <p:nvSpPr>
-          <p:cNvPr id="92" name="Shape 92"/>
-          <p:cNvSpPr txBox="1"/>
-          <p:nvPr/>
-        </p:nvSpPr>
-        <p:spPr>
-          <a:xfrm>
-            <a:off x="177800" y="280249"/>
-            <a:ext cx="8839200" cy="2284655"/>
-          </a:xfrm>
-          <a:prstGeom prst="rect">
-            <a:avLst/>
-          </a:prstGeom>
-          <a:noFill/>
-          <a:ln>
-            <a:noFill/>
-          </a:ln>
-        </p:spPr>
-        <p:txBody>
-          <a:bodyPr wrap="square" lIns="91425" tIns="45700" rIns="91425" bIns="45700" anchor="t" anchorCtr="0">
-            <a:noAutofit/>
-          </a:bodyPr>
-          <a:lstStyle/>
-          <a:p>
-            <a:pPr marL="285750" marR="0" lvl="0" indent="-285750" algn="l" rtl="0">
-              <a:spcBef>
-                <a:spcPts val="0"/>
-              </a:spcBef>
-              <a:buClr>
-                <a:schemeClr val="dk1"/>
-              </a:buClr>
-              <a:buSzPts val="1800"/>
-              <a:buFont typeface="Arial"/>
-              <a:buChar char="•"/>
-            </a:pPr>
-            <a:r>
-              <a:rPr lang="en-IN" sz="1600" b="0" i="0" u="none" strike="noStrike" cap="none" dirty="0">
-                <a:solidFill>
-                  <a:schemeClr val="dk1"/>
-                </a:solidFill>
-                <a:latin typeface="Calibri"/>
-                <a:ea typeface="Calibri"/>
-                <a:cs typeface="Calibri"/>
-                <a:sym typeface="Calibri"/>
-              </a:rPr>
-              <a:t>The encrypted </a:t>
-            </a:r>
-            <a:r>
-              <a:rPr lang="en-IN" sz="1600" b="0" i="0" u="none" strike="noStrike" cap="none" dirty="0" smtClean="0">
-                <a:solidFill>
-                  <a:schemeClr val="dk1"/>
-                </a:solidFill>
-                <a:latin typeface="Calibri"/>
-                <a:ea typeface="Calibri"/>
-                <a:cs typeface="Calibri"/>
-                <a:sym typeface="Calibri"/>
-              </a:rPr>
-              <a:t>file system </a:t>
-            </a:r>
-            <a:r>
-              <a:rPr lang="en-IN" sz="1600" b="0" i="0" u="none" strike="noStrike" cap="none" dirty="0">
-                <a:solidFill>
-                  <a:schemeClr val="dk1"/>
-                </a:solidFill>
-                <a:latin typeface="Calibri"/>
-                <a:ea typeface="Calibri"/>
-                <a:cs typeface="Calibri"/>
-                <a:sym typeface="Calibri"/>
-              </a:rPr>
-              <a:t>will be created on the storage device when it is connected to the blockchain system for the first time for registration on the database. </a:t>
-            </a:r>
-          </a:p>
-          <a:p>
-            <a:pPr marL="285750" marR="0" lvl="0" indent="-285750" algn="l" rtl="0">
-              <a:spcBef>
-                <a:spcPts val="0"/>
-              </a:spcBef>
-              <a:buClr>
-                <a:schemeClr val="dk1"/>
-              </a:buClr>
-              <a:buSzPts val="1800"/>
-              <a:buFont typeface="Arial"/>
-              <a:buChar char="•"/>
-            </a:pPr>
-            <a:r>
-              <a:rPr lang="en-IN" sz="1600" b="0" i="0" u="none" strike="noStrike" cap="none" dirty="0">
-                <a:solidFill>
-                  <a:schemeClr val="dk1"/>
-                </a:solidFill>
-                <a:latin typeface="Calibri"/>
-                <a:ea typeface="Calibri"/>
-                <a:cs typeface="Calibri"/>
-                <a:sym typeface="Calibri"/>
-              </a:rPr>
-              <a:t>The computers which are offline </a:t>
-            </a:r>
-            <a:r>
-              <a:rPr lang="en-IN" sz="1600" b="0" i="0" u="none" strike="noStrike" cap="none" dirty="0" smtClean="0">
-                <a:solidFill>
-                  <a:schemeClr val="dk1"/>
-                </a:solidFill>
-                <a:latin typeface="Calibri"/>
-                <a:ea typeface="Calibri"/>
-                <a:cs typeface="Calibri"/>
-                <a:sym typeface="Calibri"/>
-              </a:rPr>
-              <a:t>will also use </a:t>
-            </a:r>
-            <a:r>
-              <a:rPr lang="en-IN" sz="1600" b="0" i="0" u="none" strike="noStrike" cap="none" dirty="0">
-                <a:solidFill>
-                  <a:schemeClr val="dk1"/>
-                </a:solidFill>
-                <a:latin typeface="Calibri"/>
-                <a:ea typeface="Calibri"/>
-                <a:cs typeface="Calibri"/>
-                <a:sym typeface="Calibri"/>
-              </a:rPr>
-              <a:t>a probabilistic database of authorized MAC addresses (e.g. like Bloom filter). The driver program on the computer will check the storage device against this probabilistic database. The driver program will block the devices which are not on the whitelist. </a:t>
-            </a:r>
-          </a:p>
-          <a:p>
-            <a:pPr marL="285750" lvl="0" indent="-285750">
-              <a:buClr>
-                <a:schemeClr val="dk1"/>
-              </a:buClr>
-              <a:buSzPts val="1800"/>
-              <a:buFont typeface="Arial"/>
-              <a:buChar char="•"/>
-            </a:pPr>
-            <a:r>
-              <a:rPr lang="en-IN" sz="1600" b="0" i="0" u="none" strike="noStrike" cap="none" dirty="0">
-                <a:solidFill>
-                  <a:schemeClr val="dk1"/>
-                </a:solidFill>
-                <a:latin typeface="Calibri"/>
-                <a:ea typeface="Calibri"/>
-                <a:cs typeface="Calibri"/>
-                <a:sym typeface="Calibri"/>
-              </a:rPr>
-              <a:t>The Bloom filter database will be updated when it is connected to the internet </a:t>
-            </a:r>
-            <a:r>
-              <a:rPr lang="en-IN" sz="1600" b="0" i="0" u="none" strike="noStrike" cap="none" dirty="0" smtClean="0">
-                <a:solidFill>
-                  <a:schemeClr val="dk1"/>
-                </a:solidFill>
-                <a:latin typeface="Calibri"/>
-                <a:ea typeface="Calibri"/>
-                <a:cs typeface="Calibri"/>
-                <a:sym typeface="Calibri"/>
-              </a:rPr>
-              <a:t>periodically</a:t>
-            </a:r>
-            <a:r>
-              <a:rPr lang="en-IN" sz="1600" dirty="0" smtClean="0">
-                <a:solidFill>
-                  <a:schemeClr val="dk1"/>
-                </a:solidFill>
-                <a:latin typeface="Calibri"/>
-                <a:ea typeface="Calibri"/>
-                <a:cs typeface="Calibri"/>
-                <a:sym typeface="Calibri"/>
-              </a:rPr>
-              <a:t>. To update, the whole database is not replaced, instead the delta i.e. difference between the existing database on the Bloom filter and the local database is found and then added to the database of Bloom filter.</a:t>
-            </a:r>
-          </a:p>
-          <a:p>
-            <a:pPr marL="285750" lvl="0" indent="-285750">
-              <a:buClr>
-                <a:schemeClr val="dk1"/>
-              </a:buClr>
-              <a:buSzPts val="1800"/>
-              <a:buFont typeface="Arial"/>
-              <a:buChar char="•"/>
-            </a:pPr>
-            <a:endParaRPr lang="en-IN" sz="1600" b="0" i="0" u="none" strike="noStrike" cap="none" dirty="0">
-              <a:solidFill>
-                <a:schemeClr val="dk1"/>
-              </a:solidFill>
-              <a:latin typeface="Calibri"/>
-              <a:ea typeface="Calibri"/>
-              <a:cs typeface="Calibri"/>
-              <a:sym typeface="Calibri"/>
-            </a:endParaRPr>
-          </a:p>
-          <a:p>
-            <a:pPr marL="285750" lvl="0" indent="-285750">
-              <a:buClr>
-                <a:schemeClr val="dk1"/>
-              </a:buClr>
-              <a:buSzPts val="1800"/>
-              <a:buFont typeface="Arial"/>
-              <a:buChar char="•"/>
-            </a:pPr>
-            <a:endParaRPr lang="en-IN" sz="1600" b="0" i="0" u="none" strike="noStrike" cap="none" dirty="0">
-              <a:solidFill>
-                <a:schemeClr val="dk1"/>
-              </a:solidFill>
-              <a:latin typeface="Calibri"/>
-              <a:ea typeface="Calibri"/>
-              <a:cs typeface="Calibri"/>
-              <a:sym typeface="Calibri"/>
-            </a:endParaRPr>
-          </a:p>
-        </p:txBody>
-      </p:sp>
-      <p:sp>
-        <p:nvSpPr>
-          <p:cNvPr id="93" name="Shape 93"/>
-          <p:cNvSpPr txBox="1"/>
-          <p:nvPr/>
-        </p:nvSpPr>
-        <p:spPr>
-          <a:xfrm>
-            <a:off x="482600" y="2564904"/>
-            <a:ext cx="8229600" cy="346074"/>
-          </a:xfrm>
-          <a:prstGeom prst="rect">
-            <a:avLst/>
-          </a:prstGeom>
-          <a:noFill/>
-          <a:ln>
-            <a:noFill/>
-          </a:ln>
-        </p:spPr>
-        <p:txBody>
-          <a:bodyPr wrap="square" lIns="91425" tIns="45700" rIns="91425" bIns="45700" anchor="t" anchorCtr="0">
-            <a:noAutofit/>
-          </a:bodyPr>
-          <a:lstStyle/>
-          <a:p>
-            <a:pPr marL="0" marR="0" lvl="0" indent="-127000" algn="ctr" rtl="0">
-              <a:spcBef>
-                <a:spcPts val="0"/>
-              </a:spcBef>
-              <a:buClr>
-                <a:schemeClr val="dk1"/>
-              </a:buClr>
-              <a:buSzPts val="2000"/>
-              <a:buFont typeface="Calibri"/>
-              <a:buNone/>
-            </a:pPr>
-            <a:r>
-              <a:rPr lang="en-IN" sz="2000" b="1" i="0" u="none" strike="noStrike" cap="none" dirty="0" smtClean="0">
-                <a:solidFill>
-                  <a:schemeClr val="dk1"/>
-                </a:solidFill>
-                <a:latin typeface="Calibri"/>
-                <a:ea typeface="Calibri"/>
-                <a:cs typeface="Calibri"/>
-                <a:sym typeface="Calibri"/>
-              </a:rPr>
-              <a:t>TECHNOLOGY </a:t>
-            </a:r>
-            <a:r>
-              <a:rPr lang="en-IN" sz="2000" b="1" i="0" u="none" strike="noStrike" cap="none" dirty="0">
-                <a:solidFill>
-                  <a:schemeClr val="dk1"/>
-                </a:solidFill>
-                <a:latin typeface="Calibri"/>
-                <a:ea typeface="Calibri"/>
-                <a:cs typeface="Calibri"/>
-                <a:sym typeface="Calibri"/>
-              </a:rPr>
-              <a:t>STACK</a:t>
-            </a:r>
-          </a:p>
-        </p:txBody>
-      </p:sp>
-      <p:sp>
-        <p:nvSpPr>
-          <p:cNvPr id="94" name="Shape 94"/>
-          <p:cNvSpPr txBox="1"/>
-          <p:nvPr/>
-        </p:nvSpPr>
-        <p:spPr>
-          <a:xfrm>
-            <a:off x="114300" y="2910978"/>
-            <a:ext cx="8826499" cy="1598142"/>
-          </a:xfrm>
-          <a:prstGeom prst="rect">
-            <a:avLst/>
-          </a:prstGeom>
-          <a:noFill/>
-          <a:ln>
-            <a:noFill/>
-          </a:ln>
-        </p:spPr>
-        <p:txBody>
-          <a:bodyPr wrap="square" lIns="91425" tIns="45700" rIns="91425" bIns="45700" anchor="t" anchorCtr="0">
-            <a:noAutofit/>
-          </a:bodyPr>
-          <a:lstStyle/>
-          <a:p>
-            <a:pPr marL="285750" marR="0" lvl="0" indent="-285750" algn="l" rtl="0">
-              <a:spcBef>
-                <a:spcPts val="0"/>
-              </a:spcBef>
-              <a:buClr>
-                <a:schemeClr val="dk1"/>
-              </a:buClr>
-              <a:buSzPts val="1800"/>
-              <a:buFont typeface="Arial"/>
-              <a:buChar char="•"/>
-            </a:pPr>
-            <a:r>
-              <a:rPr lang="en-IN" sz="1600" dirty="0" smtClean="0">
-                <a:solidFill>
-                  <a:schemeClr val="dk1"/>
-                </a:solidFill>
-                <a:latin typeface="Calibri"/>
-                <a:ea typeface="Calibri"/>
-                <a:cs typeface="Calibri"/>
-                <a:sym typeface="Calibri"/>
-              </a:rPr>
-              <a:t>Open </a:t>
-            </a:r>
-            <a:r>
-              <a:rPr lang="en-IN" sz="1600" dirty="0">
-                <a:solidFill>
-                  <a:schemeClr val="dk1"/>
-                </a:solidFill>
-                <a:latin typeface="Calibri"/>
-                <a:ea typeface="Calibri"/>
-                <a:cs typeface="Calibri"/>
-                <a:sym typeface="Calibri"/>
-              </a:rPr>
-              <a:t>Source</a:t>
-            </a:r>
-            <a:r>
-              <a:rPr lang="en-IN" sz="1600" b="0" i="0" u="none" strike="noStrike" cap="none" dirty="0">
-                <a:solidFill>
-                  <a:schemeClr val="dk1"/>
-                </a:solidFill>
-                <a:latin typeface="Calibri"/>
-                <a:ea typeface="Calibri"/>
-                <a:cs typeface="Calibri"/>
-                <a:sym typeface="Calibri"/>
-              </a:rPr>
-              <a:t> Blockchain distributed database </a:t>
-            </a:r>
-            <a:r>
-              <a:rPr lang="en-IN" sz="1600" b="0" i="0" u="none" strike="noStrike" cap="none" dirty="0" smtClean="0">
-                <a:solidFill>
-                  <a:schemeClr val="dk1"/>
-                </a:solidFill>
-                <a:latin typeface="Calibri"/>
-                <a:ea typeface="Calibri"/>
-                <a:cs typeface="Calibri"/>
-                <a:sym typeface="Calibri"/>
-              </a:rPr>
-              <a:t>like </a:t>
-            </a:r>
-            <a:r>
-              <a:rPr lang="en-IN" sz="1600" dirty="0" smtClean="0">
-                <a:solidFill>
-                  <a:schemeClr val="dk1"/>
-                </a:solidFill>
-                <a:latin typeface="Calibri"/>
-                <a:ea typeface="Calibri"/>
-                <a:cs typeface="Calibri"/>
-                <a:sym typeface="Calibri"/>
-              </a:rPr>
-              <a:t>Hyperledger</a:t>
-            </a:r>
-            <a:endParaRPr lang="en-IN" sz="1600" b="0" i="0" u="none" strike="noStrike" cap="none" dirty="0">
-              <a:solidFill>
-                <a:schemeClr val="dk1"/>
-              </a:solidFill>
-              <a:latin typeface="Calibri"/>
-              <a:ea typeface="Calibri"/>
-              <a:cs typeface="Calibri"/>
-              <a:sym typeface="Calibri"/>
-            </a:endParaRPr>
-          </a:p>
-          <a:p>
-            <a:pPr marL="285750" marR="0" lvl="0" indent="-285750" algn="l" rtl="0">
-              <a:spcBef>
-                <a:spcPts val="0"/>
-              </a:spcBef>
-              <a:buClr>
-                <a:schemeClr val="dk1"/>
-              </a:buClr>
-              <a:buSzPts val="1800"/>
-              <a:buFont typeface="Arial"/>
-              <a:buChar char="•"/>
-            </a:pPr>
-            <a:r>
-              <a:rPr lang="en-IN" sz="1600" b="0" i="0" u="none" strike="noStrike" cap="none" dirty="0">
-                <a:solidFill>
-                  <a:schemeClr val="dk1"/>
-                </a:solidFill>
-                <a:latin typeface="Calibri"/>
-                <a:ea typeface="Calibri"/>
-                <a:cs typeface="Calibri"/>
-                <a:sym typeface="Calibri"/>
-              </a:rPr>
-              <a:t>Browser </a:t>
-            </a:r>
-            <a:r>
-              <a:rPr lang="en-IN" sz="1600" b="0" i="0" u="none" strike="noStrike" cap="none" dirty="0" smtClean="0">
-                <a:solidFill>
-                  <a:schemeClr val="dk1"/>
-                </a:solidFill>
-                <a:latin typeface="Calibri"/>
-                <a:ea typeface="Calibri"/>
-                <a:cs typeface="Calibri"/>
-                <a:sym typeface="Calibri"/>
-              </a:rPr>
-              <a:t>based front-end for admin</a:t>
-            </a:r>
-            <a:endParaRPr lang="en-IN" sz="1600" b="0" i="0" u="none" strike="noStrike" cap="none" dirty="0">
-              <a:solidFill>
-                <a:schemeClr val="dk1"/>
-              </a:solidFill>
-              <a:latin typeface="Calibri"/>
-              <a:ea typeface="Calibri"/>
-              <a:cs typeface="Calibri"/>
-              <a:sym typeface="Calibri"/>
-            </a:endParaRPr>
-          </a:p>
-          <a:p>
-            <a:pPr marL="285750" marR="0" lvl="0" indent="-285750" algn="l" rtl="0">
-              <a:spcBef>
-                <a:spcPts val="0"/>
-              </a:spcBef>
-              <a:buClr>
-                <a:schemeClr val="dk1"/>
-              </a:buClr>
-              <a:buSzPts val="1800"/>
-              <a:buFont typeface="Arial"/>
-              <a:buChar char="•"/>
-            </a:pPr>
-            <a:r>
-              <a:rPr lang="en-IN" sz="1600" b="0" i="0" u="none" strike="noStrike" cap="none" dirty="0">
-                <a:solidFill>
-                  <a:schemeClr val="dk1"/>
-                </a:solidFill>
-                <a:latin typeface="Calibri"/>
-                <a:ea typeface="Calibri"/>
-                <a:cs typeface="Calibri"/>
-                <a:sym typeface="Calibri"/>
-              </a:rPr>
-              <a:t>Windows service for </a:t>
-            </a:r>
-            <a:r>
-              <a:rPr lang="en-IN" sz="1600" b="0" i="0" u="none" strike="noStrike" cap="none" dirty="0" smtClean="0">
-                <a:solidFill>
-                  <a:schemeClr val="dk1"/>
-                </a:solidFill>
-                <a:latin typeface="Calibri"/>
-                <a:ea typeface="Calibri"/>
-                <a:cs typeface="Calibri"/>
-                <a:sym typeface="Calibri"/>
-              </a:rPr>
-              <a:t>detecting/blocking connected USB </a:t>
-            </a:r>
-            <a:r>
-              <a:rPr lang="en-IN" sz="1600" b="0" i="0" u="none" strike="noStrike" cap="none" dirty="0">
-                <a:solidFill>
-                  <a:schemeClr val="dk1"/>
-                </a:solidFill>
-                <a:latin typeface="Calibri"/>
-                <a:ea typeface="Calibri"/>
-                <a:cs typeface="Calibri"/>
-                <a:sym typeface="Calibri"/>
-              </a:rPr>
-              <a:t>storage device</a:t>
-            </a:r>
-          </a:p>
-          <a:p>
-            <a:pPr marL="285750" marR="0" lvl="0" indent="-285750" algn="l" rtl="0">
-              <a:spcBef>
-                <a:spcPts val="0"/>
-              </a:spcBef>
-              <a:buClr>
-                <a:schemeClr val="dk1"/>
-              </a:buClr>
-              <a:buSzPts val="1800"/>
-              <a:buFont typeface="Arial"/>
-              <a:buChar char="•"/>
-            </a:pPr>
-            <a:r>
-              <a:rPr lang="en-IN" sz="1600" b="0" i="0" u="none" strike="noStrike" cap="none" dirty="0">
-                <a:solidFill>
-                  <a:schemeClr val="dk1"/>
-                </a:solidFill>
-                <a:latin typeface="Calibri"/>
-                <a:ea typeface="Calibri"/>
-                <a:cs typeface="Calibri"/>
-                <a:sym typeface="Calibri"/>
-              </a:rPr>
-              <a:t>E-mail / SMS notification </a:t>
-            </a:r>
-            <a:r>
-              <a:rPr lang="en-IN" sz="1600" b="0" i="0" u="none" strike="noStrike" cap="none" dirty="0" smtClean="0">
-                <a:solidFill>
-                  <a:schemeClr val="dk1"/>
-                </a:solidFill>
-                <a:latin typeface="Calibri"/>
-                <a:ea typeface="Calibri"/>
-                <a:cs typeface="Calibri"/>
-                <a:sym typeface="Calibri"/>
-              </a:rPr>
-              <a:t>service</a:t>
-            </a:r>
-          </a:p>
-          <a:p>
-            <a:pPr marL="285750" marR="0" lvl="0" indent="-285750" algn="l" rtl="0">
-              <a:spcBef>
-                <a:spcPts val="0"/>
-              </a:spcBef>
-              <a:buClr>
-                <a:schemeClr val="dk1"/>
-              </a:buClr>
-              <a:buSzPts val="1800"/>
-              <a:buFont typeface="Arial"/>
-              <a:buChar char="•"/>
-            </a:pPr>
-            <a:r>
-              <a:rPr lang="en-IN" sz="1600" dirty="0" smtClean="0">
-                <a:solidFill>
-                  <a:schemeClr val="dk1"/>
-                </a:solidFill>
-                <a:latin typeface="Calibri"/>
-                <a:ea typeface="Calibri"/>
-                <a:cs typeface="Calibri"/>
-                <a:sym typeface="Calibri"/>
-              </a:rPr>
-              <a:t>Language used: Go / Rust, Python</a:t>
-            </a:r>
-            <a:endParaRPr lang="en-IN" sz="1600" b="0" i="0" u="none" strike="noStrike" cap="none" dirty="0">
-              <a:solidFill>
-                <a:schemeClr val="dk1"/>
-              </a:solidFill>
-              <a:latin typeface="Calibri"/>
-              <a:ea typeface="Calibri"/>
-              <a:cs typeface="Calibri"/>
-              <a:sym typeface="Calibri"/>
-            </a:endParaRPr>
-          </a:p>
-        </p:txBody>
-      </p:sp>
-      <p:sp>
-        <p:nvSpPr>
-          <p:cNvPr id="95" name="Shape 95"/>
-          <p:cNvSpPr txBox="1"/>
-          <p:nvPr/>
-        </p:nvSpPr>
-        <p:spPr>
-          <a:xfrm>
-            <a:off x="393699" y="4597635"/>
-            <a:ext cx="8229600" cy="406637"/>
-          </a:xfrm>
-          <a:prstGeom prst="rect">
-            <a:avLst/>
-          </a:prstGeom>
-          <a:noFill/>
-          <a:ln>
-            <a:noFill/>
-          </a:ln>
-        </p:spPr>
-        <p:txBody>
-          <a:bodyPr wrap="square" lIns="91425" tIns="45700" rIns="91425" bIns="45700" anchor="ctr" anchorCtr="0">
-            <a:noAutofit/>
-          </a:bodyPr>
-          <a:lstStyle/>
-          <a:p>
-            <a:pPr marL="0" marR="0" lvl="0" indent="-127000" algn="ctr" rtl="0">
-              <a:spcBef>
-                <a:spcPts val="0"/>
-              </a:spcBef>
-              <a:buClr>
-                <a:schemeClr val="dk1"/>
-              </a:buClr>
-              <a:buSzPts val="2000"/>
-              <a:buFont typeface="Calibri"/>
-              <a:buNone/>
-            </a:pPr>
-            <a:r>
-              <a:rPr lang="en-IN" sz="2000" b="1" i="0" u="none" strike="noStrike" cap="none" dirty="0" smtClean="0">
-                <a:solidFill>
-                  <a:schemeClr val="dk1"/>
-                </a:solidFill>
-                <a:latin typeface="Calibri"/>
-                <a:ea typeface="Calibri"/>
-                <a:cs typeface="Calibri"/>
-                <a:sym typeface="Calibri"/>
-              </a:rPr>
-              <a:t>DEPENDENCIES </a:t>
-            </a:r>
-            <a:r>
-              <a:rPr lang="en-IN" sz="2000" b="1" i="0" u="none" strike="noStrike" cap="none" dirty="0">
-                <a:solidFill>
-                  <a:schemeClr val="dk1"/>
-                </a:solidFill>
-                <a:latin typeface="Calibri"/>
-                <a:ea typeface="Calibri"/>
-                <a:cs typeface="Calibri"/>
-                <a:sym typeface="Calibri"/>
-              </a:rPr>
-              <a:t>/ SHOW STOPPER</a:t>
-            </a:r>
-          </a:p>
-        </p:txBody>
-      </p:sp>
-      <p:sp>
-        <p:nvSpPr>
-          <p:cNvPr id="96" name="Shape 96"/>
-          <p:cNvSpPr/>
-          <p:nvPr/>
-        </p:nvSpPr>
-        <p:spPr>
-          <a:xfrm>
-            <a:off x="114300" y="5105400"/>
-            <a:ext cx="8839199" cy="1477328"/>
-          </a:xfrm>
-          <a:prstGeom prst="rect">
-            <a:avLst/>
-          </a:prstGeom>
-          <a:noFill/>
-          <a:ln>
-            <a:noFill/>
-          </a:ln>
-        </p:spPr>
-        <p:txBody>
-          <a:bodyPr wrap="square" lIns="91425" tIns="45700" rIns="91425" bIns="45700" anchor="t" anchorCtr="0">
-            <a:noAutofit/>
-          </a:bodyPr>
-          <a:lstStyle/>
-          <a:p>
-            <a:pPr marL="285750" marR="0" lvl="0" indent="-285750" algn="l" rtl="0">
-              <a:spcBef>
-                <a:spcPts val="0"/>
-              </a:spcBef>
-              <a:buClr>
-                <a:schemeClr val="dk1"/>
-              </a:buClr>
-              <a:buSzPts val="1800"/>
-              <a:buFont typeface="Arial"/>
-              <a:buChar char="•"/>
-            </a:pPr>
-            <a:r>
-              <a:rPr lang="en-IN" sz="1600" b="0" i="0" u="none" strike="noStrike" cap="none" dirty="0">
-                <a:solidFill>
-                  <a:schemeClr val="dk1"/>
-                </a:solidFill>
-                <a:latin typeface="Calibri"/>
-                <a:ea typeface="Calibri"/>
-                <a:cs typeface="Calibri"/>
-                <a:sym typeface="Calibri"/>
-              </a:rPr>
-              <a:t>Probabilistic data structures are not 100% accurate. In extremely rare case authorized device may get blocked if computer is offline</a:t>
-            </a:r>
-          </a:p>
-          <a:p>
-            <a:pPr marL="285750" marR="0" lvl="0" indent="-285750" algn="l" rtl="0">
-              <a:spcBef>
-                <a:spcPts val="0"/>
-              </a:spcBef>
-              <a:buClr>
-                <a:schemeClr val="dk1"/>
-              </a:buClr>
-              <a:buSzPts val="1800"/>
-              <a:buFont typeface="Arial"/>
-              <a:buChar char="•"/>
-            </a:pPr>
-            <a:r>
-              <a:rPr lang="en-IN" sz="1600" b="0" i="0" u="none" strike="noStrike" cap="none" dirty="0">
-                <a:solidFill>
-                  <a:schemeClr val="dk1"/>
-                </a:solidFill>
-                <a:latin typeface="Calibri"/>
-                <a:ea typeface="Calibri"/>
-                <a:cs typeface="Calibri"/>
-                <a:sym typeface="Calibri"/>
-              </a:rPr>
-              <a:t>The offline devices have to be connected to the internet or intranet for updating it </a:t>
-            </a:r>
-            <a:r>
-              <a:rPr lang="en-IN" sz="1600" dirty="0">
-                <a:solidFill>
-                  <a:schemeClr val="dk1"/>
-                </a:solidFill>
-                <a:latin typeface="Calibri"/>
-                <a:ea typeface="Calibri"/>
-                <a:cs typeface="Calibri"/>
-                <a:sym typeface="Calibri"/>
-              </a:rPr>
-              <a:t>periodically</a:t>
-            </a:r>
-            <a:r>
-              <a:rPr lang="en-IN" sz="1600" b="0" i="0" u="none" strike="noStrike" cap="none" dirty="0">
-                <a:solidFill>
-                  <a:schemeClr val="dk1"/>
-                </a:solidFill>
-                <a:latin typeface="Calibri"/>
-                <a:ea typeface="Calibri"/>
-                <a:cs typeface="Calibri"/>
-                <a:sym typeface="Calibri"/>
-              </a:rPr>
-              <a:t>. This can give access to the devices which have been removed from the whitelist and won’t give access to the newly added devices.</a:t>
-            </a:r>
-          </a:p>
-        </p:txBody>
-      </p:sp>
-    </p:spTree>
-  </p:cSld>
-  <p:clrMapOvr>
-    <a:masterClrMapping/>
-  </p:clrMapOvr>
-</p:sld>
-</file>
-
-<file path=ppt/slides/slide3.xml><?xml version="1.0" encoding="utf-8"?>
-<p:sld xmlns:a="http://schemas.openxmlformats.org/drawingml/2006/main" xmlns:r="http://schemas.openxmlformats.org/officeDocument/2006/relationships" xmlns:p="http://schemas.openxmlformats.org/presentationml/2006/main">
-  <p:cSld>
-    <p:spTree>
-      <p:nvGrpSpPr>
-        <p:cNvPr id="1" name=""/>
-        <p:cNvGrpSpPr/>
-        <p:nvPr/>
-      </p:nvGrpSpPr>
-      <p:grpSpPr>
-        <a:xfrm>
-          <a:off x="0" y="0"/>
-          <a:ext cx="0" cy="0"/>
-          <a:chOff x="0" y="0"/>
-          <a:chExt cx="0" cy="0"/>
-        </a:xfrm>
-      </p:grpSpPr>
-      <p:sp>
-        <p:nvSpPr>
-          <p:cNvPr id="3" name="Text Placeholder 2"/>
-          <p:cNvSpPr>
-            <a:spLocks noGrp="1"/>
-          </p:cNvSpPr>
-          <p:nvPr>
-            <p:ph type="body" idx="1"/>
-          </p:nvPr>
-        </p:nvSpPr>
-        <p:spPr>
-          <a:xfrm>
-            <a:off x="457200" y="1268760"/>
-            <a:ext cx="4038600" cy="4857403"/>
-          </a:xfrm>
-        </p:spPr>
-        <p:txBody>
-          <a:bodyPr/>
-          <a:lstStyle/>
-          <a:p>
-            <a:pPr marL="177800" indent="0">
-              <a:buNone/>
-            </a:pPr>
-            <a:endParaRPr lang="en-US" dirty="0"/>
-          </a:p>
-        </p:txBody>
-      </p:sp>
-      <p:sp>
-        <p:nvSpPr>
-          <p:cNvPr id="4" name="Text Placeholder 3"/>
-          <p:cNvSpPr>
-            <a:spLocks noGrp="1"/>
-          </p:cNvSpPr>
-          <p:nvPr>
-            <p:ph type="body" idx="2"/>
-          </p:nvPr>
-        </p:nvSpPr>
-        <p:spPr>
-          <a:xfrm>
-            <a:off x="4648200" y="1268760"/>
-            <a:ext cx="4038600" cy="4857403"/>
-          </a:xfrm>
-        </p:spPr>
-        <p:txBody>
-          <a:bodyPr/>
-          <a:lstStyle/>
-          <a:p>
-            <a:endParaRPr lang="en-US" dirty="0"/>
-          </a:p>
-        </p:txBody>
-      </p:sp>
-      <p:sp>
-        <p:nvSpPr>
-          <p:cNvPr id="5" name="TextBox 4"/>
-          <p:cNvSpPr txBox="1"/>
-          <p:nvPr/>
-        </p:nvSpPr>
-        <p:spPr>
-          <a:xfrm>
-            <a:off x="467544" y="846584"/>
-            <a:ext cx="4032448" cy="369332"/>
-          </a:xfrm>
-          <a:prstGeom prst="rect">
-            <a:avLst/>
-          </a:prstGeom>
-          <a:noFill/>
-        </p:spPr>
-        <p:txBody>
-          <a:bodyPr wrap="square" rtlCol="0">
-            <a:spAutoFit/>
-          </a:bodyPr>
-          <a:lstStyle/>
-          <a:p>
-            <a:pPr algn="ctr"/>
-            <a:r>
-              <a:rPr lang="en-IN" sz="1800" b="1" dirty="0" smtClean="0"/>
-              <a:t>NOVELTY</a:t>
-            </a:r>
-            <a:endParaRPr lang="en-US" sz="1800" b="1" dirty="0"/>
-          </a:p>
-        </p:txBody>
-      </p:sp>
-      <p:sp>
-        <p:nvSpPr>
-          <p:cNvPr id="6" name="TextBox 5"/>
-          <p:cNvSpPr txBox="1"/>
-          <p:nvPr/>
-        </p:nvSpPr>
-        <p:spPr>
-          <a:xfrm>
-            <a:off x="4676304" y="845095"/>
-            <a:ext cx="4032448" cy="369332"/>
-          </a:xfrm>
-          <a:prstGeom prst="rect">
-            <a:avLst/>
-          </a:prstGeom>
-          <a:noFill/>
-        </p:spPr>
-        <p:txBody>
-          <a:bodyPr wrap="square" rtlCol="0">
-            <a:spAutoFit/>
-          </a:bodyPr>
-          <a:lstStyle/>
-          <a:p>
-            <a:pPr algn="ctr"/>
-            <a:r>
-              <a:rPr lang="en-IN" sz="1800" b="1" dirty="0" smtClean="0"/>
-              <a:t>SECURITY</a:t>
-            </a:r>
-            <a:endParaRPr lang="en-US" sz="1800" b="1" dirty="0"/>
-          </a:p>
-        </p:txBody>
-      </p:sp>
-    </p:spTree>
-    <p:extLst>
-      <p:ext uri="{BB962C8B-B14F-4D97-AF65-F5344CB8AC3E}">
-        <p14:creationId xmlns:p14="http://schemas.microsoft.com/office/powerpoint/2010/main" val="356556655"/>
-      </p:ext>
-    </p:extLst>
-  </p:cSld>
-  <p:clrMapOvr>
-    <a:masterClrMapping/>
-  </p:clrMapOvr>
-</p:sld>
-</file>
-
-<file path=ppt/slides/slide4.xml><?xml version="1.0" encoding="utf-8"?>
-<p:sld xmlns:a="http://schemas.openxmlformats.org/drawingml/2006/main" xmlns:r="http://schemas.openxmlformats.org/officeDocument/2006/relationships" xmlns:p="http://schemas.openxmlformats.org/presentationml/2006/main">
-  <p:cSld>
-    <p:spTree>
-      <p:nvGrpSpPr>
         <p:cNvPr id="1" name="Shape 100"/>
         <p:cNvGrpSpPr/>
         <p:nvPr/>
@@ -13671,19 +12795,7 @@
                 <a:cs typeface="Calibri"/>
                 <a:sym typeface="Calibri"/>
               </a:rPr>
-              <a:t>File</a:t>
-            </a:r>
-            <a:r>
-              <a:rPr lang="en-IN" sz="1600" dirty="0" smtClean="0">
-                <a:solidFill>
-                  <a:schemeClr val="dk1"/>
-                </a:solidFill>
-                <a:latin typeface="Calibri"/>
-                <a:ea typeface="Calibri"/>
-                <a:cs typeface="Calibri"/>
-                <a:sym typeface="Calibri"/>
-              </a:rPr>
-              <a:t> decryption</a:t>
+              <a:t>File decryption</a:t>
             </a:r>
             <a:endParaRPr lang="en-IN" sz="1600" dirty="0">
               <a:solidFill>
@@ -15364,6 +14476,1000 @@
         </p:txBody>
       </p:sp>
     </p:spTree>
+  </p:cSld>
+  <p:clrMapOvr>
+    <a:masterClrMapping/>
+  </p:clrMapOvr>
+</p:sld>
+</file>
+
+<file path=ppt/slides/slide3.xml><?xml version="1.0" encoding="utf-8"?>
+<p:sld xmlns:a="http://schemas.openxmlformats.org/drawingml/2006/main" xmlns:r="http://schemas.openxmlformats.org/officeDocument/2006/relationships" xmlns:p="http://schemas.openxmlformats.org/presentationml/2006/main">
+  <p:cSld>
+    <p:spTree>
+      <p:nvGrpSpPr>
+        <p:cNvPr id="1" name="Shape 91"/>
+        <p:cNvGrpSpPr/>
+        <p:nvPr/>
+      </p:nvGrpSpPr>
+      <p:grpSpPr>
+        <a:xfrm>
+          <a:off x="0" y="0"/>
+          <a:ext cx="0" cy="0"/>
+          <a:chOff x="0" y="0"/>
+          <a:chExt cx="0" cy="0"/>
+        </a:xfrm>
+      </p:grpSpPr>
+      <p:sp>
+        <p:nvSpPr>
+          <p:cNvPr id="92" name="Shape 92"/>
+          <p:cNvSpPr txBox="1"/>
+          <p:nvPr/>
+        </p:nvSpPr>
+        <p:spPr>
+          <a:xfrm>
+            <a:off x="177800" y="280249"/>
+            <a:ext cx="8839200" cy="2284655"/>
+          </a:xfrm>
+          <a:prstGeom prst="rect">
+            <a:avLst/>
+          </a:prstGeom>
+          <a:noFill/>
+          <a:ln>
+            <a:noFill/>
+          </a:ln>
+        </p:spPr>
+        <p:txBody>
+          <a:bodyPr wrap="square" lIns="91425" tIns="45700" rIns="91425" bIns="45700" anchor="t" anchorCtr="0">
+            <a:noAutofit/>
+          </a:bodyPr>
+          <a:lstStyle/>
+          <a:p>
+            <a:pPr marL="285750" marR="0" lvl="0" indent="-285750" algn="l" rtl="0">
+              <a:spcBef>
+                <a:spcPts val="0"/>
+              </a:spcBef>
+              <a:buClr>
+                <a:schemeClr val="dk1"/>
+              </a:buClr>
+              <a:buSzPts val="1800"/>
+              <a:buFont typeface="Arial"/>
+              <a:buChar char="•"/>
+            </a:pPr>
+            <a:r>
+              <a:rPr lang="en-IN" sz="1600" b="0" i="0" u="none" strike="noStrike" cap="none" dirty="0">
+                <a:solidFill>
+                  <a:schemeClr val="dk1"/>
+                </a:solidFill>
+                <a:latin typeface="Calibri"/>
+                <a:ea typeface="Calibri"/>
+                <a:cs typeface="Calibri"/>
+                <a:sym typeface="Calibri"/>
+              </a:rPr>
+              <a:t>The encrypted </a:t>
+            </a:r>
+            <a:r>
+              <a:rPr lang="en-IN" sz="1600" b="0" i="0" u="none" strike="noStrike" cap="none" dirty="0" smtClean="0">
+                <a:solidFill>
+                  <a:schemeClr val="dk1"/>
+                </a:solidFill>
+                <a:latin typeface="Calibri"/>
+                <a:ea typeface="Calibri"/>
+                <a:cs typeface="Calibri"/>
+                <a:sym typeface="Calibri"/>
+              </a:rPr>
+              <a:t>file system </a:t>
+            </a:r>
+            <a:r>
+              <a:rPr lang="en-IN" sz="1600" b="0" i="0" u="none" strike="noStrike" cap="none" dirty="0">
+                <a:solidFill>
+                  <a:schemeClr val="dk1"/>
+                </a:solidFill>
+                <a:latin typeface="Calibri"/>
+                <a:ea typeface="Calibri"/>
+                <a:cs typeface="Calibri"/>
+                <a:sym typeface="Calibri"/>
+              </a:rPr>
+              <a:t>will be created on the storage device when it is connected to the blockchain system for the first time for registration on the database. </a:t>
+            </a:r>
+          </a:p>
+          <a:p>
+            <a:pPr marL="285750" marR="0" lvl="0" indent="-285750" algn="l" rtl="0">
+              <a:spcBef>
+                <a:spcPts val="0"/>
+              </a:spcBef>
+              <a:buClr>
+                <a:schemeClr val="dk1"/>
+              </a:buClr>
+              <a:buSzPts val="1800"/>
+              <a:buFont typeface="Arial"/>
+              <a:buChar char="•"/>
+            </a:pPr>
+            <a:r>
+              <a:rPr lang="en-IN" sz="1600" b="0" i="0" u="none" strike="noStrike" cap="none" dirty="0">
+                <a:solidFill>
+                  <a:schemeClr val="dk1"/>
+                </a:solidFill>
+                <a:latin typeface="Calibri"/>
+                <a:ea typeface="Calibri"/>
+                <a:cs typeface="Calibri"/>
+                <a:sym typeface="Calibri"/>
+              </a:rPr>
+              <a:t>The computers which are offline </a:t>
+            </a:r>
+            <a:r>
+              <a:rPr lang="en-IN" sz="1600" b="0" i="0" u="none" strike="noStrike" cap="none" dirty="0" smtClean="0">
+                <a:solidFill>
+                  <a:schemeClr val="dk1"/>
+                </a:solidFill>
+                <a:latin typeface="Calibri"/>
+                <a:ea typeface="Calibri"/>
+                <a:cs typeface="Calibri"/>
+                <a:sym typeface="Calibri"/>
+              </a:rPr>
+              <a:t>will also use </a:t>
+            </a:r>
+            <a:r>
+              <a:rPr lang="en-IN" sz="1600" b="0" i="0" u="none" strike="noStrike" cap="none" dirty="0">
+                <a:solidFill>
+                  <a:schemeClr val="dk1"/>
+                </a:solidFill>
+                <a:latin typeface="Calibri"/>
+                <a:ea typeface="Calibri"/>
+                <a:cs typeface="Calibri"/>
+                <a:sym typeface="Calibri"/>
+              </a:rPr>
+              <a:t>a probabilistic database of authorized MAC addresses (e.g. like Bloom filter). The driver program on the computer will check the storage device against this probabilistic database. The driver program will block the devices which are not on the whitelist. </a:t>
+            </a:r>
+          </a:p>
+          <a:p>
+            <a:pPr marL="285750" lvl="0" indent="-285750">
+              <a:buClr>
+                <a:schemeClr val="dk1"/>
+              </a:buClr>
+              <a:buSzPts val="1800"/>
+              <a:buFont typeface="Arial"/>
+              <a:buChar char="•"/>
+            </a:pPr>
+            <a:r>
+              <a:rPr lang="en-IN" sz="1600" b="0" i="0" u="none" strike="noStrike" cap="none" dirty="0">
+                <a:solidFill>
+                  <a:schemeClr val="dk1"/>
+                </a:solidFill>
+                <a:latin typeface="Calibri"/>
+                <a:ea typeface="Calibri"/>
+                <a:cs typeface="Calibri"/>
+                <a:sym typeface="Calibri"/>
+              </a:rPr>
+              <a:t>The Bloom filter database will be updated when it is connected to the internet </a:t>
+            </a:r>
+            <a:r>
+              <a:rPr lang="en-IN" sz="1600" b="0" i="0" u="none" strike="noStrike" cap="none" dirty="0" smtClean="0">
+                <a:solidFill>
+                  <a:schemeClr val="dk1"/>
+                </a:solidFill>
+                <a:latin typeface="Calibri"/>
+                <a:ea typeface="Calibri"/>
+                <a:cs typeface="Calibri"/>
+                <a:sym typeface="Calibri"/>
+              </a:rPr>
+              <a:t>periodically</a:t>
+            </a:r>
+            <a:r>
+              <a:rPr lang="en-IN" sz="1600" dirty="0" smtClean="0">
+                <a:solidFill>
+                  <a:schemeClr val="dk1"/>
+                </a:solidFill>
+                <a:latin typeface="Calibri"/>
+                <a:ea typeface="Calibri"/>
+                <a:cs typeface="Calibri"/>
+                <a:sym typeface="Calibri"/>
+              </a:rPr>
+              <a:t>. To update, the whole database is not replaced, instead the delta i.e. difference between the existing database on the Bloom filter and the local database is found and then added to the database of Bloom filter.</a:t>
+            </a:r>
+          </a:p>
+          <a:p>
+            <a:pPr marL="285750" lvl="0" indent="-285750">
+              <a:buClr>
+                <a:schemeClr val="dk1"/>
+              </a:buClr>
+              <a:buSzPts val="1800"/>
+              <a:buFont typeface="Arial"/>
+              <a:buChar char="•"/>
+            </a:pPr>
+            <a:endParaRPr lang="en-IN" sz="1600" b="0" i="0" u="none" strike="noStrike" cap="none" dirty="0">
+              <a:solidFill>
+                <a:schemeClr val="dk1"/>
+              </a:solidFill>
+              <a:latin typeface="Calibri"/>
+              <a:ea typeface="Calibri"/>
+              <a:cs typeface="Calibri"/>
+              <a:sym typeface="Calibri"/>
+            </a:endParaRPr>
+          </a:p>
+          <a:p>
+            <a:pPr marL="285750" lvl="0" indent="-285750">
+              <a:buClr>
+                <a:schemeClr val="dk1"/>
+              </a:buClr>
+              <a:buSzPts val="1800"/>
+              <a:buFont typeface="Arial"/>
+              <a:buChar char="•"/>
+            </a:pPr>
+            <a:endParaRPr lang="en-IN" sz="1600" b="0" i="0" u="none" strike="noStrike" cap="none" dirty="0">
+              <a:solidFill>
+                <a:schemeClr val="dk1"/>
+              </a:solidFill>
+              <a:latin typeface="Calibri"/>
+              <a:ea typeface="Calibri"/>
+              <a:cs typeface="Calibri"/>
+              <a:sym typeface="Calibri"/>
+            </a:endParaRPr>
+          </a:p>
+        </p:txBody>
+      </p:sp>
+      <p:sp>
+        <p:nvSpPr>
+          <p:cNvPr id="93" name="Shape 93"/>
+          <p:cNvSpPr txBox="1"/>
+          <p:nvPr/>
+        </p:nvSpPr>
+        <p:spPr>
+          <a:xfrm>
+            <a:off x="482600" y="2564904"/>
+            <a:ext cx="8229600" cy="346074"/>
+          </a:xfrm>
+          <a:prstGeom prst="rect">
+            <a:avLst/>
+          </a:prstGeom>
+          <a:noFill/>
+          <a:ln>
+            <a:noFill/>
+          </a:ln>
+        </p:spPr>
+        <p:txBody>
+          <a:bodyPr wrap="square" lIns="91425" tIns="45700" rIns="91425" bIns="45700" anchor="t" anchorCtr="0">
+            <a:noAutofit/>
+          </a:bodyPr>
+          <a:lstStyle/>
+          <a:p>
+            <a:pPr marL="0" marR="0" lvl="0" indent="-127000" algn="ctr" rtl="0">
+              <a:spcBef>
+                <a:spcPts val="0"/>
+              </a:spcBef>
+              <a:buClr>
+                <a:schemeClr val="dk1"/>
+              </a:buClr>
+              <a:buSzPts val="2000"/>
+              <a:buFont typeface="Calibri"/>
+              <a:buNone/>
+            </a:pPr>
+            <a:r>
+              <a:rPr lang="en-IN" sz="2000" b="1" i="0" u="none" strike="noStrike" cap="none" dirty="0" smtClean="0">
+                <a:solidFill>
+                  <a:schemeClr val="dk1"/>
+                </a:solidFill>
+                <a:latin typeface="Calibri"/>
+                <a:ea typeface="Calibri"/>
+                <a:cs typeface="Calibri"/>
+                <a:sym typeface="Calibri"/>
+              </a:rPr>
+              <a:t>TECHNOLOGY </a:t>
+            </a:r>
+            <a:r>
+              <a:rPr lang="en-IN" sz="2000" b="1" i="0" u="none" strike="noStrike" cap="none" dirty="0">
+                <a:solidFill>
+                  <a:schemeClr val="dk1"/>
+                </a:solidFill>
+                <a:latin typeface="Calibri"/>
+                <a:ea typeface="Calibri"/>
+                <a:cs typeface="Calibri"/>
+                <a:sym typeface="Calibri"/>
+              </a:rPr>
+              <a:t>STACK</a:t>
+            </a:r>
+          </a:p>
+        </p:txBody>
+      </p:sp>
+      <p:sp>
+        <p:nvSpPr>
+          <p:cNvPr id="94" name="Shape 94"/>
+          <p:cNvSpPr txBox="1"/>
+          <p:nvPr/>
+        </p:nvSpPr>
+        <p:spPr>
+          <a:xfrm>
+            <a:off x="114300" y="2910978"/>
+            <a:ext cx="8826499" cy="1598142"/>
+          </a:xfrm>
+          <a:prstGeom prst="rect">
+            <a:avLst/>
+          </a:prstGeom>
+          <a:noFill/>
+          <a:ln>
+            <a:noFill/>
+          </a:ln>
+        </p:spPr>
+        <p:txBody>
+          <a:bodyPr wrap="square" lIns="91425" tIns="45700" rIns="91425" bIns="45700" anchor="t" anchorCtr="0">
+            <a:noAutofit/>
+          </a:bodyPr>
+          <a:lstStyle/>
+          <a:p>
+            <a:pPr marL="285750" marR="0" lvl="0" indent="-285750" algn="l" rtl="0">
+              <a:spcBef>
+                <a:spcPts val="0"/>
+              </a:spcBef>
+              <a:buClr>
+                <a:schemeClr val="dk1"/>
+              </a:buClr>
+              <a:buSzPts val="1800"/>
+              <a:buFont typeface="Arial"/>
+              <a:buChar char="•"/>
+            </a:pPr>
+            <a:r>
+              <a:rPr lang="en-IN" sz="1600" dirty="0" smtClean="0">
+                <a:solidFill>
+                  <a:schemeClr val="dk1"/>
+                </a:solidFill>
+                <a:latin typeface="Calibri"/>
+                <a:ea typeface="Calibri"/>
+                <a:cs typeface="Calibri"/>
+                <a:sym typeface="Calibri"/>
+              </a:rPr>
+              <a:t>Open </a:t>
+            </a:r>
+            <a:r>
+              <a:rPr lang="en-IN" sz="1600" dirty="0">
+                <a:solidFill>
+                  <a:schemeClr val="dk1"/>
+                </a:solidFill>
+                <a:latin typeface="Calibri"/>
+                <a:ea typeface="Calibri"/>
+                <a:cs typeface="Calibri"/>
+                <a:sym typeface="Calibri"/>
+              </a:rPr>
+              <a:t>Source</a:t>
+            </a:r>
+            <a:r>
+              <a:rPr lang="en-IN" sz="1600" b="0" i="0" u="none" strike="noStrike" cap="none" dirty="0">
+                <a:solidFill>
+                  <a:schemeClr val="dk1"/>
+                </a:solidFill>
+                <a:latin typeface="Calibri"/>
+                <a:ea typeface="Calibri"/>
+                <a:cs typeface="Calibri"/>
+                <a:sym typeface="Calibri"/>
+              </a:rPr>
+              <a:t> Blockchain distributed database </a:t>
+            </a:r>
+            <a:r>
+              <a:rPr lang="en-IN" sz="1600" b="0" i="0" u="none" strike="noStrike" cap="none" dirty="0" smtClean="0">
+                <a:solidFill>
+                  <a:schemeClr val="dk1"/>
+                </a:solidFill>
+                <a:latin typeface="Calibri"/>
+                <a:ea typeface="Calibri"/>
+                <a:cs typeface="Calibri"/>
+                <a:sym typeface="Calibri"/>
+              </a:rPr>
+              <a:t>like </a:t>
+            </a:r>
+            <a:r>
+              <a:rPr lang="en-IN" sz="1600" dirty="0" smtClean="0">
+                <a:solidFill>
+                  <a:schemeClr val="dk1"/>
+                </a:solidFill>
+                <a:latin typeface="Calibri"/>
+                <a:ea typeface="Calibri"/>
+                <a:cs typeface="Calibri"/>
+                <a:sym typeface="Calibri"/>
+              </a:rPr>
+              <a:t>Hyperledger</a:t>
+            </a:r>
+            <a:endParaRPr lang="en-IN" sz="1600" b="0" i="0" u="none" strike="noStrike" cap="none" dirty="0">
+              <a:solidFill>
+                <a:schemeClr val="dk1"/>
+              </a:solidFill>
+              <a:latin typeface="Calibri"/>
+              <a:ea typeface="Calibri"/>
+              <a:cs typeface="Calibri"/>
+              <a:sym typeface="Calibri"/>
+            </a:endParaRPr>
+          </a:p>
+          <a:p>
+            <a:pPr marL="285750" marR="0" lvl="0" indent="-285750" algn="l" rtl="0">
+              <a:spcBef>
+                <a:spcPts val="0"/>
+              </a:spcBef>
+              <a:buClr>
+                <a:schemeClr val="dk1"/>
+              </a:buClr>
+              <a:buSzPts val="1800"/>
+              <a:buFont typeface="Arial"/>
+              <a:buChar char="•"/>
+            </a:pPr>
+            <a:r>
+              <a:rPr lang="en-IN" sz="1600" b="0" i="0" u="none" strike="noStrike" cap="none" dirty="0" smtClean="0">
+                <a:solidFill>
+                  <a:schemeClr val="dk1"/>
+                </a:solidFill>
+                <a:latin typeface="Calibri"/>
+                <a:ea typeface="Calibri"/>
+                <a:cs typeface="Calibri"/>
+                <a:sym typeface="Calibri"/>
+              </a:rPr>
+              <a:t>Browser/desktop </a:t>
+            </a:r>
+            <a:r>
+              <a:rPr lang="en-IN" sz="1600" b="0" i="0" u="none" strike="noStrike" cap="none" dirty="0" smtClean="0">
+                <a:solidFill>
+                  <a:schemeClr val="dk1"/>
+                </a:solidFill>
+                <a:latin typeface="Calibri"/>
+                <a:ea typeface="Calibri"/>
+                <a:cs typeface="Calibri"/>
+                <a:sym typeface="Calibri"/>
+              </a:rPr>
+              <a:t>based front-end for admin</a:t>
+            </a:r>
+            <a:endParaRPr lang="en-IN" sz="1600" b="0" i="0" u="none" strike="noStrike" cap="none" dirty="0">
+              <a:solidFill>
+                <a:schemeClr val="dk1"/>
+              </a:solidFill>
+              <a:latin typeface="Calibri"/>
+              <a:ea typeface="Calibri"/>
+              <a:cs typeface="Calibri"/>
+              <a:sym typeface="Calibri"/>
+            </a:endParaRPr>
+          </a:p>
+          <a:p>
+            <a:pPr marL="285750" marR="0" lvl="0" indent="-285750" algn="l" rtl="0">
+              <a:spcBef>
+                <a:spcPts val="0"/>
+              </a:spcBef>
+              <a:buClr>
+                <a:schemeClr val="dk1"/>
+              </a:buClr>
+              <a:buSzPts val="1800"/>
+              <a:buFont typeface="Arial"/>
+              <a:buChar char="•"/>
+            </a:pPr>
+            <a:r>
+              <a:rPr lang="en-IN" sz="1600" b="0" i="0" u="none" strike="noStrike" cap="none" dirty="0">
+                <a:solidFill>
+                  <a:schemeClr val="dk1"/>
+                </a:solidFill>
+                <a:latin typeface="Calibri"/>
+                <a:ea typeface="Calibri"/>
+                <a:cs typeface="Calibri"/>
+                <a:sym typeface="Calibri"/>
+              </a:rPr>
+              <a:t>Windows service for </a:t>
+            </a:r>
+            <a:r>
+              <a:rPr lang="en-IN" sz="1600" b="0" i="0" u="none" strike="noStrike" cap="none" dirty="0" smtClean="0">
+                <a:solidFill>
+                  <a:schemeClr val="dk1"/>
+                </a:solidFill>
+                <a:latin typeface="Calibri"/>
+                <a:ea typeface="Calibri"/>
+                <a:cs typeface="Calibri"/>
+                <a:sym typeface="Calibri"/>
+              </a:rPr>
+              <a:t>detecting/blocking connected USB </a:t>
+            </a:r>
+            <a:r>
+              <a:rPr lang="en-IN" sz="1600" b="0" i="0" u="none" strike="noStrike" cap="none" dirty="0">
+                <a:solidFill>
+                  <a:schemeClr val="dk1"/>
+                </a:solidFill>
+                <a:latin typeface="Calibri"/>
+                <a:ea typeface="Calibri"/>
+                <a:cs typeface="Calibri"/>
+                <a:sym typeface="Calibri"/>
+              </a:rPr>
+              <a:t>storage device</a:t>
+            </a:r>
+          </a:p>
+          <a:p>
+            <a:pPr marL="285750" marR="0" lvl="0" indent="-285750" algn="l" rtl="0">
+              <a:spcBef>
+                <a:spcPts val="0"/>
+              </a:spcBef>
+              <a:buClr>
+                <a:schemeClr val="dk1"/>
+              </a:buClr>
+              <a:buSzPts val="1800"/>
+              <a:buFont typeface="Arial"/>
+              <a:buChar char="•"/>
+            </a:pPr>
+            <a:r>
+              <a:rPr lang="en-IN" sz="1600" b="0" i="0" u="none" strike="noStrike" cap="none" dirty="0">
+                <a:solidFill>
+                  <a:schemeClr val="dk1"/>
+                </a:solidFill>
+                <a:latin typeface="Calibri"/>
+                <a:ea typeface="Calibri"/>
+                <a:cs typeface="Calibri"/>
+                <a:sym typeface="Calibri"/>
+              </a:rPr>
+              <a:t>E-mail / SMS notification </a:t>
+            </a:r>
+            <a:r>
+              <a:rPr lang="en-IN" sz="1600" b="0" i="0" u="none" strike="noStrike" cap="none" dirty="0" smtClean="0">
+                <a:solidFill>
+                  <a:schemeClr val="dk1"/>
+                </a:solidFill>
+                <a:latin typeface="Calibri"/>
+                <a:ea typeface="Calibri"/>
+                <a:cs typeface="Calibri"/>
+                <a:sym typeface="Calibri"/>
+              </a:rPr>
+              <a:t>service</a:t>
+            </a:r>
+          </a:p>
+          <a:p>
+            <a:pPr marL="285750" marR="0" lvl="0" indent="-285750" algn="l" rtl="0">
+              <a:spcBef>
+                <a:spcPts val="0"/>
+              </a:spcBef>
+              <a:buClr>
+                <a:schemeClr val="dk1"/>
+              </a:buClr>
+              <a:buSzPts val="1800"/>
+              <a:buFont typeface="Arial"/>
+              <a:buChar char="•"/>
+            </a:pPr>
+            <a:r>
+              <a:rPr lang="en-IN" sz="1600" dirty="0" smtClean="0">
+                <a:solidFill>
+                  <a:schemeClr val="dk1"/>
+                </a:solidFill>
+                <a:latin typeface="Calibri"/>
+                <a:ea typeface="Calibri"/>
+                <a:cs typeface="Calibri"/>
+                <a:sym typeface="Calibri"/>
+              </a:rPr>
+              <a:t>Language used: Go / Rust, Python</a:t>
+            </a:r>
+            <a:endParaRPr lang="en-IN" sz="1600" b="0" i="0" u="none" strike="noStrike" cap="none" dirty="0">
+              <a:solidFill>
+                <a:schemeClr val="dk1"/>
+              </a:solidFill>
+              <a:latin typeface="Calibri"/>
+              <a:ea typeface="Calibri"/>
+              <a:cs typeface="Calibri"/>
+              <a:sym typeface="Calibri"/>
+            </a:endParaRPr>
+          </a:p>
+        </p:txBody>
+      </p:sp>
+      <p:sp>
+        <p:nvSpPr>
+          <p:cNvPr id="95" name="Shape 95"/>
+          <p:cNvSpPr txBox="1"/>
+          <p:nvPr/>
+        </p:nvSpPr>
+        <p:spPr>
+          <a:xfrm>
+            <a:off x="393699" y="4597635"/>
+            <a:ext cx="8229600" cy="406637"/>
+          </a:xfrm>
+          <a:prstGeom prst="rect">
+            <a:avLst/>
+          </a:prstGeom>
+          <a:noFill/>
+          <a:ln>
+            <a:noFill/>
+          </a:ln>
+        </p:spPr>
+        <p:txBody>
+          <a:bodyPr wrap="square" lIns="91425" tIns="45700" rIns="91425" bIns="45700" anchor="ctr" anchorCtr="0">
+            <a:noAutofit/>
+          </a:bodyPr>
+          <a:lstStyle/>
+          <a:p>
+            <a:pPr marL="0" marR="0" lvl="0" indent="-127000" algn="ctr" rtl="0">
+              <a:spcBef>
+                <a:spcPts val="0"/>
+              </a:spcBef>
+              <a:buClr>
+                <a:schemeClr val="dk1"/>
+              </a:buClr>
+              <a:buSzPts val="2000"/>
+              <a:buFont typeface="Calibri"/>
+              <a:buNone/>
+            </a:pPr>
+            <a:r>
+              <a:rPr lang="en-IN" sz="2000" b="1" i="0" u="none" strike="noStrike" cap="none" dirty="0" smtClean="0">
+                <a:solidFill>
+                  <a:schemeClr val="dk1"/>
+                </a:solidFill>
+                <a:latin typeface="Calibri"/>
+                <a:ea typeface="Calibri"/>
+                <a:cs typeface="Calibri"/>
+                <a:sym typeface="Calibri"/>
+              </a:rPr>
+              <a:t>DEPENDENCIES </a:t>
+            </a:r>
+            <a:r>
+              <a:rPr lang="en-IN" sz="2000" b="1" i="0" u="none" strike="noStrike" cap="none" dirty="0">
+                <a:solidFill>
+                  <a:schemeClr val="dk1"/>
+                </a:solidFill>
+                <a:latin typeface="Calibri"/>
+                <a:ea typeface="Calibri"/>
+                <a:cs typeface="Calibri"/>
+                <a:sym typeface="Calibri"/>
+              </a:rPr>
+              <a:t>/ SHOW STOPPER</a:t>
+            </a:r>
+          </a:p>
+        </p:txBody>
+      </p:sp>
+      <p:sp>
+        <p:nvSpPr>
+          <p:cNvPr id="96" name="Shape 96"/>
+          <p:cNvSpPr/>
+          <p:nvPr/>
+        </p:nvSpPr>
+        <p:spPr>
+          <a:xfrm>
+            <a:off x="114300" y="5105400"/>
+            <a:ext cx="8839199" cy="1477328"/>
+          </a:xfrm>
+          <a:prstGeom prst="rect">
+            <a:avLst/>
+          </a:prstGeom>
+          <a:noFill/>
+          <a:ln>
+            <a:noFill/>
+          </a:ln>
+        </p:spPr>
+        <p:txBody>
+          <a:bodyPr wrap="square" lIns="91425" tIns="45700" rIns="91425" bIns="45700" anchor="t" anchorCtr="0">
+            <a:noAutofit/>
+          </a:bodyPr>
+          <a:lstStyle/>
+          <a:p>
+            <a:pPr marL="285750" marR="0" lvl="0" indent="-285750" algn="l" rtl="0">
+              <a:spcBef>
+                <a:spcPts val="0"/>
+              </a:spcBef>
+              <a:buClr>
+                <a:schemeClr val="dk1"/>
+              </a:buClr>
+              <a:buSzPts val="1800"/>
+              <a:buFont typeface="Arial"/>
+              <a:buChar char="•"/>
+            </a:pPr>
+            <a:r>
+              <a:rPr lang="en-IN" sz="1600" b="0" i="0" u="none" strike="noStrike" cap="none" dirty="0">
+                <a:solidFill>
+                  <a:schemeClr val="dk1"/>
+                </a:solidFill>
+                <a:latin typeface="Calibri"/>
+                <a:ea typeface="Calibri"/>
+                <a:cs typeface="Calibri"/>
+                <a:sym typeface="Calibri"/>
+              </a:rPr>
+              <a:t>Probabilistic data structures are not 100% accurate. In extremely rare case authorized device may get blocked if computer is offline</a:t>
+            </a:r>
+          </a:p>
+          <a:p>
+            <a:pPr marL="285750" marR="0" lvl="0" indent="-285750" algn="l" rtl="0">
+              <a:spcBef>
+                <a:spcPts val="0"/>
+              </a:spcBef>
+              <a:buClr>
+                <a:schemeClr val="dk1"/>
+              </a:buClr>
+              <a:buSzPts val="1800"/>
+              <a:buFont typeface="Arial"/>
+              <a:buChar char="•"/>
+            </a:pPr>
+            <a:r>
+              <a:rPr lang="en-IN" sz="1600" b="0" i="0" u="none" strike="noStrike" cap="none" dirty="0">
+                <a:solidFill>
+                  <a:schemeClr val="dk1"/>
+                </a:solidFill>
+                <a:latin typeface="Calibri"/>
+                <a:ea typeface="Calibri"/>
+                <a:cs typeface="Calibri"/>
+                <a:sym typeface="Calibri"/>
+              </a:rPr>
+              <a:t>The offline devices have to be connected to the internet or intranet for updating it </a:t>
+            </a:r>
+            <a:r>
+              <a:rPr lang="en-IN" sz="1600" dirty="0">
+                <a:solidFill>
+                  <a:schemeClr val="dk1"/>
+                </a:solidFill>
+                <a:latin typeface="Calibri"/>
+                <a:ea typeface="Calibri"/>
+                <a:cs typeface="Calibri"/>
+                <a:sym typeface="Calibri"/>
+              </a:rPr>
+              <a:t>periodically</a:t>
+            </a:r>
+            <a:r>
+              <a:rPr lang="en-IN" sz="1600" b="0" i="0" u="none" strike="noStrike" cap="none" dirty="0">
+                <a:solidFill>
+                  <a:schemeClr val="dk1"/>
+                </a:solidFill>
+                <a:latin typeface="Calibri"/>
+                <a:ea typeface="Calibri"/>
+                <a:cs typeface="Calibri"/>
+                <a:sym typeface="Calibri"/>
+              </a:rPr>
+              <a:t>. This can give access to the devices which have been removed from the whitelist and won’t give access to the newly added devices.</a:t>
+            </a:r>
+          </a:p>
+        </p:txBody>
+      </p:sp>
+    </p:spTree>
+  </p:cSld>
+  <p:clrMapOvr>
+    <a:masterClrMapping/>
+  </p:clrMapOvr>
+</p:sld>
+</file>
+
+<file path=ppt/slides/slide4.xml><?xml version="1.0" encoding="utf-8"?>
+<p:sld xmlns:a="http://schemas.openxmlformats.org/drawingml/2006/main" xmlns:r="http://schemas.openxmlformats.org/officeDocument/2006/relationships" xmlns:p="http://schemas.openxmlformats.org/presentationml/2006/main">
+  <p:cSld>
+    <p:spTree>
+      <p:nvGrpSpPr>
+        <p:cNvPr id="1" name=""/>
+        <p:cNvGrpSpPr/>
+        <p:nvPr/>
+      </p:nvGrpSpPr>
+      <p:grpSpPr>
+        <a:xfrm>
+          <a:off x="0" y="0"/>
+          <a:ext cx="0" cy="0"/>
+          <a:chOff x="0" y="0"/>
+          <a:chExt cx="0" cy="0"/>
+        </a:xfrm>
+      </p:grpSpPr>
+      <p:sp>
+        <p:nvSpPr>
+          <p:cNvPr id="3" name="Text Placeholder 2"/>
+          <p:cNvSpPr>
+            <a:spLocks noGrp="1"/>
+          </p:cNvSpPr>
+          <p:nvPr>
+            <p:ph type="body" idx="1"/>
+          </p:nvPr>
+        </p:nvSpPr>
+        <p:spPr>
+          <a:xfrm>
+            <a:off x="170322" y="764704"/>
+            <a:ext cx="8712968" cy="1368151"/>
+          </a:xfrm>
+        </p:spPr>
+        <p:txBody>
+          <a:bodyPr/>
+          <a:lstStyle/>
+          <a:p>
+            <a:pPr>
+              <a:buSzPct val="113000"/>
+            </a:pPr>
+            <a:r>
+              <a:rPr lang="en-US" sz="1600" dirty="0" smtClean="0"/>
+              <a:t> Use of blockchain based systems to provide untamperable, distributed database.</a:t>
+            </a:r>
+          </a:p>
+          <a:p>
+            <a:pPr>
+              <a:buSzPct val="113000"/>
+            </a:pPr>
+            <a:r>
+              <a:rPr lang="en-US" sz="1600" dirty="0" smtClean="0"/>
+              <a:t> The probabilistic data base is space-efficient and provides high accuracy.</a:t>
+            </a:r>
+          </a:p>
+          <a:p>
+            <a:pPr marL="177800" indent="0">
+              <a:buSzPct val="113000"/>
+              <a:buNone/>
+            </a:pPr>
+            <a:r>
+              <a:rPr lang="en-US" sz="1600" dirty="0"/>
+              <a:t> </a:t>
+            </a:r>
+            <a:r>
+              <a:rPr lang="en-US" sz="1600" dirty="0" smtClean="0"/>
+              <a:t>   e</a:t>
+            </a:r>
+            <a:r>
+              <a:rPr lang="en-IN" sz="1600" dirty="0" smtClean="0"/>
+              <a:t>.g. A bloom filter with 1 million items in the filter with error of 0.001% (1 in ten thousand) requires 2925.12 KB memory.</a:t>
+            </a:r>
+            <a:endParaRPr lang="en-US" sz="1600" dirty="0" smtClean="0"/>
+          </a:p>
+        </p:txBody>
+      </p:sp>
+      <p:sp>
+        <p:nvSpPr>
+          <p:cNvPr id="4" name="Text Placeholder 3"/>
+          <p:cNvSpPr>
+            <a:spLocks noGrp="1"/>
+          </p:cNvSpPr>
+          <p:nvPr>
+            <p:ph type="body" idx="2"/>
+          </p:nvPr>
+        </p:nvSpPr>
+        <p:spPr>
+          <a:xfrm>
+            <a:off x="107504" y="2708920"/>
+            <a:ext cx="8856984" cy="3168352"/>
+          </a:xfrm>
+        </p:spPr>
+        <p:txBody>
+          <a:bodyPr/>
+          <a:lstStyle/>
+          <a:p>
+            <a:pPr>
+              <a:buSzPct val="113000"/>
+            </a:pPr>
+            <a:r>
+              <a:rPr lang="en-US" sz="1600" dirty="0" smtClean="0"/>
+              <a:t>Our </a:t>
+            </a:r>
+            <a:r>
+              <a:rPr lang="en-US" sz="1600" dirty="0"/>
+              <a:t>solution provides a facility </a:t>
+            </a:r>
+            <a:r>
+              <a:rPr lang="en-US" sz="1600" dirty="0" smtClean="0"/>
+              <a:t>to protect an authorized </a:t>
+            </a:r>
+            <a:r>
+              <a:rPr lang="en-US" sz="1600" dirty="0"/>
+              <a:t>computer from an unauthorized USB storage devices using both bloom filter and </a:t>
+            </a:r>
+            <a:r>
+              <a:rPr lang="en-US" sz="1600" dirty="0" smtClean="0"/>
+              <a:t>blockchain.</a:t>
+            </a:r>
+          </a:p>
+          <a:p>
+            <a:pPr>
+              <a:buSzPct val="113000"/>
+            </a:pPr>
+            <a:r>
+              <a:rPr lang="en-US" sz="1600" dirty="0" smtClean="0"/>
+              <a:t>Bloom filter also protects the offline machine from unauthorized access.</a:t>
+            </a:r>
+          </a:p>
+          <a:p>
+            <a:pPr>
+              <a:buSzPct val="113000"/>
+            </a:pPr>
+            <a:r>
+              <a:rPr lang="en-US" sz="1600" dirty="0" smtClean="0"/>
+              <a:t> Block chain system keeps a track of the USB devices connected to a machine, and the devices added and removed from the whitelist. It also records the timestamp of the above mentioned activities, MAC address of the respective  machines and the user IDs. Therefore, suspicious activities can be traced back.</a:t>
+            </a:r>
+          </a:p>
+          <a:p>
+            <a:pPr>
+              <a:buSzPct val="113000"/>
+            </a:pPr>
+            <a:r>
+              <a:rPr lang="en-US" sz="1600" dirty="0" smtClean="0"/>
+              <a:t>Even </a:t>
+            </a:r>
+            <a:r>
+              <a:rPr lang="en-US" sz="1600" dirty="0"/>
+              <a:t>if </a:t>
+            </a:r>
+            <a:r>
+              <a:rPr lang="en-US" sz="1600" dirty="0" smtClean="0"/>
+              <a:t>the probabilistic </a:t>
+            </a:r>
+            <a:r>
+              <a:rPr lang="en-US" sz="1600" dirty="0"/>
+              <a:t>database is stolen, </a:t>
+            </a:r>
+            <a:r>
+              <a:rPr lang="en-US" sz="1600" dirty="0" smtClean="0"/>
+              <a:t>as the hash of the MAC address is stored, the MAC address cannot be retrieved.</a:t>
+            </a:r>
+          </a:p>
+          <a:p>
+            <a:pPr>
+              <a:buSzPct val="113000"/>
+            </a:pPr>
+            <a:r>
+              <a:rPr lang="en-IN" sz="1600" dirty="0" smtClean="0"/>
+              <a:t>The encrypted file system in the storage device protects the authorized storage device from connecting to an unauthorized machine.</a:t>
+            </a:r>
+            <a:endParaRPr lang="en-US" sz="1600" dirty="0"/>
+          </a:p>
+        </p:txBody>
+      </p:sp>
+      <p:sp>
+        <p:nvSpPr>
+          <p:cNvPr id="5" name="TextBox 4"/>
+          <p:cNvSpPr txBox="1"/>
+          <p:nvPr/>
+        </p:nvSpPr>
+        <p:spPr>
+          <a:xfrm>
+            <a:off x="431900" y="291097"/>
+            <a:ext cx="7867252" cy="369332"/>
+          </a:xfrm>
+          <a:prstGeom prst="rect">
+            <a:avLst/>
+          </a:prstGeom>
+          <a:noFill/>
+        </p:spPr>
+        <p:txBody>
+          <a:bodyPr wrap="square" rtlCol="0">
+            <a:spAutoFit/>
+          </a:bodyPr>
+          <a:lstStyle/>
+          <a:p>
+            <a:pPr algn="ctr"/>
+            <a:r>
+              <a:rPr lang="en-IN" sz="1800" b="1" dirty="0" smtClean="0">
+                <a:latin typeface="Calibri" pitchFamily="34" charset="0"/>
+                <a:cs typeface="Calibri" pitchFamily="34" charset="0"/>
+              </a:rPr>
+              <a:t>NOVELTY</a:t>
+            </a:r>
+            <a:endParaRPr lang="en-US" sz="1800" b="1" dirty="0">
+              <a:latin typeface="Calibri" pitchFamily="34" charset="0"/>
+              <a:cs typeface="Calibri" pitchFamily="34" charset="0"/>
+            </a:endParaRPr>
+          </a:p>
+        </p:txBody>
+      </p:sp>
+      <p:sp>
+        <p:nvSpPr>
+          <p:cNvPr id="6" name="TextBox 5"/>
+          <p:cNvSpPr txBox="1"/>
+          <p:nvPr/>
+        </p:nvSpPr>
+        <p:spPr>
+          <a:xfrm>
+            <a:off x="449164" y="2236222"/>
+            <a:ext cx="8155284" cy="369332"/>
+          </a:xfrm>
+          <a:prstGeom prst="rect">
+            <a:avLst/>
+          </a:prstGeom>
+          <a:noFill/>
+        </p:spPr>
+        <p:txBody>
+          <a:bodyPr wrap="square" rtlCol="0">
+            <a:spAutoFit/>
+          </a:bodyPr>
+          <a:lstStyle/>
+          <a:p>
+            <a:pPr algn="ctr"/>
+            <a:r>
+              <a:rPr lang="en-IN" sz="1800" b="1" dirty="0" smtClean="0">
+                <a:latin typeface="Calibri" pitchFamily="34" charset="0"/>
+                <a:cs typeface="Calibri" pitchFamily="34" charset="0"/>
+              </a:rPr>
+              <a:t>SECURITY</a:t>
+            </a:r>
+            <a:endParaRPr lang="en-US" sz="1800" b="1" dirty="0">
+              <a:latin typeface="Calibri" pitchFamily="34" charset="0"/>
+              <a:cs typeface="Calibri" pitchFamily="34" charset="0"/>
+            </a:endParaRPr>
+          </a:p>
+        </p:txBody>
+      </p:sp>
+    </p:spTree>
+    <p:extLst>
+      <p:ext uri="{BB962C8B-B14F-4D97-AF65-F5344CB8AC3E}">
+        <p14:creationId xmlns:p14="http://schemas.microsoft.com/office/powerpoint/2010/main" val="356556655"/>
+      </p:ext>
+    </p:extLst>
   </p:cSld>
   <p:clrMapOvr>
     <a:masterClrMapping/>

</xml_diff>

<commit_message>
novelty/security description is improved
</commit_message>
<xml_diff>
--- a/Gov_templates/USB_whitelist.pptx
+++ b/Gov_templates/USB_whitelist.pptx
@@ -9,8 +9,8 @@
   </p:notesMasterIdLst>
   <p:sldIdLst>
     <p:sldId id="256" r:id="rId2"/>
-    <p:sldId id="258" r:id="rId3"/>
-    <p:sldId id="257" r:id="rId4"/>
+    <p:sldId id="257" r:id="rId3"/>
+    <p:sldId id="258" r:id="rId4"/>
     <p:sldId id="259" r:id="rId5"/>
   </p:sldIdLst>
   <p:sldSz cx="9144000" cy="6858000" type="screen4x3"/>
@@ -217,7 +217,27 @@
       </a:defRPr>
     </a:lvl9pPr>
   </p:defaultTextStyle>
+  <p:extLst>
+    <p:ext uri="{EFAFB233-063F-42B5-8137-9DF3F51BA10A}">
+      <p15:sldGuideLst xmlns:p15="http://schemas.microsoft.com/office/powerpoint/2012/main">
+        <p15:guide id="1" orient="horz" pos="2160">
+          <p15:clr>
+            <a:srgbClr val="A4A3A4"/>
+          </p15:clr>
+        </p15:guide>
+        <p15:guide id="2" pos="2880">
+          <p15:clr>
+            <a:srgbClr val="A4A3A4"/>
+          </p15:clr>
+        </p15:guide>
+      </p15:sldGuideLst>
+    </p:ext>
+  </p:extLst>
 </p:presentation>
+</file>
+
+<file path=ppt/revisionInfo.xml><?xml version="1.0" encoding="utf-8"?>
+<p1510:revInfo xmlns:a="http://schemas.openxmlformats.org/drawingml/2006/main" xmlns:r="http://schemas.openxmlformats.org/officeDocument/2006/relationships" xmlns:p1510="http://schemas.microsoft.com/office/powerpoint/2015/10/main"/>
 </file>
 
 <file path=ppt/notesMasters/notesMaster1.xml><?xml version="1.0" encoding="utf-8"?>
@@ -610,7 +630,7 @@
   <p:cSld>
     <p:spTree>
       <p:nvGrpSpPr>
-        <p:cNvPr id="1" name="Shape 97"/>
+        <p:cNvPr id="1" name="Shape 88"/>
         <p:cNvGrpSpPr/>
         <p:nvPr/>
       </p:nvGrpSpPr>
@@ -624,7 +644,7 @@
       </p:grpSpPr>
       <p:sp>
         <p:nvSpPr>
-          <p:cNvPr id="98" name="Shape 98"/>
+          <p:cNvPr id="89" name="Shape 89"/>
           <p:cNvSpPr txBox="1">
             <a:spLocks noGrp="1"/>
           </p:cNvSpPr>
@@ -663,7 +683,7 @@
       </p:sp>
       <p:sp>
         <p:nvSpPr>
-          <p:cNvPr id="99" name="Shape 99"/>
+          <p:cNvPr id="90" name="Shape 90"/>
           <p:cNvSpPr>
             <a:spLocks noGrp="1" noRot="1" noChangeAspect="1"/>
           </p:cNvSpPr>
@@ -715,7 +735,7 @@
   <p:cSld>
     <p:spTree>
       <p:nvGrpSpPr>
-        <p:cNvPr id="1" name="Shape 88"/>
+        <p:cNvPr id="1" name="Shape 97"/>
         <p:cNvGrpSpPr/>
         <p:nvPr/>
       </p:nvGrpSpPr>
@@ -729,7 +749,7 @@
       </p:grpSpPr>
       <p:sp>
         <p:nvSpPr>
-          <p:cNvPr id="89" name="Shape 89"/>
+          <p:cNvPr id="98" name="Shape 98"/>
           <p:cNvSpPr txBox="1">
             <a:spLocks noGrp="1"/>
           </p:cNvSpPr>
@@ -768,7 +788,7 @@
       </p:sp>
       <p:sp>
         <p:nvSpPr>
-          <p:cNvPr id="90" name="Shape 90"/>
+          <p:cNvPr id="99" name="Shape 99"/>
           <p:cNvSpPr>
             <a:spLocks noGrp="1" noRot="1" noChangeAspect="1"/>
           </p:cNvSpPr>
@@ -11352,31 +11372,7 @@
                 <a:cs typeface="Calibri"/>
                 <a:sym typeface="Calibri"/>
               </a:rPr>
-              <a:t>: Prototype/application for whitelisting of USB devices in OFB which can be subsequently used on internet as well as on </a:t>
-            </a:r>
-            <a:r>
-              <a:rPr lang="en-IN" sz="1800" b="0" i="0" u="none" strike="noStrike" cap="none" dirty="0" smtClean="0">
-                <a:solidFill>
-                  <a:schemeClr val="dk1"/>
-                </a:solidFill>
-                <a:latin typeface="Calibri"/>
-                <a:ea typeface="Calibri"/>
-                <a:cs typeface="Calibri"/>
-                <a:sym typeface="Calibri"/>
-              </a:rPr>
-              <a:t>intranet.</a:t>
-            </a:r>
-            <a:r>
-              <a:rPr lang="en-IN" sz="1800" b="0" i="0" u="none" strike="noStrike" cap="none" dirty="0">
-                <a:solidFill>
-                  <a:schemeClr val="dk1"/>
-                </a:solidFill>
-                <a:latin typeface="Calibri"/>
-                <a:ea typeface="Calibri"/>
-                <a:cs typeface="Calibri"/>
-                <a:sym typeface="Calibri"/>
-              </a:rPr>
-              <a:t>	</a:t>
+              <a:t>: Prototype/application for whitelisting of USB devices in OFB which can be subsequently used on internet as well as on intranet.	</a:t>
             </a:r>
           </a:p>
           <a:p>
@@ -11407,7 +11403,7 @@
               <a:t>Problem Code</a:t>
             </a:r>
             <a:r>
-              <a:rPr lang="en-IN" sz="1800" b="0" i="0" u="none" strike="noStrike" cap="none" dirty="0" smtClean="0">
+              <a:rPr lang="en-IN" sz="1800" b="0" i="0" u="none" strike="noStrike" cap="none" dirty="0">
                 <a:solidFill>
                   <a:schemeClr val="dk1"/>
                 </a:solidFill>
@@ -11416,43 +11412,7 @@
                 <a:cs typeface="Calibri"/>
                 <a:sym typeface="Calibri"/>
               </a:rPr>
-              <a:t>:  #MOD7</a:t>
-            </a:r>
-            <a:r>
-              <a:rPr lang="en-IN" sz="1800" b="0" i="0" u="none" strike="noStrike" cap="none" dirty="0">
-                <a:solidFill>
-                  <a:schemeClr val="dk1"/>
-                </a:solidFill>
-                <a:latin typeface="Calibri"/>
-                <a:ea typeface="Calibri"/>
-                <a:cs typeface="Calibri"/>
-                <a:sym typeface="Calibri"/>
-              </a:rPr>
-              <a:t>			</a:t>
-            </a:r>
-            <a:r>
-              <a:rPr lang="en-IN" sz="1800" b="0" i="0" u="none" strike="noStrike" cap="none" dirty="0" smtClean="0">
-                <a:solidFill>
-                  <a:schemeClr val="dk1"/>
-                </a:solidFill>
-                <a:latin typeface="Calibri"/>
-                <a:ea typeface="Calibri"/>
-                <a:cs typeface="Calibri"/>
-                <a:sym typeface="Calibri"/>
-              </a:rPr>
-              <a:t>	</a:t>
-            </a:r>
-            <a:r>
-              <a:rPr lang="en-IN" sz="1800" b="1" i="0" u="none" strike="noStrike" cap="none" dirty="0" smtClean="0">
-                <a:solidFill>
-                  <a:schemeClr val="dk1"/>
-                </a:solidFill>
-                <a:latin typeface="Calibri"/>
-                <a:ea typeface="Calibri"/>
-                <a:cs typeface="Calibri"/>
-                <a:sym typeface="Calibri"/>
-              </a:rPr>
-              <a:t>Team </a:t>
+              <a:t>:  #MOD7				</a:t>
             </a:r>
             <a:r>
               <a:rPr lang="en-IN" sz="1800" b="1" i="0" u="none" strike="noStrike" cap="none" dirty="0">
@@ -11464,29 +11424,8 @@
                 <a:cs typeface="Calibri"/>
                 <a:sym typeface="Calibri"/>
               </a:rPr>
-              <a:t>Name: </a:t>
+              <a:t>Team Name:  X-GEN</a:t>
             </a:r>
-            <a:r>
-              <a:rPr lang="en-IN" sz="1800" b="1" i="0" u="none" strike="noStrike" cap="none" dirty="0" smtClean="0">
-                <a:solidFill>
-                  <a:schemeClr val="dk1"/>
-                </a:solidFill>
-                <a:latin typeface="Calibri"/>
-                <a:ea typeface="Calibri"/>
-                <a:cs typeface="Calibri"/>
-                <a:sym typeface="Calibri"/>
-              </a:rPr>
-              <a:t> X-GEN</a:t>
-            </a:r>
-            <a:endParaRPr lang="en-IN" sz="1800" b="1" i="0" u="none" strike="noStrike" cap="none" dirty="0">
-              <a:solidFill>
-                <a:schemeClr val="dk1"/>
-              </a:solidFill>
-              <a:latin typeface="Calibri"/>
-              <a:ea typeface="Calibri"/>
-              <a:cs typeface="Calibri"/>
-              <a:sym typeface="Calibri"/>
-            </a:endParaRPr>
           </a:p>
           <a:p>
             <a:pPr marL="0" marR="0" lvl="0" indent="-101600" algn="l" rtl="0">
@@ -11525,7 +11464,7 @@
               <a:t>: </a:t>
             </a:r>
             <a:r>
-              <a:rPr lang="en-IN" sz="1800" b="0" i="0" u="none" strike="noStrike" cap="none" dirty="0" err="1" smtClean="0">
+              <a:rPr lang="en-IN" sz="1800" b="0" i="0" u="none" strike="noStrike" cap="none" dirty="0" err="1">
                 <a:solidFill>
                   <a:schemeClr val="dk1"/>
                 </a:solidFill>
@@ -11537,7 +11476,7 @@
               <a:t>Akshata</a:t>
             </a:r>
             <a:r>
-              <a:rPr lang="en-IN" sz="1800" b="0" i="0" u="none" strike="noStrike" cap="none" dirty="0" smtClean="0">
+              <a:rPr lang="en-IN" sz="1800" b="0" i="0" u="none" strike="noStrike" cap="none" dirty="0">
                 <a:solidFill>
                   <a:schemeClr val="dk1"/>
                 </a:solidFill>
@@ -11549,7 +11488,7 @@
               <a:t>  </a:t>
             </a:r>
             <a:r>
-              <a:rPr lang="en-IN" sz="1800" b="0" i="0" u="none" strike="noStrike" cap="none" dirty="0" err="1" smtClean="0">
+              <a:rPr lang="en-IN" sz="1800" b="0" i="0" u="none" strike="noStrike" cap="none" dirty="0" err="1">
                 <a:solidFill>
                   <a:schemeClr val="dk1"/>
                 </a:solidFill>
@@ -11716,29 +11655,8 @@
                 <a:cs typeface="Calibri"/>
                 <a:sym typeface="Calibri"/>
               </a:rPr>
-              <a:t>This can be implemented using Blockchain system which provides tamper-proof dataset e.g. – Hyperledger. We will implement encryption on top of blockchain </a:t>
+              <a:t>This can be implemented using Blockchain system which provides tamper-proof dataset e.g. – Hyperledger. We will implement encryption on top of blockchain infrastructure.</a:t>
             </a:r>
-            <a:r>
-              <a:rPr lang="en-IN" sz="1600" b="0" i="0" u="none" strike="noStrike" cap="none" dirty="0" smtClean="0">
-                <a:solidFill>
-                  <a:schemeClr val="dk1"/>
-                </a:solidFill>
-                <a:latin typeface="Calibri"/>
-                <a:ea typeface="Calibri"/>
-                <a:cs typeface="Calibri"/>
-                <a:sym typeface="Calibri"/>
-              </a:rPr>
-              <a:t>infrastructure.</a:t>
-            </a:r>
-            <a:endParaRPr lang="en-IN" sz="1600" b="0" i="0" u="none" strike="noStrike" cap="none" dirty="0">
-              <a:solidFill>
-                <a:schemeClr val="dk1"/>
-              </a:solidFill>
-              <a:latin typeface="Calibri"/>
-              <a:ea typeface="Calibri"/>
-              <a:cs typeface="Calibri"/>
-              <a:sym typeface="Calibri"/>
-            </a:endParaRPr>
           </a:p>
           <a:p>
             <a:pPr marL="285750" marR="0" lvl="0" indent="-285750" algn="l" rtl="0">
@@ -11762,58 +11680,10 @@
                 <a:cs typeface="Calibri"/>
                 <a:sym typeface="Calibri"/>
               </a:rPr>
-              <a:t>When the storage device is connected to the computer a program will extract the MAC </a:t>
+              <a:t>When the storage device is connected to the computer a program will extract the MAC address, generate a hash and check if </a:t>
             </a:r>
             <a:r>
-              <a:rPr lang="en-IN" sz="1600" b="0" i="0" u="none" strike="noStrike" cap="none" dirty="0" smtClean="0">
-                <a:solidFill>
-                  <a:schemeClr val="dk1"/>
-                </a:solidFill>
-                <a:latin typeface="Calibri"/>
-                <a:ea typeface="Calibri"/>
-                <a:cs typeface="Calibri"/>
-                <a:sym typeface="Calibri"/>
-              </a:rPr>
-              <a:t>address, generate a hash </a:t>
-            </a:r>
-            <a:r>
-              <a:rPr lang="en-IN" sz="1600" b="0" i="0" u="none" strike="noStrike" cap="none" dirty="0">
-                <a:solidFill>
-                  <a:schemeClr val="dk1"/>
-                </a:solidFill>
-                <a:latin typeface="Calibri"/>
-                <a:ea typeface="Calibri"/>
-                <a:cs typeface="Calibri"/>
-                <a:sym typeface="Calibri"/>
-              </a:rPr>
-              <a:t>and </a:t>
-            </a:r>
-            <a:r>
-              <a:rPr lang="en-IN" sz="1600" b="0" i="0" u="none" strike="noStrike" cap="none" dirty="0" smtClean="0">
-                <a:solidFill>
-                  <a:schemeClr val="dk1"/>
-                </a:solidFill>
-                <a:latin typeface="Calibri"/>
-                <a:ea typeface="Calibri"/>
-                <a:cs typeface="Calibri"/>
-                <a:sym typeface="Calibri"/>
-              </a:rPr>
-              <a:t>check </a:t>
-            </a:r>
-            <a:r>
-              <a:rPr lang="en-IN" sz="1600" b="0" i="0" u="none" strike="noStrike" cap="none" dirty="0">
-                <a:solidFill>
-                  <a:schemeClr val="dk1"/>
-                </a:solidFill>
-                <a:latin typeface="Calibri"/>
-                <a:ea typeface="Calibri"/>
-                <a:cs typeface="Calibri"/>
-                <a:sym typeface="Calibri"/>
-              </a:rPr>
-              <a:t>if </a:t>
-            </a:r>
-            <a:r>
-              <a:rPr lang="en-IN" sz="1600" dirty="0" smtClean="0">
+              <a:rPr lang="en-IN" sz="1600" dirty="0">
                 <a:solidFill>
                   <a:schemeClr val="dk1"/>
                 </a:solidFill>
@@ -11825,7 +11695,7 @@
               <a:t>hash</a:t>
             </a:r>
             <a:r>
-              <a:rPr lang="en-IN" sz="1600" b="0" i="0" u="none" strike="noStrike" cap="none" dirty="0" smtClean="0">
+              <a:rPr lang="en-IN" sz="1600" b="0" i="0" u="none" strike="noStrike" cap="none" dirty="0">
                 <a:solidFill>
                   <a:schemeClr val="dk1"/>
                 </a:solidFill>
@@ -11834,22 +11704,10 @@
                 <a:cs typeface="Calibri"/>
                 <a:sym typeface="Calibri"/>
               </a:rPr>
-              <a:t> </a:t>
+              <a:t> is present </a:t>
             </a:r>
             <a:r>
-              <a:rPr lang="en-IN" sz="1600" b="0" i="0" u="none" strike="noStrike" cap="none" dirty="0">
-                <a:solidFill>
-                  <a:schemeClr val="dk1"/>
-                </a:solidFill>
-                <a:latin typeface="Calibri"/>
-                <a:ea typeface="Calibri"/>
-                <a:cs typeface="Calibri"/>
-                <a:sym typeface="Calibri"/>
-              </a:rPr>
-              <a:t>is present </a:t>
-            </a:r>
-            <a:r>
-              <a:rPr lang="en-IN" sz="1600" dirty="0" smtClean="0">
+              <a:rPr lang="en-IN" sz="1600" dirty="0">
                 <a:solidFill>
                   <a:schemeClr val="dk1"/>
                 </a:solidFill>
@@ -11861,7 +11719,7 @@
               <a:t>in the local</a:t>
             </a:r>
             <a:r>
-              <a:rPr lang="en-IN" sz="1600" b="0" i="0" u="none" strike="noStrike" cap="none" dirty="0" smtClean="0">
+              <a:rPr lang="en-IN" sz="1600" b="0" i="0" u="none" strike="noStrike" cap="none" dirty="0">
                 <a:solidFill>
                   <a:schemeClr val="dk1"/>
                 </a:solidFill>
@@ -11870,43 +11728,7 @@
                 <a:cs typeface="Calibri"/>
                 <a:sym typeface="Calibri"/>
               </a:rPr>
-              <a:t> </a:t>
-            </a:r>
-            <a:r>
-              <a:rPr lang="en-IN" sz="1600" b="0" i="0" u="none" strike="noStrike" cap="none" dirty="0">
-                <a:solidFill>
-                  <a:schemeClr val="dk1"/>
-                </a:solidFill>
-                <a:latin typeface="Calibri"/>
-                <a:ea typeface="Calibri"/>
-                <a:cs typeface="Calibri"/>
-                <a:sym typeface="Calibri"/>
-              </a:rPr>
-              <a:t>database. A local probabilistic database (e.g. like bloom filter) will be used to check if the </a:t>
-            </a:r>
-            <a:r>
-              <a:rPr lang="en-IN" sz="1600" b="0" i="0" u="none" strike="noStrike" cap="none" dirty="0" smtClean="0">
-                <a:solidFill>
-                  <a:schemeClr val="dk1"/>
-                </a:solidFill>
-                <a:latin typeface="Calibri"/>
-                <a:ea typeface="Calibri"/>
-                <a:cs typeface="Calibri"/>
-                <a:sym typeface="Calibri"/>
-              </a:rPr>
-              <a:t>hash of the MAC </a:t>
-            </a:r>
-            <a:r>
-              <a:rPr lang="en-IN" sz="1600" b="0" i="0" u="none" strike="noStrike" cap="none" dirty="0">
-                <a:solidFill>
-                  <a:schemeClr val="dk1"/>
-                </a:solidFill>
-                <a:latin typeface="Calibri"/>
-                <a:ea typeface="Calibri"/>
-                <a:cs typeface="Calibri"/>
-                <a:sym typeface="Calibri"/>
-              </a:rPr>
-              <a:t>address is whi</a:t>
+              <a:t> database. A local probabilistic database (e.g. like bloom filter) will be used to check if the hash of the MAC address is whi</a:t>
             </a:r>
             <a:r>
               <a:rPr lang="en-IN" sz="1600" dirty="0">
@@ -11933,7 +11755,7 @@
               <a:t>listed. If </a:t>
             </a:r>
             <a:r>
-              <a:rPr lang="en-IN" sz="1600" dirty="0" smtClean="0">
+              <a:rPr lang="en-IN" sz="1600" dirty="0">
                 <a:solidFill>
                   <a:schemeClr val="dk1"/>
                 </a:solidFill>
@@ -11945,7 +11767,7 @@
               <a:t>hash</a:t>
             </a:r>
             <a:r>
-              <a:rPr lang="en-IN" sz="1600" b="0" i="0" u="none" strike="noStrike" cap="none" dirty="0" smtClean="0">
+              <a:rPr lang="en-IN" sz="1600" b="0" i="0" u="none" strike="noStrike" cap="none" dirty="0">
                 <a:solidFill>
                   <a:schemeClr val="dk1"/>
                 </a:solidFill>
@@ -11954,22 +11776,10 @@
                 <a:cs typeface="Calibri"/>
                 <a:sym typeface="Calibri"/>
               </a:rPr>
-              <a:t> </a:t>
+              <a:t> is not on the whitelist then the OS event will notify the </a:t>
             </a:r>
             <a:r>
-              <a:rPr lang="en-IN" sz="1600" b="0" i="0" u="none" strike="noStrike" cap="none" dirty="0">
-                <a:solidFill>
-                  <a:schemeClr val="dk1"/>
-                </a:solidFill>
-                <a:latin typeface="Calibri"/>
-                <a:ea typeface="Calibri"/>
-                <a:cs typeface="Calibri"/>
-                <a:sym typeface="Calibri"/>
-              </a:rPr>
-              <a:t>is not on the whitelist then the OS event will notify the </a:t>
-            </a:r>
-            <a:r>
-              <a:rPr lang="en-IN" sz="1600" dirty="0" smtClean="0">
+              <a:rPr lang="en-IN" sz="1600" dirty="0">
                 <a:solidFill>
                   <a:schemeClr val="dk1"/>
                 </a:solidFill>
@@ -11981,7 +11791,7 @@
               <a:t>admin</a:t>
             </a:r>
             <a:r>
-              <a:rPr lang="en-IN" sz="1600" b="0" i="0" u="none" strike="noStrike" cap="none" dirty="0" smtClean="0">
+              <a:rPr lang="en-IN" sz="1600" b="0" i="0" u="none" strike="noStrike" cap="none" dirty="0">
                 <a:solidFill>
                   <a:schemeClr val="dk1"/>
                 </a:solidFill>
@@ -11990,22 +11800,10 @@
                 <a:cs typeface="Calibri"/>
                 <a:sym typeface="Calibri"/>
               </a:rPr>
-              <a:t> </a:t>
+              <a:t> regarding the same and block it. Use of Probabilistic database will </a:t>
             </a:r>
             <a:r>
-              <a:rPr lang="en-IN" sz="1600" b="0" i="0" u="none" strike="noStrike" cap="none" dirty="0">
-                <a:solidFill>
-                  <a:schemeClr val="dk1"/>
-                </a:solidFill>
-                <a:latin typeface="Calibri"/>
-                <a:ea typeface="Calibri"/>
-                <a:cs typeface="Calibri"/>
-                <a:sym typeface="Calibri"/>
-              </a:rPr>
-              <a:t>regarding the same and block it. Use of Probabilistic database will </a:t>
-            </a:r>
-            <a:r>
-              <a:rPr lang="en-IN" sz="1600" dirty="0" smtClean="0">
+              <a:rPr lang="en-IN" sz="1600" dirty="0">
                 <a:solidFill>
                   <a:schemeClr val="dk1"/>
                 </a:solidFill>
@@ -12017,7 +11815,7 @@
               <a:t>protect</a:t>
             </a:r>
             <a:r>
-              <a:rPr lang="en-IN" sz="1600" b="0" i="0" u="none" strike="noStrike" cap="none" dirty="0" smtClean="0">
+              <a:rPr lang="en-IN" sz="1600" b="0" i="0" u="none" strike="noStrike" cap="none" dirty="0">
                 <a:solidFill>
                   <a:schemeClr val="dk1"/>
                 </a:solidFill>
@@ -12026,46 +11824,10 @@
                 <a:cs typeface="Calibri"/>
                 <a:sym typeface="Calibri"/>
               </a:rPr>
-              <a:t> </a:t>
+              <a:t> the system working on internet/intranet </a:t>
             </a:r>
             <a:r>
-              <a:rPr lang="en-IN" sz="1600" b="0" i="0" u="none" strike="noStrike" cap="none" dirty="0">
-                <a:solidFill>
-                  <a:schemeClr val="dk1"/>
-                </a:solidFill>
-                <a:latin typeface="Calibri"/>
-                <a:ea typeface="Calibri"/>
-                <a:cs typeface="Calibri"/>
-                <a:sym typeface="Calibri"/>
-              </a:rPr>
-              <a:t>the system </a:t>
-            </a:r>
-            <a:r>
-              <a:rPr lang="en-IN" sz="1600" b="0" i="0" u="none" strike="noStrike" cap="none" dirty="0" smtClean="0">
-                <a:solidFill>
-                  <a:schemeClr val="dk1"/>
-                </a:solidFill>
-                <a:latin typeface="Calibri"/>
-                <a:ea typeface="Calibri"/>
-                <a:cs typeface="Calibri"/>
-                <a:sym typeface="Calibri"/>
-              </a:rPr>
-              <a:t>working </a:t>
-            </a:r>
-            <a:r>
-              <a:rPr lang="en-IN" sz="1600" b="0" i="0" u="none" strike="noStrike" cap="none" dirty="0">
-                <a:solidFill>
-                  <a:schemeClr val="dk1"/>
-                </a:solidFill>
-                <a:latin typeface="Calibri"/>
-                <a:ea typeface="Calibri"/>
-                <a:cs typeface="Calibri"/>
-                <a:sym typeface="Calibri"/>
-              </a:rPr>
-              <a:t>on internet/intranet </a:t>
-            </a:r>
-            <a:r>
-              <a:rPr lang="en-IN" sz="1600" dirty="0" smtClean="0">
+              <a:rPr lang="en-IN" sz="1600" dirty="0">
                 <a:solidFill>
                   <a:schemeClr val="dk1"/>
                 </a:solidFill>
@@ -12077,7 +11839,7 @@
               <a:t>and</a:t>
             </a:r>
             <a:r>
-              <a:rPr lang="en-IN" sz="1600" b="0" i="0" u="none" strike="noStrike" cap="none" dirty="0" smtClean="0">
+              <a:rPr lang="en-IN" sz="1600" b="0" i="0" u="none" strike="noStrike" cap="none" dirty="0">
                 <a:solidFill>
                   <a:schemeClr val="dk1"/>
                 </a:solidFill>
@@ -12086,19 +11848,7 @@
                 <a:cs typeface="Calibri"/>
                 <a:sym typeface="Calibri"/>
               </a:rPr>
-              <a:t> </a:t>
-            </a:r>
-            <a:r>
-              <a:rPr lang="en-IN" sz="1600" b="0" i="0" u="none" strike="noStrike" cap="none" dirty="0">
-                <a:solidFill>
-                  <a:schemeClr val="dk1"/>
-                </a:solidFill>
-                <a:latin typeface="Calibri"/>
-                <a:ea typeface="Calibri"/>
-                <a:cs typeface="Calibri"/>
-                <a:sym typeface="Calibri"/>
-              </a:rPr>
-              <a:t>disconnected computers from the unauthorized storage devices. The program used, handles the connectivity of storage devices with the computer.</a:t>
+              <a:t> disconnected computers from the unauthorized storage devices. The program used, handles the connectivity of storage devices with the computer.</a:t>
             </a:r>
           </a:p>
           <a:p>
@@ -12126,7 +11876,7 @@
               <a:t>Another level of security will be </a:t>
             </a:r>
             <a:r>
-              <a:rPr lang="en-IN" sz="1600" dirty="0" smtClean="0">
+              <a:rPr lang="en-IN" sz="1600" dirty="0">
                 <a:solidFill>
                   <a:schemeClr val="dk1"/>
                 </a:solidFill>
@@ -12138,7 +11888,7 @@
               <a:t>to create</a:t>
             </a:r>
             <a:r>
-              <a:rPr lang="en-IN" sz="1600" b="0" i="0" u="none" strike="noStrike" cap="none" dirty="0" smtClean="0">
+              <a:rPr lang="en-IN" sz="1600" b="0" i="0" u="none" strike="noStrike" cap="none" dirty="0">
                 <a:solidFill>
                   <a:schemeClr val="dk1"/>
                 </a:solidFill>
@@ -12147,7 +11897,19 @@
                 <a:cs typeface="Calibri"/>
                 <a:sym typeface="Calibri"/>
               </a:rPr>
-              <a:t> </a:t>
+              <a:t> an encrypted file system on storage device</a:t>
+            </a:r>
+            <a:r>
+              <a:rPr lang="en-IN" sz="1600" dirty="0">
+                <a:solidFill>
+                  <a:schemeClr val="dk1"/>
+                </a:solidFill>
+                <a:latin typeface="Calibri"/>
+                <a:ea typeface="Calibri"/>
+                <a:cs typeface="Calibri"/>
+                <a:sym typeface="Calibri"/>
+              </a:rPr>
+              <a:t> and  a decryption algorithm for the same on authorized computer. </a:t>
             </a:r>
             <a:r>
               <a:rPr lang="en-IN" sz="1600" b="0" i="0" u="none" strike="noStrike" cap="none" dirty="0">
@@ -12159,137 +11921,8 @@
                 <a:cs typeface="Calibri"/>
                 <a:sym typeface="Calibri"/>
               </a:rPr>
-              <a:t>an encrypted </a:t>
+              <a:t>This prevents data transfer from authorized storage device to unauthorized computer. File system will get decrypted automatically when a whitelisted storage device is connected to an authorized computer. If decrypted correctly, only then data transfer or access between storage device and computer is possible. </a:t>
             </a:r>
-            <a:r>
-              <a:rPr lang="en-IN" sz="1600" b="0" i="0" u="none" strike="noStrike" cap="none" dirty="0" smtClean="0">
-                <a:solidFill>
-                  <a:schemeClr val="dk1"/>
-                </a:solidFill>
-                <a:latin typeface="Calibri"/>
-                <a:ea typeface="Calibri"/>
-                <a:cs typeface="Calibri"/>
-                <a:sym typeface="Calibri"/>
-              </a:rPr>
-              <a:t>file system </a:t>
-            </a:r>
-            <a:r>
-              <a:rPr lang="en-IN" sz="1600" b="0" i="0" u="none" strike="noStrike" cap="none" dirty="0">
-                <a:solidFill>
-                  <a:schemeClr val="dk1"/>
-                </a:solidFill>
-                <a:latin typeface="Calibri"/>
-                <a:ea typeface="Calibri"/>
-                <a:cs typeface="Calibri"/>
-                <a:sym typeface="Calibri"/>
-              </a:rPr>
-              <a:t>on storage </a:t>
-            </a:r>
-            <a:r>
-              <a:rPr lang="en-IN" sz="1600" b="0" i="0" u="none" strike="noStrike" cap="none" dirty="0" smtClean="0">
-                <a:solidFill>
-                  <a:schemeClr val="dk1"/>
-                </a:solidFill>
-                <a:latin typeface="Calibri"/>
-                <a:ea typeface="Calibri"/>
-                <a:cs typeface="Calibri"/>
-                <a:sym typeface="Calibri"/>
-              </a:rPr>
-              <a:t>device</a:t>
-            </a:r>
-            <a:r>
-              <a:rPr lang="en-IN" sz="1600" dirty="0">
-                <a:solidFill>
-                  <a:schemeClr val="dk1"/>
-                </a:solidFill>
-                <a:latin typeface="Calibri"/>
-                <a:ea typeface="Calibri"/>
-                <a:cs typeface="Calibri"/>
-                <a:sym typeface="Calibri"/>
-              </a:rPr>
-              <a:t> </a:t>
-            </a:r>
-            <a:r>
-              <a:rPr lang="en-IN" sz="1600" dirty="0" smtClean="0">
-                <a:solidFill>
-                  <a:schemeClr val="dk1"/>
-                </a:solidFill>
-                <a:latin typeface="Calibri"/>
-                <a:ea typeface="Calibri"/>
-                <a:cs typeface="Calibri"/>
-                <a:sym typeface="Calibri"/>
-              </a:rPr>
-              <a:t>and  a decryption algorithm for the same on authorized computer. </a:t>
-            </a:r>
-            <a:r>
-              <a:rPr lang="en-IN" sz="1600" b="0" i="0" u="none" strike="noStrike" cap="none" dirty="0" smtClean="0">
-                <a:solidFill>
-                  <a:schemeClr val="dk1"/>
-                </a:solidFill>
-                <a:latin typeface="Calibri"/>
-                <a:ea typeface="Calibri"/>
-                <a:cs typeface="Calibri"/>
-                <a:sym typeface="Calibri"/>
-              </a:rPr>
-              <a:t>This prevents data transfer from authorized storage device to unauthorized computer. File system </a:t>
-            </a:r>
-            <a:r>
-              <a:rPr lang="en-IN" sz="1600" b="0" i="0" u="none" strike="noStrike" cap="none" dirty="0">
-                <a:solidFill>
-                  <a:schemeClr val="dk1"/>
-                </a:solidFill>
-                <a:latin typeface="Calibri"/>
-                <a:ea typeface="Calibri"/>
-                <a:cs typeface="Calibri"/>
-                <a:sym typeface="Calibri"/>
-              </a:rPr>
-              <a:t>will get decrypted automatically when a whitelisted storage device is connected to an authorized computer. If decrypted </a:t>
-            </a:r>
-            <a:r>
-              <a:rPr lang="en-IN" sz="1600" b="0" i="0" u="none" strike="noStrike" cap="none" dirty="0" smtClean="0">
-                <a:solidFill>
-                  <a:schemeClr val="dk1"/>
-                </a:solidFill>
-                <a:latin typeface="Calibri"/>
-                <a:ea typeface="Calibri"/>
-                <a:cs typeface="Calibri"/>
-                <a:sym typeface="Calibri"/>
-              </a:rPr>
-              <a:t>correctly, only then </a:t>
-            </a:r>
-            <a:r>
-              <a:rPr lang="en-IN" sz="1600" b="0" i="0" u="none" strike="noStrike" cap="none" dirty="0">
-                <a:solidFill>
-                  <a:schemeClr val="dk1"/>
-                </a:solidFill>
-                <a:latin typeface="Calibri"/>
-                <a:ea typeface="Calibri"/>
-                <a:cs typeface="Calibri"/>
-                <a:sym typeface="Calibri"/>
-              </a:rPr>
-              <a:t>data transfer or access between storage device and computer is possible</a:t>
-            </a:r>
-            <a:r>
-              <a:rPr lang="en-IN" sz="1600" b="0" i="0" u="none" strike="noStrike" cap="none" dirty="0" smtClean="0">
-                <a:solidFill>
-                  <a:schemeClr val="dk1"/>
-                </a:solidFill>
-                <a:latin typeface="Calibri"/>
-                <a:ea typeface="Calibri"/>
-                <a:cs typeface="Calibri"/>
-                <a:sym typeface="Calibri"/>
-              </a:rPr>
-              <a:t>. </a:t>
-            </a:r>
-            <a:endParaRPr lang="en-IN" sz="1600" b="0" i="0" u="none" strike="noStrike" cap="none" dirty="0">
-              <a:solidFill>
-                <a:schemeClr val="dk1"/>
-              </a:solidFill>
-              <a:latin typeface="Calibri"/>
-              <a:ea typeface="Calibri"/>
-              <a:cs typeface="Calibri"/>
-              <a:sym typeface="Calibri"/>
-            </a:endParaRPr>
           </a:p>
         </p:txBody>
       </p:sp>
@@ -12302,6 +11935,574 @@
 </file>
 
 <file path=ppt/slides/slide2.xml><?xml version="1.0" encoding="utf-8"?>
+<p:sld xmlns:a="http://schemas.openxmlformats.org/drawingml/2006/main" xmlns:r="http://schemas.openxmlformats.org/officeDocument/2006/relationships" xmlns:p="http://schemas.openxmlformats.org/presentationml/2006/main">
+  <p:cSld>
+    <p:spTree>
+      <p:nvGrpSpPr>
+        <p:cNvPr id="1" name="Shape 91"/>
+        <p:cNvGrpSpPr/>
+        <p:nvPr/>
+      </p:nvGrpSpPr>
+      <p:grpSpPr>
+        <a:xfrm>
+          <a:off x="0" y="0"/>
+          <a:ext cx="0" cy="0"/>
+          <a:chOff x="0" y="0"/>
+          <a:chExt cx="0" cy="0"/>
+        </a:xfrm>
+      </p:grpSpPr>
+      <p:sp>
+        <p:nvSpPr>
+          <p:cNvPr id="92" name="Shape 92"/>
+          <p:cNvSpPr txBox="1"/>
+          <p:nvPr/>
+        </p:nvSpPr>
+        <p:spPr>
+          <a:xfrm>
+            <a:off x="177800" y="280249"/>
+            <a:ext cx="8839200" cy="2284655"/>
+          </a:xfrm>
+          <a:prstGeom prst="rect">
+            <a:avLst/>
+          </a:prstGeom>
+          <a:noFill/>
+          <a:ln>
+            <a:noFill/>
+          </a:ln>
+        </p:spPr>
+        <p:txBody>
+          <a:bodyPr wrap="square" lIns="91425" tIns="45700" rIns="91425" bIns="45700" anchor="t" anchorCtr="0">
+            <a:noAutofit/>
+          </a:bodyPr>
+          <a:lstStyle/>
+          <a:p>
+            <a:pPr marL="285750" marR="0" lvl="0" indent="-285750" algn="l" rtl="0">
+              <a:spcBef>
+                <a:spcPts val="0"/>
+              </a:spcBef>
+              <a:buClr>
+                <a:schemeClr val="dk1"/>
+              </a:buClr>
+              <a:buSzPts val="1800"/>
+              <a:buFont typeface="Arial"/>
+              <a:buChar char="•"/>
+            </a:pPr>
+            <a:r>
+              <a:rPr lang="en-IN" sz="1600" b="0" i="0" u="none" strike="noStrike" cap="none" dirty="0">
+                <a:solidFill>
+                  <a:schemeClr val="dk1"/>
+                </a:solidFill>
+                <a:latin typeface="Calibri"/>
+                <a:ea typeface="Calibri"/>
+                <a:cs typeface="Calibri"/>
+                <a:sym typeface="Calibri"/>
+              </a:rPr>
+              <a:t>The encrypted file system will be created on the storage device when it is connected to the blockchain system for the first time for registration on the database. </a:t>
+            </a:r>
+          </a:p>
+          <a:p>
+            <a:pPr marL="285750" marR="0" lvl="0" indent="-285750" algn="l" rtl="0">
+              <a:spcBef>
+                <a:spcPts val="0"/>
+              </a:spcBef>
+              <a:buClr>
+                <a:schemeClr val="dk1"/>
+              </a:buClr>
+              <a:buSzPts val="1800"/>
+              <a:buFont typeface="Arial"/>
+              <a:buChar char="•"/>
+            </a:pPr>
+            <a:r>
+              <a:rPr lang="en-IN" sz="1600" b="0" i="0" u="none" strike="noStrike" cap="none" dirty="0">
+                <a:solidFill>
+                  <a:schemeClr val="dk1"/>
+                </a:solidFill>
+                <a:latin typeface="Calibri"/>
+                <a:ea typeface="Calibri"/>
+                <a:cs typeface="Calibri"/>
+                <a:sym typeface="Calibri"/>
+              </a:rPr>
+              <a:t>The computers which are offline will also use a probabilistic database of authorized MAC addresses (e.g. like Bloom filter). The driver program on the computer will check the storage device against this probabilistic database. The driver program will block the devices which are not on the whitelist. </a:t>
+            </a:r>
+          </a:p>
+          <a:p>
+            <a:pPr marL="285750" lvl="0" indent="-285750">
+              <a:buClr>
+                <a:schemeClr val="dk1"/>
+              </a:buClr>
+              <a:buSzPts val="1800"/>
+              <a:buFont typeface="Arial"/>
+              <a:buChar char="•"/>
+            </a:pPr>
+            <a:r>
+              <a:rPr lang="en-IN" sz="1600" b="0" i="0" u="none" strike="noStrike" cap="none" dirty="0">
+                <a:solidFill>
+                  <a:schemeClr val="dk1"/>
+                </a:solidFill>
+                <a:latin typeface="Calibri"/>
+                <a:ea typeface="Calibri"/>
+                <a:cs typeface="Calibri"/>
+                <a:sym typeface="Calibri"/>
+              </a:rPr>
+              <a:t>The Bloom filter database will be updated when it is connected to the internet periodically</a:t>
+            </a:r>
+            <a:r>
+              <a:rPr lang="en-IN" sz="1600" dirty="0">
+                <a:solidFill>
+                  <a:schemeClr val="dk1"/>
+                </a:solidFill>
+                <a:latin typeface="Calibri"/>
+                <a:ea typeface="Calibri"/>
+                <a:cs typeface="Calibri"/>
+                <a:sym typeface="Calibri"/>
+              </a:rPr>
+              <a:t>. To update, the whole database is not replaced, instead the delta i.e. difference between the existing database on the Bloom filter and the local database is found and then added to the database of Bloom filter.</a:t>
+            </a:r>
+          </a:p>
+          <a:p>
+            <a:pPr marL="285750" lvl="0" indent="-285750">
+              <a:buClr>
+                <a:schemeClr val="dk1"/>
+              </a:buClr>
+              <a:buSzPts val="1800"/>
+              <a:buFont typeface="Arial"/>
+              <a:buChar char="•"/>
+            </a:pPr>
+            <a:endParaRPr lang="en-IN" sz="1600" b="0" i="0" u="none" strike="noStrike" cap="none" dirty="0">
+              <a:solidFill>
+                <a:schemeClr val="dk1"/>
+              </a:solidFill>
+              <a:latin typeface="Calibri"/>
+              <a:ea typeface="Calibri"/>
+              <a:cs typeface="Calibri"/>
+              <a:sym typeface="Calibri"/>
+            </a:endParaRPr>
+          </a:p>
+          <a:p>
+            <a:pPr marL="285750" lvl="0" indent="-285750">
+              <a:buClr>
+                <a:schemeClr val="dk1"/>
+              </a:buClr>
+              <a:buSzPts val="1800"/>
+              <a:buFont typeface="Arial"/>
+              <a:buChar char="•"/>
+            </a:pPr>
+            <a:endParaRPr lang="en-IN" sz="1600" b="0" i="0" u="none" strike="noStrike" cap="none" dirty="0">
+              <a:solidFill>
+                <a:schemeClr val="dk1"/>
+              </a:solidFill>
+              <a:latin typeface="Calibri"/>
+              <a:ea typeface="Calibri"/>
+              <a:cs typeface="Calibri"/>
+              <a:sym typeface="Calibri"/>
+            </a:endParaRPr>
+          </a:p>
+        </p:txBody>
+      </p:sp>
+      <p:sp>
+        <p:nvSpPr>
+          <p:cNvPr id="93" name="Shape 93"/>
+          <p:cNvSpPr txBox="1"/>
+          <p:nvPr/>
+        </p:nvSpPr>
+        <p:spPr>
+          <a:xfrm>
+            <a:off x="482600" y="2564904"/>
+            <a:ext cx="8229600" cy="346074"/>
+          </a:xfrm>
+          <a:prstGeom prst="rect">
+            <a:avLst/>
+          </a:prstGeom>
+          <a:noFill/>
+          <a:ln>
+            <a:noFill/>
+          </a:ln>
+        </p:spPr>
+        <p:txBody>
+          <a:bodyPr wrap="square" lIns="91425" tIns="45700" rIns="91425" bIns="45700" anchor="t" anchorCtr="0">
+            <a:noAutofit/>
+          </a:bodyPr>
+          <a:lstStyle/>
+          <a:p>
+            <a:pPr marL="0" marR="0" lvl="0" indent="-127000" algn="ctr" rtl="0">
+              <a:spcBef>
+                <a:spcPts val="0"/>
+              </a:spcBef>
+              <a:buClr>
+                <a:schemeClr val="dk1"/>
+              </a:buClr>
+              <a:buSzPts val="2000"/>
+              <a:buFont typeface="Calibri"/>
+              <a:buNone/>
+            </a:pPr>
+            <a:r>
+              <a:rPr lang="en-IN" sz="2000" b="1" i="0" u="none" strike="noStrike" cap="none" dirty="0">
+                <a:solidFill>
+                  <a:schemeClr val="dk1"/>
+                </a:solidFill>
+                <a:latin typeface="Calibri"/>
+                <a:ea typeface="Calibri"/>
+                <a:cs typeface="Calibri"/>
+                <a:sym typeface="Calibri"/>
+              </a:rPr>
+              <a:t>TECHNOLOGY STACK</a:t>
+            </a:r>
+          </a:p>
+        </p:txBody>
+      </p:sp>
+      <p:sp>
+        <p:nvSpPr>
+          <p:cNvPr id="94" name="Shape 94"/>
+          <p:cNvSpPr txBox="1"/>
+          <p:nvPr/>
+        </p:nvSpPr>
+        <p:spPr>
+          <a:xfrm>
+            <a:off x="114300" y="2910978"/>
+            <a:ext cx="8826499" cy="1598142"/>
+          </a:xfrm>
+          <a:prstGeom prst="rect">
+            <a:avLst/>
+          </a:prstGeom>
+          <a:noFill/>
+          <a:ln>
+            <a:noFill/>
+          </a:ln>
+        </p:spPr>
+        <p:txBody>
+          <a:bodyPr wrap="square" lIns="91425" tIns="45700" rIns="91425" bIns="45700" anchor="t" anchorCtr="0">
+            <a:noAutofit/>
+          </a:bodyPr>
+          <a:lstStyle/>
+          <a:p>
+            <a:pPr marL="285750" marR="0" lvl="0" indent="-285750" algn="l" rtl="0">
+              <a:spcBef>
+                <a:spcPts val="0"/>
+              </a:spcBef>
+              <a:buClr>
+                <a:schemeClr val="dk1"/>
+              </a:buClr>
+              <a:buSzPts val="1800"/>
+              <a:buFont typeface="Arial"/>
+              <a:buChar char="•"/>
+            </a:pPr>
+            <a:r>
+              <a:rPr lang="en-IN" sz="1600" dirty="0">
+                <a:solidFill>
+                  <a:schemeClr val="dk1"/>
+                </a:solidFill>
+                <a:latin typeface="Calibri"/>
+                <a:ea typeface="Calibri"/>
+                <a:cs typeface="Calibri"/>
+                <a:sym typeface="Calibri"/>
+              </a:rPr>
+              <a:t>Open Source</a:t>
+            </a:r>
+            <a:r>
+              <a:rPr lang="en-IN" sz="1600" b="0" i="0" u="none" strike="noStrike" cap="none" dirty="0">
+                <a:solidFill>
+                  <a:schemeClr val="dk1"/>
+                </a:solidFill>
+                <a:latin typeface="Calibri"/>
+                <a:ea typeface="Calibri"/>
+                <a:cs typeface="Calibri"/>
+                <a:sym typeface="Calibri"/>
+              </a:rPr>
+              <a:t> Blockchain distributed database like </a:t>
+            </a:r>
+            <a:r>
+              <a:rPr lang="en-IN" sz="1600" dirty="0">
+                <a:solidFill>
+                  <a:schemeClr val="dk1"/>
+                </a:solidFill>
+                <a:latin typeface="Calibri"/>
+                <a:ea typeface="Calibri"/>
+                <a:cs typeface="Calibri"/>
+                <a:sym typeface="Calibri"/>
+              </a:rPr>
+              <a:t>Hyperledger</a:t>
+            </a:r>
+            <a:endParaRPr lang="en-IN" sz="1600" b="0" i="0" u="none" strike="noStrike" cap="none" dirty="0">
+              <a:solidFill>
+                <a:schemeClr val="dk1"/>
+              </a:solidFill>
+              <a:latin typeface="Calibri"/>
+              <a:ea typeface="Calibri"/>
+              <a:cs typeface="Calibri"/>
+              <a:sym typeface="Calibri"/>
+            </a:endParaRPr>
+          </a:p>
+          <a:p>
+            <a:pPr marL="285750" marR="0" lvl="0" indent="-285750" algn="l" rtl="0">
+              <a:spcBef>
+                <a:spcPts val="0"/>
+              </a:spcBef>
+              <a:buClr>
+                <a:schemeClr val="dk1"/>
+              </a:buClr>
+              <a:buSzPts val="1800"/>
+              <a:buFont typeface="Arial"/>
+              <a:buChar char="•"/>
+            </a:pPr>
+            <a:r>
+              <a:rPr lang="en-IN" sz="1600" b="0" i="0" u="none" strike="noStrike" cap="none" dirty="0">
+                <a:solidFill>
+                  <a:schemeClr val="dk1"/>
+                </a:solidFill>
+                <a:latin typeface="Calibri"/>
+                <a:ea typeface="Calibri"/>
+                <a:cs typeface="Calibri"/>
+                <a:sym typeface="Calibri"/>
+              </a:rPr>
+              <a:t>Browser/desktop based front-end for admin</a:t>
+            </a:r>
+          </a:p>
+          <a:p>
+            <a:pPr marL="285750" marR="0" lvl="0" indent="-285750" algn="l" rtl="0">
+              <a:spcBef>
+                <a:spcPts val="0"/>
+              </a:spcBef>
+              <a:buClr>
+                <a:schemeClr val="dk1"/>
+              </a:buClr>
+              <a:buSzPts val="1800"/>
+              <a:buFont typeface="Arial"/>
+              <a:buChar char="•"/>
+            </a:pPr>
+            <a:r>
+              <a:rPr lang="en-IN" sz="1600" b="0" i="0" u="none" strike="noStrike" cap="none" dirty="0">
+                <a:solidFill>
+                  <a:schemeClr val="dk1"/>
+                </a:solidFill>
+                <a:latin typeface="Calibri"/>
+                <a:ea typeface="Calibri"/>
+                <a:cs typeface="Calibri"/>
+                <a:sym typeface="Calibri"/>
+              </a:rPr>
+              <a:t>Windows service for detecting/blocking connected USB storage device</a:t>
+            </a:r>
+          </a:p>
+          <a:p>
+            <a:pPr marL="285750" marR="0" lvl="0" indent="-285750" algn="l" rtl="0">
+              <a:spcBef>
+                <a:spcPts val="0"/>
+              </a:spcBef>
+              <a:buClr>
+                <a:schemeClr val="dk1"/>
+              </a:buClr>
+              <a:buSzPts val="1800"/>
+              <a:buFont typeface="Arial"/>
+              <a:buChar char="•"/>
+            </a:pPr>
+            <a:r>
+              <a:rPr lang="en-IN" sz="1600" b="0" i="0" u="none" strike="noStrike" cap="none" dirty="0">
+                <a:solidFill>
+                  <a:schemeClr val="dk1"/>
+                </a:solidFill>
+                <a:latin typeface="Calibri"/>
+                <a:ea typeface="Calibri"/>
+                <a:cs typeface="Calibri"/>
+                <a:sym typeface="Calibri"/>
+              </a:rPr>
+              <a:t>E-mail / SMS notification service</a:t>
+            </a:r>
+          </a:p>
+          <a:p>
+            <a:pPr marL="285750" marR="0" lvl="0" indent="-285750" algn="l" rtl="0">
+              <a:spcBef>
+                <a:spcPts val="0"/>
+              </a:spcBef>
+              <a:buClr>
+                <a:schemeClr val="dk1"/>
+              </a:buClr>
+              <a:buSzPts val="1800"/>
+              <a:buFont typeface="Arial"/>
+              <a:buChar char="•"/>
+            </a:pPr>
+            <a:r>
+              <a:rPr lang="en-IN" sz="1600" dirty="0">
+                <a:solidFill>
+                  <a:schemeClr val="dk1"/>
+                </a:solidFill>
+                <a:latin typeface="Calibri"/>
+                <a:ea typeface="Calibri"/>
+                <a:cs typeface="Calibri"/>
+                <a:sym typeface="Calibri"/>
+              </a:rPr>
+              <a:t>Language used: Go / Rust, Python</a:t>
+            </a:r>
+            <a:endParaRPr lang="en-IN" sz="1600" b="0" i="0" u="none" strike="noStrike" cap="none" dirty="0">
+              <a:solidFill>
+                <a:schemeClr val="dk1"/>
+              </a:solidFill>
+              <a:latin typeface="Calibri"/>
+              <a:ea typeface="Calibri"/>
+              <a:cs typeface="Calibri"/>
+              <a:sym typeface="Calibri"/>
+            </a:endParaRPr>
+          </a:p>
+        </p:txBody>
+      </p:sp>
+      <p:sp>
+        <p:nvSpPr>
+          <p:cNvPr id="95" name="Shape 95"/>
+          <p:cNvSpPr txBox="1"/>
+          <p:nvPr/>
+        </p:nvSpPr>
+        <p:spPr>
+          <a:xfrm>
+            <a:off x="393699" y="4597635"/>
+            <a:ext cx="8229600" cy="406637"/>
+          </a:xfrm>
+          <a:prstGeom prst="rect">
+            <a:avLst/>
+          </a:prstGeom>
+          <a:noFill/>
+          <a:ln>
+            <a:noFill/>
+          </a:ln>
+        </p:spPr>
+        <p:txBody>
+          <a:bodyPr wrap="square" lIns="91425" tIns="45700" rIns="91425" bIns="45700" anchor="ctr" anchorCtr="0">
+            <a:noAutofit/>
+          </a:bodyPr>
+          <a:lstStyle/>
+          <a:p>
+            <a:pPr marL="0" marR="0" lvl="0" indent="-127000" algn="ctr" rtl="0">
+              <a:spcBef>
+                <a:spcPts val="0"/>
+              </a:spcBef>
+              <a:buClr>
+                <a:schemeClr val="dk1"/>
+              </a:buClr>
+              <a:buSzPts val="2000"/>
+              <a:buFont typeface="Calibri"/>
+              <a:buNone/>
+            </a:pPr>
+            <a:r>
+              <a:rPr lang="en-IN" sz="2000" b="1" i="0" u="none" strike="noStrike" cap="none" dirty="0">
+                <a:solidFill>
+                  <a:schemeClr val="dk1"/>
+                </a:solidFill>
+                <a:latin typeface="Calibri"/>
+                <a:ea typeface="Calibri"/>
+                <a:cs typeface="Calibri"/>
+                <a:sym typeface="Calibri"/>
+              </a:rPr>
+              <a:t>DEPENDENCIES / SHOW STOPPER</a:t>
+            </a:r>
+          </a:p>
+        </p:txBody>
+      </p:sp>
+      <p:sp>
+        <p:nvSpPr>
+          <p:cNvPr id="96" name="Shape 96"/>
+          <p:cNvSpPr/>
+          <p:nvPr/>
+        </p:nvSpPr>
+        <p:spPr>
+          <a:xfrm>
+            <a:off x="114300" y="5105400"/>
+            <a:ext cx="8839199" cy="1477328"/>
+          </a:xfrm>
+          <a:prstGeom prst="rect">
+            <a:avLst/>
+          </a:prstGeom>
+          <a:noFill/>
+          <a:ln>
+            <a:noFill/>
+          </a:ln>
+        </p:spPr>
+        <p:txBody>
+          <a:bodyPr wrap="square" lIns="91425" tIns="45700" rIns="91425" bIns="45700" anchor="t" anchorCtr="0">
+            <a:noAutofit/>
+          </a:bodyPr>
+          <a:lstStyle/>
+          <a:p>
+            <a:pPr marL="285750" marR="0" lvl="0" indent="-285750" algn="l" rtl="0">
+              <a:spcBef>
+                <a:spcPts val="0"/>
+              </a:spcBef>
+              <a:buClr>
+                <a:schemeClr val="dk1"/>
+              </a:buClr>
+              <a:buSzPts val="1800"/>
+              <a:buFont typeface="Arial"/>
+              <a:buChar char="•"/>
+            </a:pPr>
+            <a:r>
+              <a:rPr lang="en-IN" sz="1600" b="0" i="0" u="none" strike="noStrike" cap="none" dirty="0">
+                <a:solidFill>
+                  <a:schemeClr val="dk1"/>
+                </a:solidFill>
+                <a:latin typeface="Calibri"/>
+                <a:ea typeface="Calibri"/>
+                <a:cs typeface="Calibri"/>
+                <a:sym typeface="Calibri"/>
+              </a:rPr>
+              <a:t>Probabilistic data structures are not 100% accurate. In extremely rare case authorized device may get blocked if computer is offline</a:t>
+            </a:r>
+          </a:p>
+          <a:p>
+            <a:pPr marL="285750" marR="0" lvl="0" indent="-285750" algn="l" rtl="0">
+              <a:spcBef>
+                <a:spcPts val="0"/>
+              </a:spcBef>
+              <a:buClr>
+                <a:schemeClr val="dk1"/>
+              </a:buClr>
+              <a:buSzPts val="1800"/>
+              <a:buFont typeface="Arial"/>
+              <a:buChar char="•"/>
+            </a:pPr>
+            <a:r>
+              <a:rPr lang="en-IN" sz="1600" b="0" i="0" u="none" strike="noStrike" cap="none" dirty="0">
+                <a:solidFill>
+                  <a:schemeClr val="dk1"/>
+                </a:solidFill>
+                <a:latin typeface="Calibri"/>
+                <a:ea typeface="Calibri"/>
+                <a:cs typeface="Calibri"/>
+                <a:sym typeface="Calibri"/>
+              </a:rPr>
+              <a:t>The offline devices have to be connected to the internet or intranet for updating it </a:t>
+            </a:r>
+            <a:r>
+              <a:rPr lang="en-IN" sz="1600" dirty="0">
+                <a:solidFill>
+                  <a:schemeClr val="dk1"/>
+                </a:solidFill>
+                <a:latin typeface="Calibri"/>
+                <a:ea typeface="Calibri"/>
+                <a:cs typeface="Calibri"/>
+                <a:sym typeface="Calibri"/>
+              </a:rPr>
+              <a:t>periodically</a:t>
+            </a:r>
+            <a:r>
+              <a:rPr lang="en-IN" sz="1600" b="0" i="0" u="none" strike="noStrike" cap="none" dirty="0">
+                <a:solidFill>
+                  <a:schemeClr val="dk1"/>
+                </a:solidFill>
+                <a:latin typeface="Calibri"/>
+                <a:ea typeface="Calibri"/>
+                <a:cs typeface="Calibri"/>
+                <a:sym typeface="Calibri"/>
+              </a:rPr>
+              <a:t>. This can give access to the devices which have been removed from the whitelist and won’t give access to the newly added devices.</a:t>
+            </a:r>
+          </a:p>
+        </p:txBody>
+      </p:sp>
+    </p:spTree>
+  </p:cSld>
+  <p:clrMapOvr>
+    <a:masterClrMapping/>
+  </p:clrMapOvr>
+</p:sld>
+</file>
+
+<file path=ppt/slides/slide3.xml><?xml version="1.0" encoding="utf-8"?>
 <p:sld xmlns:a="http://schemas.openxmlformats.org/drawingml/2006/main" xmlns:r="http://schemas.openxmlformats.org/officeDocument/2006/relationships" xmlns:p="http://schemas.openxmlformats.org/presentationml/2006/main">
   <p:cSld>
     <p:spTree>
@@ -12359,7 +12560,7 @@
               <a:buNone/>
             </a:pPr>
             <a:r>
-              <a:rPr lang="en-IN" sz="2000" b="1" i="0" u="none" strike="noStrike" cap="none" dirty="0" smtClean="0">
+              <a:rPr lang="en-IN" sz="2000" b="1" i="0" u="none" strike="noStrike" cap="none" dirty="0">
                 <a:solidFill>
                   <a:schemeClr val="dk1"/>
                 </a:solidFill>
@@ -12370,15 +12571,6 @@
               </a:rPr>
               <a:t>FLOWCHARTS / USE-CASE</a:t>
             </a:r>
-            <a:endParaRPr lang="en-IN" sz="2000" b="1" i="0" u="none" strike="noStrike" cap="none" dirty="0">
-              <a:solidFill>
-                <a:schemeClr val="dk1"/>
-              </a:solidFill>
-              <a:latin typeface="Calibri"/>
-              <a:ea typeface="Calibri"/>
-              <a:cs typeface="Calibri"/>
-              <a:sym typeface="Calibri"/>
-            </a:endParaRPr>
           </a:p>
         </p:txBody>
       </p:sp>
@@ -12545,29 +12737,8 @@
                 <a:cs typeface="Calibri"/>
                 <a:sym typeface="Calibri"/>
               </a:rPr>
-              <a:t>Calculate hash of </a:t>
+              <a:t>Calculate hash of the mac address</a:t>
             </a:r>
-            <a:r>
-              <a:rPr lang="en-IN" sz="1600" dirty="0" smtClean="0">
-                <a:solidFill>
-                  <a:schemeClr val="dk1"/>
-                </a:solidFill>
-                <a:latin typeface="Calibri"/>
-                <a:ea typeface="Calibri"/>
-                <a:cs typeface="Calibri"/>
-                <a:sym typeface="Calibri"/>
-              </a:rPr>
-              <a:t>the mac address</a:t>
-            </a:r>
-            <a:endParaRPr lang="en-IN" sz="1600" dirty="0">
-              <a:solidFill>
-                <a:schemeClr val="dk1"/>
-              </a:solidFill>
-              <a:latin typeface="Calibri"/>
-              <a:ea typeface="Calibri"/>
-              <a:cs typeface="Calibri"/>
-              <a:sym typeface="Calibri"/>
-            </a:endParaRPr>
           </a:p>
         </p:txBody>
       </p:sp>
@@ -12618,29 +12789,8 @@
                 <a:cs typeface="Calibri"/>
                 <a:sym typeface="Calibri"/>
               </a:rPr>
-              <a:t>Query to check the existence of hash in </a:t>
+              <a:t>Query to check the existence of hash in the probabilistic database</a:t>
             </a:r>
-            <a:r>
-              <a:rPr lang="en-IN" sz="1600" dirty="0" smtClean="0">
-                <a:solidFill>
-                  <a:schemeClr val="dk1"/>
-                </a:solidFill>
-                <a:latin typeface="Calibri"/>
-                <a:ea typeface="Calibri"/>
-                <a:cs typeface="Calibri"/>
-                <a:sym typeface="Calibri"/>
-              </a:rPr>
-              <a:t>the probabilistic database</a:t>
-            </a:r>
-            <a:endParaRPr lang="en-IN" sz="1600" dirty="0">
-              <a:solidFill>
-                <a:schemeClr val="dk1"/>
-              </a:solidFill>
-              <a:latin typeface="Calibri"/>
-              <a:ea typeface="Calibri"/>
-              <a:cs typeface="Calibri"/>
-              <a:sym typeface="Calibri"/>
-            </a:endParaRPr>
           </a:p>
         </p:txBody>
       </p:sp>
@@ -12786,7 +12936,7 @@
               <a:buNone/>
             </a:pPr>
             <a:r>
-              <a:rPr lang="en-IN" sz="1600" dirty="0" smtClean="0">
+              <a:rPr lang="en-IN" sz="1600" dirty="0">
                 <a:solidFill>
                   <a:schemeClr val="dk1"/>
                 </a:solidFill>
@@ -12797,15 +12947,6 @@
               </a:rPr>
               <a:t>File decryption</a:t>
             </a:r>
-            <a:endParaRPr lang="en-IN" sz="1600" dirty="0">
-              <a:solidFill>
-                <a:schemeClr val="dk1"/>
-              </a:solidFill>
-              <a:latin typeface="Calibri"/>
-              <a:ea typeface="Calibri"/>
-              <a:cs typeface="Calibri"/>
-              <a:sym typeface="Calibri"/>
-            </a:endParaRPr>
           </a:p>
         </p:txBody>
       </p:sp>
@@ -12847,7 +12988,7 @@
               <a:buNone/>
             </a:pPr>
             <a:r>
-              <a:rPr lang="en-IN" sz="1600" dirty="0" smtClean="0">
+              <a:rPr lang="en-IN" sz="1600" dirty="0">
                 <a:solidFill>
                   <a:schemeClr val="dk1"/>
                 </a:solidFill>
@@ -12858,15 +12999,6 @@
               </a:rPr>
               <a:t>Successful decryption?</a:t>
             </a:r>
-            <a:endParaRPr lang="en-IN" sz="1600" dirty="0">
-              <a:solidFill>
-                <a:schemeClr val="dk1"/>
-              </a:solidFill>
-              <a:latin typeface="Calibri"/>
-              <a:ea typeface="Calibri"/>
-              <a:cs typeface="Calibri"/>
-              <a:sym typeface="Calibri"/>
-            </a:endParaRPr>
           </a:p>
         </p:txBody>
       </p:sp>
@@ -13088,7 +13220,7 @@
               <a:buNone/>
             </a:pPr>
             <a:r>
-              <a:rPr lang="en-IN" sz="1600" dirty="0" smtClean="0">
+              <a:rPr lang="en-IN" sz="1600" dirty="0">
                 <a:solidFill>
                   <a:schemeClr val="dk1"/>
                 </a:solidFill>
@@ -13099,15 +13231,6 @@
               </a:rPr>
               <a:t>Yes</a:t>
             </a:r>
-            <a:endParaRPr lang="en-IN" sz="1600" dirty="0">
-              <a:solidFill>
-                <a:schemeClr val="dk1"/>
-              </a:solidFill>
-              <a:latin typeface="Calibri"/>
-              <a:ea typeface="Calibri"/>
-              <a:cs typeface="Calibri"/>
-              <a:sym typeface="Calibri"/>
-            </a:endParaRPr>
           </a:p>
         </p:txBody>
       </p:sp>
@@ -13152,29 +13275,8 @@
                 <a:cs typeface="Calibri"/>
                 <a:sym typeface="Calibri"/>
               </a:rPr>
-              <a:t> </a:t>
+              <a:t> No</a:t>
             </a:r>
-            <a:r>
-              <a:rPr lang="en-IN" sz="1600" dirty="0" smtClean="0">
-                <a:solidFill>
-                  <a:schemeClr val="dk1"/>
-                </a:solidFill>
-                <a:latin typeface="Calibri"/>
-                <a:ea typeface="Calibri"/>
-                <a:cs typeface="Calibri"/>
-                <a:sym typeface="Calibri"/>
-              </a:rPr>
-              <a:t>No</a:t>
-            </a:r>
-            <a:endParaRPr lang="en-IN" sz="1600" dirty="0">
-              <a:solidFill>
-                <a:schemeClr val="dk1"/>
-              </a:solidFill>
-              <a:latin typeface="Calibri"/>
-              <a:ea typeface="Calibri"/>
-              <a:cs typeface="Calibri"/>
-              <a:sym typeface="Calibri"/>
-            </a:endParaRPr>
           </a:p>
         </p:txBody>
       </p:sp>
@@ -13433,31 +13535,7 @@
                 <a:cs typeface="Calibri"/>
                 <a:sym typeface="Calibri"/>
               </a:rPr>
-              <a:t>Calculate hash of the </a:t>
-            </a:r>
-            <a:r>
-              <a:rPr lang="en-IN" sz="1600" dirty="0" smtClean="0">
-                <a:solidFill>
-                  <a:schemeClr val="dk1"/>
-                </a:solidFill>
-                <a:latin typeface="Calibri"/>
-                <a:ea typeface="Calibri"/>
-                <a:cs typeface="Calibri"/>
-                <a:sym typeface="Calibri"/>
-              </a:rPr>
-              <a:t>mac </a:t>
-            </a:r>
-            <a:r>
-              <a:rPr lang="en-IN" sz="1600" dirty="0">
-                <a:solidFill>
-                  <a:schemeClr val="dk1"/>
-                </a:solidFill>
-                <a:latin typeface="Calibri"/>
-                <a:ea typeface="Calibri"/>
-                <a:cs typeface="Calibri"/>
-                <a:sym typeface="Calibri"/>
-              </a:rPr>
-              <a:t>address</a:t>
+              <a:t>Calculate hash of the mac address</a:t>
             </a:r>
           </a:p>
         </p:txBody>
@@ -13695,7 +13773,7 @@
           <a:lstStyle/>
           <a:p>
             <a:r>
-              <a:rPr lang="en-IN" sz="1600" dirty="0" smtClean="0">
+              <a:rPr lang="en-IN" sz="1600" dirty="0">
                 <a:latin typeface="Calibri" pitchFamily="34" charset="0"/>
                 <a:cs typeface="Calibri" pitchFamily="34" charset="0"/>
               </a:rPr>
@@ -13755,29 +13833,8 @@
                 <a:cs typeface="Calibri"/>
                 <a:sym typeface="Calibri"/>
               </a:rPr>
-              <a:t>Query to check the existence of hash in </a:t>
+              <a:t>Query to check the existence of hash in the probabilistic database</a:t>
             </a:r>
-            <a:r>
-              <a:rPr lang="en-IN" sz="1600" dirty="0" smtClean="0">
-                <a:solidFill>
-                  <a:schemeClr val="dk1"/>
-                </a:solidFill>
-                <a:latin typeface="Calibri"/>
-                <a:ea typeface="Calibri"/>
-                <a:cs typeface="Calibri"/>
-                <a:sym typeface="Calibri"/>
-              </a:rPr>
-              <a:t>the probabilistic database</a:t>
-            </a:r>
-            <a:endParaRPr lang="en-IN" sz="1600" dirty="0">
-              <a:solidFill>
-                <a:schemeClr val="dk1"/>
-              </a:solidFill>
-              <a:latin typeface="Calibri"/>
-              <a:ea typeface="Calibri"/>
-              <a:cs typeface="Calibri"/>
-              <a:sym typeface="Calibri"/>
-            </a:endParaRPr>
           </a:p>
         </p:txBody>
       </p:sp>
@@ -13875,7 +13932,7 @@
           <a:lstStyle/>
           <a:p>
             <a:r>
-              <a:rPr lang="en-IN" sz="1600" dirty="0" smtClean="0">
+              <a:rPr lang="en-IN" sz="1600" dirty="0">
                 <a:latin typeface="Calibri" pitchFamily="34" charset="0"/>
                 <a:cs typeface="Calibri" pitchFamily="34" charset="0"/>
               </a:rPr>
@@ -13930,29 +13987,8 @@
                 <a:cs typeface="Calibri"/>
                 <a:sym typeface="Calibri"/>
               </a:rPr>
-              <a:t>Query to check the existence of hash in the </a:t>
+              <a:t>Query to check the existence of hash in the local database for confirmation</a:t>
             </a:r>
-            <a:r>
-              <a:rPr lang="en-IN" sz="1600" dirty="0" smtClean="0">
-                <a:solidFill>
-                  <a:schemeClr val="dk1"/>
-                </a:solidFill>
-                <a:latin typeface="Calibri"/>
-                <a:ea typeface="Calibri"/>
-                <a:cs typeface="Calibri"/>
-                <a:sym typeface="Calibri"/>
-              </a:rPr>
-              <a:t>local database for confirmation</a:t>
-            </a:r>
-            <a:endParaRPr lang="en-IN" sz="1600" dirty="0">
-              <a:solidFill>
-                <a:schemeClr val="dk1"/>
-              </a:solidFill>
-              <a:latin typeface="Calibri"/>
-              <a:ea typeface="Calibri"/>
-              <a:cs typeface="Calibri"/>
-              <a:sym typeface="Calibri"/>
-            </a:endParaRPr>
           </a:p>
         </p:txBody>
       </p:sp>
@@ -14014,7 +14050,7 @@
               <a:buNone/>
             </a:pPr>
             <a:r>
-              <a:rPr lang="en-IN" sz="1600" dirty="0" smtClean="0">
+              <a:rPr lang="en-IN" sz="1600" dirty="0">
                 <a:solidFill>
                   <a:schemeClr val="dk1"/>
                 </a:solidFill>
@@ -14025,15 +14061,6 @@
               </a:rPr>
               <a:t>Definitely   No</a:t>
             </a:r>
-            <a:endParaRPr lang="en-IN" sz="1600" dirty="0">
-              <a:solidFill>
-                <a:schemeClr val="dk1"/>
-              </a:solidFill>
-              <a:latin typeface="Calibri"/>
-              <a:ea typeface="Calibri"/>
-              <a:cs typeface="Calibri"/>
-              <a:sym typeface="Calibri"/>
-            </a:endParaRPr>
           </a:p>
         </p:txBody>
       </p:sp>
@@ -14095,7 +14122,7 @@
               <a:buNone/>
             </a:pPr>
             <a:r>
-              <a:rPr lang="en-IN" sz="1600" dirty="0" smtClean="0">
+              <a:rPr lang="en-IN" sz="1600" dirty="0">
                 <a:solidFill>
                   <a:schemeClr val="dk1"/>
                 </a:solidFill>
@@ -14106,15 +14133,6 @@
               </a:rPr>
               <a:t>Possibly Yes</a:t>
             </a:r>
-            <a:endParaRPr lang="en-IN" sz="1600" dirty="0">
-              <a:solidFill>
-                <a:schemeClr val="dk1"/>
-              </a:solidFill>
-              <a:latin typeface="Calibri"/>
-              <a:ea typeface="Calibri"/>
-              <a:cs typeface="Calibri"/>
-              <a:sym typeface="Calibri"/>
-            </a:endParaRPr>
           </a:p>
         </p:txBody>
       </p:sp>
@@ -14239,7 +14257,7 @@
               <a:buNone/>
             </a:pPr>
             <a:r>
-              <a:rPr lang="en-IN" sz="1600" dirty="0" smtClean="0">
+              <a:rPr lang="en-IN" sz="1600" dirty="0">
                 <a:solidFill>
                   <a:schemeClr val="dk1"/>
                 </a:solidFill>
@@ -14250,15 +14268,6 @@
               </a:rPr>
               <a:t>Yes</a:t>
             </a:r>
-            <a:endParaRPr lang="en-IN" sz="1600" dirty="0">
-              <a:solidFill>
-                <a:schemeClr val="dk1"/>
-              </a:solidFill>
-              <a:latin typeface="Calibri"/>
-              <a:ea typeface="Calibri"/>
-              <a:cs typeface="Calibri"/>
-              <a:sym typeface="Calibri"/>
-            </a:endParaRPr>
           </a:p>
         </p:txBody>
       </p:sp>
@@ -14300,7 +14309,7 @@
               <a:buNone/>
             </a:pPr>
             <a:r>
-              <a:rPr lang="en-IN" sz="1600" dirty="0" smtClean="0">
+              <a:rPr lang="en-IN" sz="1600" dirty="0">
                 <a:solidFill>
                   <a:schemeClr val="dk1"/>
                 </a:solidFill>
@@ -14311,15 +14320,6 @@
               </a:rPr>
               <a:t>Allow data transfer</a:t>
             </a:r>
-            <a:endParaRPr lang="en-IN" sz="1600" dirty="0">
-              <a:solidFill>
-                <a:schemeClr val="dk1"/>
-              </a:solidFill>
-              <a:latin typeface="Calibri"/>
-              <a:ea typeface="Calibri"/>
-              <a:cs typeface="Calibri"/>
-              <a:sym typeface="Calibri"/>
-            </a:endParaRPr>
           </a:p>
         </p:txBody>
       </p:sp>
@@ -14483,739 +14483,6 @@
 </p:sld>
 </file>
 
-<file path=ppt/slides/slide3.xml><?xml version="1.0" encoding="utf-8"?>
-<p:sld xmlns:a="http://schemas.openxmlformats.org/drawingml/2006/main" xmlns:r="http://schemas.openxmlformats.org/officeDocument/2006/relationships" xmlns:p="http://schemas.openxmlformats.org/presentationml/2006/main">
-  <p:cSld>
-    <p:spTree>
-      <p:nvGrpSpPr>
-        <p:cNvPr id="1" name="Shape 91"/>
-        <p:cNvGrpSpPr/>
-        <p:nvPr/>
-      </p:nvGrpSpPr>
-      <p:grpSpPr>
-        <a:xfrm>
-          <a:off x="0" y="0"/>
-          <a:ext cx="0" cy="0"/>
-          <a:chOff x="0" y="0"/>
-          <a:chExt cx="0" cy="0"/>
-        </a:xfrm>
-      </p:grpSpPr>
-      <p:sp>
-        <p:nvSpPr>
-          <p:cNvPr id="92" name="Shape 92"/>
-          <p:cNvSpPr txBox="1"/>
-          <p:nvPr/>
-        </p:nvSpPr>
-        <p:spPr>
-          <a:xfrm>
-            <a:off x="177800" y="280249"/>
-            <a:ext cx="8839200" cy="2284655"/>
-          </a:xfrm>
-          <a:prstGeom prst="rect">
-            <a:avLst/>
-          </a:prstGeom>
-          <a:noFill/>
-          <a:ln>
-            <a:noFill/>
-          </a:ln>
-        </p:spPr>
-        <p:txBody>
-          <a:bodyPr wrap="square" lIns="91425" tIns="45700" rIns="91425" bIns="45700" anchor="t" anchorCtr="0">
-            <a:noAutofit/>
-          </a:bodyPr>
-          <a:lstStyle/>
-          <a:p>
-            <a:pPr marL="285750" marR="0" lvl="0" indent="-285750" algn="l" rtl="0">
-              <a:spcBef>
-                <a:spcPts val="0"/>
-              </a:spcBef>
-              <a:buClr>
-                <a:schemeClr val="dk1"/>
-              </a:buClr>
-              <a:buSzPts val="1800"/>
-              <a:buFont typeface="Arial"/>
-              <a:buChar char="•"/>
-            </a:pPr>
-            <a:r>
-              <a:rPr lang="en-IN" sz="1600" b="0" i="0" u="none" strike="noStrike" cap="none" dirty="0">
-                <a:solidFill>
-                  <a:schemeClr val="dk1"/>
-                </a:solidFill>
-                <a:latin typeface="Calibri"/>
-                <a:ea typeface="Calibri"/>
-                <a:cs typeface="Calibri"/>
-                <a:sym typeface="Calibri"/>
-              </a:rPr>
-              <a:t>The encrypted </a:t>
-            </a:r>
-            <a:r>
-              <a:rPr lang="en-IN" sz="1600" b="0" i="0" u="none" strike="noStrike" cap="none" dirty="0" smtClean="0">
-                <a:solidFill>
-                  <a:schemeClr val="dk1"/>
-                </a:solidFill>
-                <a:latin typeface="Calibri"/>
-                <a:ea typeface="Calibri"/>
-                <a:cs typeface="Calibri"/>
-                <a:sym typeface="Calibri"/>
-              </a:rPr>
-              <a:t>file system </a:t>
-            </a:r>
-            <a:r>
-              <a:rPr lang="en-IN" sz="1600" b="0" i="0" u="none" strike="noStrike" cap="none" dirty="0">
-                <a:solidFill>
-                  <a:schemeClr val="dk1"/>
-                </a:solidFill>
-                <a:latin typeface="Calibri"/>
-                <a:ea typeface="Calibri"/>
-                <a:cs typeface="Calibri"/>
-                <a:sym typeface="Calibri"/>
-              </a:rPr>
-              <a:t>will be created on the storage device when it is connected to the blockchain system for the first time for registration on the database. </a:t>
-            </a:r>
-          </a:p>
-          <a:p>
-            <a:pPr marL="285750" marR="0" lvl="0" indent="-285750" algn="l" rtl="0">
-              <a:spcBef>
-                <a:spcPts val="0"/>
-              </a:spcBef>
-              <a:buClr>
-                <a:schemeClr val="dk1"/>
-              </a:buClr>
-              <a:buSzPts val="1800"/>
-              <a:buFont typeface="Arial"/>
-              <a:buChar char="•"/>
-            </a:pPr>
-            <a:r>
-              <a:rPr lang="en-IN" sz="1600" b="0" i="0" u="none" strike="noStrike" cap="none" dirty="0">
-                <a:solidFill>
-                  <a:schemeClr val="dk1"/>
-                </a:solidFill>
-                <a:latin typeface="Calibri"/>
-                <a:ea typeface="Calibri"/>
-                <a:cs typeface="Calibri"/>
-                <a:sym typeface="Calibri"/>
-              </a:rPr>
-              <a:t>The computers which are offline </a:t>
-            </a:r>
-            <a:r>
-              <a:rPr lang="en-IN" sz="1600" b="0" i="0" u="none" strike="noStrike" cap="none" dirty="0" smtClean="0">
-                <a:solidFill>
-                  <a:schemeClr val="dk1"/>
-                </a:solidFill>
-                <a:latin typeface="Calibri"/>
-                <a:ea typeface="Calibri"/>
-                <a:cs typeface="Calibri"/>
-                <a:sym typeface="Calibri"/>
-              </a:rPr>
-              <a:t>will also use </a:t>
-            </a:r>
-            <a:r>
-              <a:rPr lang="en-IN" sz="1600" b="0" i="0" u="none" strike="noStrike" cap="none" dirty="0">
-                <a:solidFill>
-                  <a:schemeClr val="dk1"/>
-                </a:solidFill>
-                <a:latin typeface="Calibri"/>
-                <a:ea typeface="Calibri"/>
-                <a:cs typeface="Calibri"/>
-                <a:sym typeface="Calibri"/>
-              </a:rPr>
-              <a:t>a probabilistic database of authorized MAC addresses (e.g. like Bloom filter). The driver program on the computer will check the storage device against this probabilistic database. The driver program will block the devices which are not on the whitelist. </a:t>
-            </a:r>
-          </a:p>
-          <a:p>
-            <a:pPr marL="285750" lvl="0" indent="-285750">
-              <a:buClr>
-                <a:schemeClr val="dk1"/>
-              </a:buClr>
-              <a:buSzPts val="1800"/>
-              <a:buFont typeface="Arial"/>
-              <a:buChar char="•"/>
-            </a:pPr>
-            <a:r>
-              <a:rPr lang="en-IN" sz="1600" b="0" i="0" u="none" strike="noStrike" cap="none" dirty="0">
-                <a:solidFill>
-                  <a:schemeClr val="dk1"/>
-                </a:solidFill>
-                <a:latin typeface="Calibri"/>
-                <a:ea typeface="Calibri"/>
-                <a:cs typeface="Calibri"/>
-                <a:sym typeface="Calibri"/>
-              </a:rPr>
-              <a:t>The Bloom filter database will be updated when it is connected to the internet </a:t>
-            </a:r>
-            <a:r>
-              <a:rPr lang="en-IN" sz="1600" b="0" i="0" u="none" strike="noStrike" cap="none" dirty="0" smtClean="0">
-                <a:solidFill>
-                  <a:schemeClr val="dk1"/>
-                </a:solidFill>
-                <a:latin typeface="Calibri"/>
-                <a:ea typeface="Calibri"/>
-                <a:cs typeface="Calibri"/>
-                <a:sym typeface="Calibri"/>
-              </a:rPr>
-              <a:t>periodically</a:t>
-            </a:r>
-            <a:r>
-              <a:rPr lang="en-IN" sz="1600" dirty="0" smtClean="0">
-                <a:solidFill>
-                  <a:schemeClr val="dk1"/>
-                </a:solidFill>
-                <a:latin typeface="Calibri"/>
-                <a:ea typeface="Calibri"/>
-                <a:cs typeface="Calibri"/>
-                <a:sym typeface="Calibri"/>
-              </a:rPr>
-              <a:t>. To update, the whole database is not replaced, instead the delta i.e. difference between the existing database on the Bloom filter and the local database is found and then added to the database of Bloom filter.</a:t>
-            </a:r>
-          </a:p>
-          <a:p>
-            <a:pPr marL="285750" lvl="0" indent="-285750">
-              <a:buClr>
-                <a:schemeClr val="dk1"/>
-              </a:buClr>
-              <a:buSzPts val="1800"/>
-              <a:buFont typeface="Arial"/>
-              <a:buChar char="•"/>
-            </a:pPr>
-            <a:endParaRPr lang="en-IN" sz="1600" b="0" i="0" u="none" strike="noStrike" cap="none" dirty="0">
-              <a:solidFill>
-                <a:schemeClr val="dk1"/>
-              </a:solidFill>
-              <a:latin typeface="Calibri"/>
-              <a:ea typeface="Calibri"/>
-              <a:cs typeface="Calibri"/>
-              <a:sym typeface="Calibri"/>
-            </a:endParaRPr>
-          </a:p>
-          <a:p>
-            <a:pPr marL="285750" lvl="0" indent="-285750">
-              <a:buClr>
-                <a:schemeClr val="dk1"/>
-              </a:buClr>
-              <a:buSzPts val="1800"/>
-              <a:buFont typeface="Arial"/>
-              <a:buChar char="•"/>
-            </a:pPr>
-            <a:endParaRPr lang="en-IN" sz="1600" b="0" i="0" u="none" strike="noStrike" cap="none" dirty="0">
-              <a:solidFill>
-                <a:schemeClr val="dk1"/>
-              </a:solidFill>
-              <a:latin typeface="Calibri"/>
-              <a:ea typeface="Calibri"/>
-              <a:cs typeface="Calibri"/>
-              <a:sym typeface="Calibri"/>
-            </a:endParaRPr>
-          </a:p>
-        </p:txBody>
-      </p:sp>
-      <p:sp>
-        <p:nvSpPr>
-          <p:cNvPr id="93" name="Shape 93"/>
-          <p:cNvSpPr txBox="1"/>
-          <p:nvPr/>
-        </p:nvSpPr>
-        <p:spPr>
-          <a:xfrm>
-            <a:off x="482600" y="2564904"/>
-            <a:ext cx="8229600" cy="346074"/>
-          </a:xfrm>
-          <a:prstGeom prst="rect">
-            <a:avLst/>
-          </a:prstGeom>
-          <a:noFill/>
-          <a:ln>
-            <a:noFill/>
-          </a:ln>
-        </p:spPr>
-        <p:txBody>
-          <a:bodyPr wrap="square" lIns="91425" tIns="45700" rIns="91425" bIns="45700" anchor="t" anchorCtr="0">
-            <a:noAutofit/>
-          </a:bodyPr>
-          <a:lstStyle/>
-          <a:p>
-            <a:pPr marL="0" marR="0" lvl="0" indent="-127000" algn="ctr" rtl="0">
-              <a:spcBef>
-                <a:spcPts val="0"/>
-              </a:spcBef>
-              <a:buClr>
-                <a:schemeClr val="dk1"/>
-              </a:buClr>
-              <a:buSzPts val="2000"/>
-              <a:buFont typeface="Calibri"/>
-              <a:buNone/>
-            </a:pPr>
-            <a:r>
-              <a:rPr lang="en-IN" sz="2000" b="1" i="0" u="none" strike="noStrike" cap="none" dirty="0" smtClean="0">
-                <a:solidFill>
-                  <a:schemeClr val="dk1"/>
-                </a:solidFill>
-                <a:latin typeface="Calibri"/>
-                <a:ea typeface="Calibri"/>
-                <a:cs typeface="Calibri"/>
-                <a:sym typeface="Calibri"/>
-              </a:rPr>
-              <a:t>TECHNOLOGY </a:t>
-            </a:r>
-            <a:r>
-              <a:rPr lang="en-IN" sz="2000" b="1" i="0" u="none" strike="noStrike" cap="none" dirty="0">
-                <a:solidFill>
-                  <a:schemeClr val="dk1"/>
-                </a:solidFill>
-                <a:latin typeface="Calibri"/>
-                <a:ea typeface="Calibri"/>
-                <a:cs typeface="Calibri"/>
-                <a:sym typeface="Calibri"/>
-              </a:rPr>
-              <a:t>STACK</a:t>
-            </a:r>
-          </a:p>
-        </p:txBody>
-      </p:sp>
-      <p:sp>
-        <p:nvSpPr>
-          <p:cNvPr id="94" name="Shape 94"/>
-          <p:cNvSpPr txBox="1"/>
-          <p:nvPr/>
-        </p:nvSpPr>
-        <p:spPr>
-          <a:xfrm>
-            <a:off x="114300" y="2910978"/>
-            <a:ext cx="8826499" cy="1598142"/>
-          </a:xfrm>
-          <a:prstGeom prst="rect">
-            <a:avLst/>
-          </a:prstGeom>
-          <a:noFill/>
-          <a:ln>
-            <a:noFill/>
-          </a:ln>
-        </p:spPr>
-        <p:txBody>
-          <a:bodyPr wrap="square" lIns="91425" tIns="45700" rIns="91425" bIns="45700" anchor="t" anchorCtr="0">
-            <a:noAutofit/>
-          </a:bodyPr>
-          <a:lstStyle/>
-          <a:p>
-            <a:pPr marL="285750" marR="0" lvl="0" indent="-285750" algn="l" rtl="0">
-              <a:spcBef>
-                <a:spcPts val="0"/>
-              </a:spcBef>
-              <a:buClr>
-                <a:schemeClr val="dk1"/>
-              </a:buClr>
-              <a:buSzPts val="1800"/>
-              <a:buFont typeface="Arial"/>
-              <a:buChar char="•"/>
-            </a:pPr>
-            <a:r>
-              <a:rPr lang="en-IN" sz="1600" dirty="0" smtClean="0">
-                <a:solidFill>
-                  <a:schemeClr val="dk1"/>
-                </a:solidFill>
-                <a:latin typeface="Calibri"/>
-                <a:ea typeface="Calibri"/>
-                <a:cs typeface="Calibri"/>
-                <a:sym typeface="Calibri"/>
-              </a:rPr>
-              <a:t>Open </a:t>
-            </a:r>
-            <a:r>
-              <a:rPr lang="en-IN" sz="1600" dirty="0">
-                <a:solidFill>
-                  <a:schemeClr val="dk1"/>
-                </a:solidFill>
-                <a:latin typeface="Calibri"/>
-                <a:ea typeface="Calibri"/>
-                <a:cs typeface="Calibri"/>
-                <a:sym typeface="Calibri"/>
-              </a:rPr>
-              <a:t>Source</a:t>
-            </a:r>
-            <a:r>
-              <a:rPr lang="en-IN" sz="1600" b="0" i="0" u="none" strike="noStrike" cap="none" dirty="0">
-                <a:solidFill>
-                  <a:schemeClr val="dk1"/>
-                </a:solidFill>
-                <a:latin typeface="Calibri"/>
-                <a:ea typeface="Calibri"/>
-                <a:cs typeface="Calibri"/>
-                <a:sym typeface="Calibri"/>
-              </a:rPr>
-              <a:t> Blockchain distributed database </a:t>
-            </a:r>
-            <a:r>
-              <a:rPr lang="en-IN" sz="1600" b="0" i="0" u="none" strike="noStrike" cap="none" dirty="0" smtClean="0">
-                <a:solidFill>
-                  <a:schemeClr val="dk1"/>
-                </a:solidFill>
-                <a:latin typeface="Calibri"/>
-                <a:ea typeface="Calibri"/>
-                <a:cs typeface="Calibri"/>
-                <a:sym typeface="Calibri"/>
-              </a:rPr>
-              <a:t>like </a:t>
-            </a:r>
-            <a:r>
-              <a:rPr lang="en-IN" sz="1600" dirty="0" smtClean="0">
-                <a:solidFill>
-                  <a:schemeClr val="dk1"/>
-                </a:solidFill>
-                <a:latin typeface="Calibri"/>
-                <a:ea typeface="Calibri"/>
-                <a:cs typeface="Calibri"/>
-                <a:sym typeface="Calibri"/>
-              </a:rPr>
-              <a:t>Hyperledger</a:t>
-            </a:r>
-            <a:endParaRPr lang="en-IN" sz="1600" b="0" i="0" u="none" strike="noStrike" cap="none" dirty="0">
-              <a:solidFill>
-                <a:schemeClr val="dk1"/>
-              </a:solidFill>
-              <a:latin typeface="Calibri"/>
-              <a:ea typeface="Calibri"/>
-              <a:cs typeface="Calibri"/>
-              <a:sym typeface="Calibri"/>
-            </a:endParaRPr>
-          </a:p>
-          <a:p>
-            <a:pPr marL="285750" marR="0" lvl="0" indent="-285750" algn="l" rtl="0">
-              <a:spcBef>
-                <a:spcPts val="0"/>
-              </a:spcBef>
-              <a:buClr>
-                <a:schemeClr val="dk1"/>
-              </a:buClr>
-              <a:buSzPts val="1800"/>
-              <a:buFont typeface="Arial"/>
-              <a:buChar char="•"/>
-            </a:pPr>
-            <a:r>
-              <a:rPr lang="en-IN" sz="1600" b="0" i="0" u="none" strike="noStrike" cap="none" dirty="0" smtClean="0">
-                <a:solidFill>
-                  <a:schemeClr val="dk1"/>
-                </a:solidFill>
-                <a:latin typeface="Calibri"/>
-                <a:ea typeface="Calibri"/>
-                <a:cs typeface="Calibri"/>
-                <a:sym typeface="Calibri"/>
-              </a:rPr>
-              <a:t>Browser/desktop </a:t>
-            </a:r>
-            <a:r>
-              <a:rPr lang="en-IN" sz="1600" b="0" i="0" u="none" strike="noStrike" cap="none" dirty="0" smtClean="0">
-                <a:solidFill>
-                  <a:schemeClr val="dk1"/>
-                </a:solidFill>
-                <a:latin typeface="Calibri"/>
-                <a:ea typeface="Calibri"/>
-                <a:cs typeface="Calibri"/>
-                <a:sym typeface="Calibri"/>
-              </a:rPr>
-              <a:t>based front-end for admin</a:t>
-            </a:r>
-            <a:endParaRPr lang="en-IN" sz="1600" b="0" i="0" u="none" strike="noStrike" cap="none" dirty="0">
-              <a:solidFill>
-                <a:schemeClr val="dk1"/>
-              </a:solidFill>
-              <a:latin typeface="Calibri"/>
-              <a:ea typeface="Calibri"/>
-              <a:cs typeface="Calibri"/>
-              <a:sym typeface="Calibri"/>
-            </a:endParaRPr>
-          </a:p>
-          <a:p>
-            <a:pPr marL="285750" marR="0" lvl="0" indent="-285750" algn="l" rtl="0">
-              <a:spcBef>
-                <a:spcPts val="0"/>
-              </a:spcBef>
-              <a:buClr>
-                <a:schemeClr val="dk1"/>
-              </a:buClr>
-              <a:buSzPts val="1800"/>
-              <a:buFont typeface="Arial"/>
-              <a:buChar char="•"/>
-            </a:pPr>
-            <a:r>
-              <a:rPr lang="en-IN" sz="1600" b="0" i="0" u="none" strike="noStrike" cap="none" dirty="0">
-                <a:solidFill>
-                  <a:schemeClr val="dk1"/>
-                </a:solidFill>
-                <a:latin typeface="Calibri"/>
-                <a:ea typeface="Calibri"/>
-                <a:cs typeface="Calibri"/>
-                <a:sym typeface="Calibri"/>
-              </a:rPr>
-              <a:t>Windows service for </a:t>
-            </a:r>
-            <a:r>
-              <a:rPr lang="en-IN" sz="1600" b="0" i="0" u="none" strike="noStrike" cap="none" dirty="0" smtClean="0">
-                <a:solidFill>
-                  <a:schemeClr val="dk1"/>
-                </a:solidFill>
-                <a:latin typeface="Calibri"/>
-                <a:ea typeface="Calibri"/>
-                <a:cs typeface="Calibri"/>
-                <a:sym typeface="Calibri"/>
-              </a:rPr>
-              <a:t>detecting/blocking connected USB </a:t>
-            </a:r>
-            <a:r>
-              <a:rPr lang="en-IN" sz="1600" b="0" i="0" u="none" strike="noStrike" cap="none" dirty="0">
-                <a:solidFill>
-                  <a:schemeClr val="dk1"/>
-                </a:solidFill>
-                <a:latin typeface="Calibri"/>
-                <a:ea typeface="Calibri"/>
-                <a:cs typeface="Calibri"/>
-                <a:sym typeface="Calibri"/>
-              </a:rPr>
-              <a:t>storage device</a:t>
-            </a:r>
-          </a:p>
-          <a:p>
-            <a:pPr marL="285750" marR="0" lvl="0" indent="-285750" algn="l" rtl="0">
-              <a:spcBef>
-                <a:spcPts val="0"/>
-              </a:spcBef>
-              <a:buClr>
-                <a:schemeClr val="dk1"/>
-              </a:buClr>
-              <a:buSzPts val="1800"/>
-              <a:buFont typeface="Arial"/>
-              <a:buChar char="•"/>
-            </a:pPr>
-            <a:r>
-              <a:rPr lang="en-IN" sz="1600" b="0" i="0" u="none" strike="noStrike" cap="none" dirty="0">
-                <a:solidFill>
-                  <a:schemeClr val="dk1"/>
-                </a:solidFill>
-                <a:latin typeface="Calibri"/>
-                <a:ea typeface="Calibri"/>
-                <a:cs typeface="Calibri"/>
-                <a:sym typeface="Calibri"/>
-              </a:rPr>
-              <a:t>E-mail / SMS notification </a:t>
-            </a:r>
-            <a:r>
-              <a:rPr lang="en-IN" sz="1600" b="0" i="0" u="none" strike="noStrike" cap="none" dirty="0" smtClean="0">
-                <a:solidFill>
-                  <a:schemeClr val="dk1"/>
-                </a:solidFill>
-                <a:latin typeface="Calibri"/>
-                <a:ea typeface="Calibri"/>
-                <a:cs typeface="Calibri"/>
-                <a:sym typeface="Calibri"/>
-              </a:rPr>
-              <a:t>service</a:t>
-            </a:r>
-          </a:p>
-          <a:p>
-            <a:pPr marL="285750" marR="0" lvl="0" indent="-285750" algn="l" rtl="0">
-              <a:spcBef>
-                <a:spcPts val="0"/>
-              </a:spcBef>
-              <a:buClr>
-                <a:schemeClr val="dk1"/>
-              </a:buClr>
-              <a:buSzPts val="1800"/>
-              <a:buFont typeface="Arial"/>
-              <a:buChar char="•"/>
-            </a:pPr>
-            <a:r>
-              <a:rPr lang="en-IN" sz="1600" dirty="0" smtClean="0">
-                <a:solidFill>
-                  <a:schemeClr val="dk1"/>
-                </a:solidFill>
-                <a:latin typeface="Calibri"/>
-                <a:ea typeface="Calibri"/>
-                <a:cs typeface="Calibri"/>
-                <a:sym typeface="Calibri"/>
-              </a:rPr>
-              <a:t>Language used: Go / Rust, Python</a:t>
-            </a:r>
-            <a:endParaRPr lang="en-IN" sz="1600" b="0" i="0" u="none" strike="noStrike" cap="none" dirty="0">
-              <a:solidFill>
-                <a:schemeClr val="dk1"/>
-              </a:solidFill>
-              <a:latin typeface="Calibri"/>
-              <a:ea typeface="Calibri"/>
-              <a:cs typeface="Calibri"/>
-              <a:sym typeface="Calibri"/>
-            </a:endParaRPr>
-          </a:p>
-        </p:txBody>
-      </p:sp>
-      <p:sp>
-        <p:nvSpPr>
-          <p:cNvPr id="95" name="Shape 95"/>
-          <p:cNvSpPr txBox="1"/>
-          <p:nvPr/>
-        </p:nvSpPr>
-        <p:spPr>
-          <a:xfrm>
-            <a:off x="393699" y="4597635"/>
-            <a:ext cx="8229600" cy="406637"/>
-          </a:xfrm>
-          <a:prstGeom prst="rect">
-            <a:avLst/>
-          </a:prstGeom>
-          <a:noFill/>
-          <a:ln>
-            <a:noFill/>
-          </a:ln>
-        </p:spPr>
-        <p:txBody>
-          <a:bodyPr wrap="square" lIns="91425" tIns="45700" rIns="91425" bIns="45700" anchor="ctr" anchorCtr="0">
-            <a:noAutofit/>
-          </a:bodyPr>
-          <a:lstStyle/>
-          <a:p>
-            <a:pPr marL="0" marR="0" lvl="0" indent="-127000" algn="ctr" rtl="0">
-              <a:spcBef>
-                <a:spcPts val="0"/>
-              </a:spcBef>
-              <a:buClr>
-                <a:schemeClr val="dk1"/>
-              </a:buClr>
-              <a:buSzPts val="2000"/>
-              <a:buFont typeface="Calibri"/>
-              <a:buNone/>
-            </a:pPr>
-            <a:r>
-              <a:rPr lang="en-IN" sz="2000" b="1" i="0" u="none" strike="noStrike" cap="none" dirty="0" smtClean="0">
-                <a:solidFill>
-                  <a:schemeClr val="dk1"/>
-                </a:solidFill>
-                <a:latin typeface="Calibri"/>
-                <a:ea typeface="Calibri"/>
-                <a:cs typeface="Calibri"/>
-                <a:sym typeface="Calibri"/>
-              </a:rPr>
-              <a:t>DEPENDENCIES </a:t>
-            </a:r>
-            <a:r>
-              <a:rPr lang="en-IN" sz="2000" b="1" i="0" u="none" strike="noStrike" cap="none" dirty="0">
-                <a:solidFill>
-                  <a:schemeClr val="dk1"/>
-                </a:solidFill>
-                <a:latin typeface="Calibri"/>
-                <a:ea typeface="Calibri"/>
-                <a:cs typeface="Calibri"/>
-                <a:sym typeface="Calibri"/>
-              </a:rPr>
-              <a:t>/ SHOW STOPPER</a:t>
-            </a:r>
-          </a:p>
-        </p:txBody>
-      </p:sp>
-      <p:sp>
-        <p:nvSpPr>
-          <p:cNvPr id="96" name="Shape 96"/>
-          <p:cNvSpPr/>
-          <p:nvPr/>
-        </p:nvSpPr>
-        <p:spPr>
-          <a:xfrm>
-            <a:off x="114300" y="5105400"/>
-            <a:ext cx="8839199" cy="1477328"/>
-          </a:xfrm>
-          <a:prstGeom prst="rect">
-            <a:avLst/>
-          </a:prstGeom>
-          <a:noFill/>
-          <a:ln>
-            <a:noFill/>
-          </a:ln>
-        </p:spPr>
-        <p:txBody>
-          <a:bodyPr wrap="square" lIns="91425" tIns="45700" rIns="91425" bIns="45700" anchor="t" anchorCtr="0">
-            <a:noAutofit/>
-          </a:bodyPr>
-          <a:lstStyle/>
-          <a:p>
-            <a:pPr marL="285750" marR="0" lvl="0" indent="-285750" algn="l" rtl="0">
-              <a:spcBef>
-                <a:spcPts val="0"/>
-              </a:spcBef>
-              <a:buClr>
-                <a:schemeClr val="dk1"/>
-              </a:buClr>
-              <a:buSzPts val="1800"/>
-              <a:buFont typeface="Arial"/>
-              <a:buChar char="•"/>
-            </a:pPr>
-            <a:r>
-              <a:rPr lang="en-IN" sz="1600" b="0" i="0" u="none" strike="noStrike" cap="none" dirty="0">
-                <a:solidFill>
-                  <a:schemeClr val="dk1"/>
-                </a:solidFill>
-                <a:latin typeface="Calibri"/>
-                <a:ea typeface="Calibri"/>
-                <a:cs typeface="Calibri"/>
-                <a:sym typeface="Calibri"/>
-              </a:rPr>
-              <a:t>Probabilistic data structures are not 100% accurate. In extremely rare case authorized device may get blocked if computer is offline</a:t>
-            </a:r>
-          </a:p>
-          <a:p>
-            <a:pPr marL="285750" marR="0" lvl="0" indent="-285750" algn="l" rtl="0">
-              <a:spcBef>
-                <a:spcPts val="0"/>
-              </a:spcBef>
-              <a:buClr>
-                <a:schemeClr val="dk1"/>
-              </a:buClr>
-              <a:buSzPts val="1800"/>
-              <a:buFont typeface="Arial"/>
-              <a:buChar char="•"/>
-            </a:pPr>
-            <a:r>
-              <a:rPr lang="en-IN" sz="1600" b="0" i="0" u="none" strike="noStrike" cap="none" dirty="0">
-                <a:solidFill>
-                  <a:schemeClr val="dk1"/>
-                </a:solidFill>
-                <a:latin typeface="Calibri"/>
-                <a:ea typeface="Calibri"/>
-                <a:cs typeface="Calibri"/>
-                <a:sym typeface="Calibri"/>
-              </a:rPr>
-              <a:t>The offline devices have to be connected to the internet or intranet for updating it </a:t>
-            </a:r>
-            <a:r>
-              <a:rPr lang="en-IN" sz="1600" dirty="0">
-                <a:solidFill>
-                  <a:schemeClr val="dk1"/>
-                </a:solidFill>
-                <a:latin typeface="Calibri"/>
-                <a:ea typeface="Calibri"/>
-                <a:cs typeface="Calibri"/>
-                <a:sym typeface="Calibri"/>
-              </a:rPr>
-              <a:t>periodically</a:t>
-            </a:r>
-            <a:r>
-              <a:rPr lang="en-IN" sz="1600" b="0" i="0" u="none" strike="noStrike" cap="none" dirty="0">
-                <a:solidFill>
-                  <a:schemeClr val="dk1"/>
-                </a:solidFill>
-                <a:latin typeface="Calibri"/>
-                <a:ea typeface="Calibri"/>
-                <a:cs typeface="Calibri"/>
-                <a:sym typeface="Calibri"/>
-              </a:rPr>
-              <a:t>. This can give access to the devices which have been removed from the whitelist and won’t give access to the newly added devices.</a:t>
-            </a:r>
-          </a:p>
-        </p:txBody>
-      </p:sp>
-    </p:spTree>
-  </p:cSld>
-  <p:clrMapOvr>
-    <a:masterClrMapping/>
-  </p:clrMapOvr>
-</p:sld>
-</file>
-
 <file path=ppt/slides/slide4.xml><?xml version="1.0" encoding="utf-8"?>
 <p:sld xmlns:a="http://schemas.openxmlformats.org/drawingml/2006/main" xmlns:r="http://schemas.openxmlformats.org/officeDocument/2006/relationships" xmlns:p="http://schemas.openxmlformats.org/presentationml/2006/main">
   <p:cSld>
@@ -15257,8 +14524,16 @@
               <a:buSzPct val="113000"/>
             </a:pPr>
             <a:r>
-              <a:rPr lang="en-US" sz="1600" dirty="0" smtClean="0"/>
-              <a:t> Use of blockchain based systems to provide untamperable, distributed database.</a:t>
+              <a:rPr lang="en-US" sz="1600" dirty="0"/>
+              <a:t> Use of </a:t>
+            </a:r>
+            <a:r>
+              <a:rPr lang="en-US" sz="1600" i="1" dirty="0"/>
+              <a:t>blockchain</a:t>
+            </a:r>
+            <a:r>
+              <a:rPr lang="en-US" sz="1600" dirty="0"/>
+              <a:t> based systems to provide untamperable, distributed database of registered devices.</a:t>
             </a:r>
           </a:p>
           <a:p>
@@ -15266,8 +14541,8 @@
               <a:buSzPct val="113000"/>
             </a:pPr>
             <a:r>
-              <a:rPr lang="en-US" sz="1600" dirty="0" smtClean="0"/>
-              <a:t> The probabilistic data base is space-efficient and provides high accuracy.</a:t>
+              <a:rPr lang="en-US" sz="1600" dirty="0"/>
+              <a:t> The local probabilistic data base is space-efficient and provides high accuracy for ‘offline’ access.</a:t>
             </a:r>
           </a:p>
           <a:p>
@@ -15277,17 +14552,13 @@
             </a:pPr>
             <a:r>
               <a:rPr lang="en-US" sz="1600" dirty="0"/>
-              <a:t> </a:t>
+              <a:t>    e</a:t>
             </a:r>
             <a:r>
-              <a:rPr lang="en-US" sz="1600" dirty="0" smtClean="0"/>
-              <a:t>   e</a:t>
+              <a:rPr lang="en-IN" sz="1600" dirty="0"/>
+              <a:t>.g. A bloom filter with 1 million items in the filter with error of 0.001% (1 in ten thousand) requires about 3 MB memory.</a:t>
             </a:r>
-            <a:r>
-              <a:rPr lang="en-IN" sz="1600" dirty="0" smtClean="0"/>
-              <a:t>.g. A bloom filter with 1 million items in the filter with error of 0.001% (1 in ten thousand) requires 2925.12 KB memory.</a:t>
-            </a:r>
-            <a:endParaRPr lang="en-US" sz="1600" dirty="0" smtClean="0"/>
+            <a:endParaRPr lang="en-US" sz="1600" dirty="0"/>
           </a:p>
         </p:txBody>
       </p:sp>
@@ -15315,24 +14586,8 @@
               <a:buSzPct val="113000"/>
             </a:pPr>
             <a:r>
-              <a:rPr lang="en-US" sz="1600" dirty="0" smtClean="0"/>
-              <a:t>Our </a:t>
-            </a:r>
-            <a:r>
               <a:rPr lang="en-US" sz="1600" dirty="0"/>
-              <a:t>solution provides a facility </a:t>
-            </a:r>
-            <a:r>
-              <a:rPr lang="en-US" sz="1600" dirty="0" smtClean="0"/>
-              <a:t>to protect an authorized </a:t>
-            </a:r>
-            <a:r>
-              <a:rPr lang="en-US" sz="1600" dirty="0"/>
-              <a:t>computer from an unauthorized USB storage devices using both bloom filter and </a:t>
-            </a:r>
-            <a:r>
-              <a:rPr lang="en-US" sz="1600" dirty="0" smtClean="0"/>
-              <a:t>blockchain.</a:t>
+              <a:t>Our solution provides a facility to protect an authorized computer from an unauthorized USB storage devices in online/offline mode efficiently  using combination of both bloom filter and blockchain.</a:t>
             </a:r>
           </a:p>
           <a:p>
@@ -15340,8 +14595,16 @@
               <a:buSzPct val="113000"/>
             </a:pPr>
             <a:r>
-              <a:rPr lang="en-US" sz="1600" dirty="0" smtClean="0"/>
-              <a:t>Bloom filter also protects the offline machine from unauthorized access.</a:t>
+              <a:rPr lang="en-US" sz="1600" dirty="0"/>
+              <a:t>Block chain system keeps a track of the USB devices connected to a machine, and the devices added and removed from the whitelist. It also records the timestamp of the above mentioned activities, MAC address of the respective  machines and the user IDs.  Blockchain ‘audit trail’ is </a:t>
+            </a:r>
+            <a:r>
+              <a:rPr lang="en-US" sz="1600" dirty="0" err="1"/>
+              <a:t>untamperable</a:t>
+            </a:r>
+            <a:r>
+              <a:rPr lang="en-US" sz="1600" dirty="0"/>
+              <a:t> Therefore, suspicious activities can be traced back.</a:t>
             </a:r>
           </a:p>
           <a:p>
@@ -15349,8 +14612,8 @@
               <a:buSzPct val="113000"/>
             </a:pPr>
             <a:r>
-              <a:rPr lang="en-US" sz="1600" dirty="0" smtClean="0"/>
-              <a:t> Block chain system keeps a track of the USB devices connected to a machine, and the devices added and removed from the whitelist. It also records the timestamp of the above mentioned activities, MAC address of the respective  machines and the user IDs. Therefore, suspicious activities can be traced back.</a:t>
+              <a:rPr lang="en-US" sz="1600" dirty="0"/>
+              <a:t>Even if the probabilistic database is stolen, the MAC address of registered devices cannot be retrieved. </a:t>
             </a:r>
           </a:p>
           <a:p>
@@ -15358,24 +14621,8 @@
               <a:buSzPct val="113000"/>
             </a:pPr>
             <a:r>
-              <a:rPr lang="en-US" sz="1600" dirty="0" smtClean="0"/>
-              <a:t>Even </a:t>
-            </a:r>
-            <a:r>
-              <a:rPr lang="en-US" sz="1600" dirty="0"/>
-              <a:t>if </a:t>
-            </a:r>
-            <a:r>
-              <a:rPr lang="en-US" sz="1600" dirty="0" smtClean="0"/>
-              <a:t>the probabilistic </a:t>
-            </a:r>
-            <a:r>
-              <a:rPr lang="en-US" sz="1600" dirty="0"/>
-              <a:t>database is stolen, </a:t>
-            </a:r>
-            <a:r>
-              <a:rPr lang="en-US" sz="1600" dirty="0" smtClean="0"/>
-              <a:t>as the hash of the MAC address is stored, the MAC address cannot be retrieved.</a:t>
+              <a:rPr lang="en-IN" sz="1600" dirty="0"/>
+              <a:t>The encrypted file system in the storage device protects the authorized storage device from connecting to an unauthorized machine.</a:t>
             </a:r>
           </a:p>
           <a:p>
@@ -15383,8 +14630,16 @@
               <a:buSzPct val="113000"/>
             </a:pPr>
             <a:r>
-              <a:rPr lang="en-IN" sz="1600" dirty="0" smtClean="0"/>
-              <a:t>The encrypted file system in the storage device protects the authorized storage device from connecting to an unauthorized machine.</a:t>
+              <a:rPr lang="en-IN" sz="1600" dirty="0"/>
+              <a:t>Use of compiled languages like Rust/Go which avoid security issues like buffer </a:t>
+            </a:r>
+            <a:r>
+              <a:rPr lang="en-IN" sz="1600" dirty="0" err="1"/>
+              <a:t>overlow</a:t>
+            </a:r>
+            <a:r>
+              <a:rPr lang="en-IN" sz="1600"/>
+              <a:t>.</a:t>
             </a:r>
             <a:endParaRPr lang="en-US" sz="1600" dirty="0"/>
           </a:p>
@@ -15414,7 +14669,7 @@
           <a:p>
             <a:pPr algn="ctr"/>
             <a:r>
-              <a:rPr lang="en-IN" sz="1800" b="1" dirty="0" smtClean="0">
+              <a:rPr lang="en-IN" sz="1800" b="1" dirty="0">
                 <a:latin typeface="Calibri" pitchFamily="34" charset="0"/>
                 <a:cs typeface="Calibri" pitchFamily="34" charset="0"/>
               </a:rPr>
@@ -15451,7 +14706,7 @@
           <a:p>
             <a:pPr algn="ctr"/>
             <a:r>
-              <a:rPr lang="en-IN" sz="1800" b="1" dirty="0" smtClean="0">
+              <a:rPr lang="en-IN" sz="1800" b="1" dirty="0">
                 <a:latin typeface="Calibri" pitchFamily="34" charset="0"/>
                 <a:cs typeface="Calibri" pitchFamily="34" charset="0"/>
               </a:rPr>

</xml_diff>

<commit_message>
flow chart reviewed and updated
</commit_message>
<xml_diff>
--- a/Gov_templates/USB_whitelist.pptx
+++ b/Gov_templates/USB_whitelist.pptx
@@ -12676,7 +12676,7 @@
               <a:buNone/>
             </a:pPr>
             <a:r>
-              <a:rPr lang="en-IN" sz="1600">
+              <a:rPr lang="en-IN" sz="1600" dirty="0">
                 <a:solidFill>
                   <a:schemeClr val="dk1"/>
                 </a:solidFill>
@@ -13196,8 +13196,8 @@
         </p:nvSpPr>
         <p:spPr>
           <a:xfrm>
-            <a:off x="683568" y="4612415"/>
-            <a:ext cx="619434" cy="369332"/>
+            <a:off x="107511" y="4671907"/>
+            <a:ext cx="1195491" cy="309840"/>
           </a:xfrm>
           <a:prstGeom prst="rect">
             <a:avLst/>
@@ -13213,12 +13213,6 @@
           </a:bodyPr>
           <a:lstStyle/>
           <a:p>
-            <a:pPr marL="0" marR="0" lvl="0" indent="0" algn="l" rtl="0">
-              <a:spcBef>
-                <a:spcPts val="0"/>
-              </a:spcBef>
-              <a:buNone/>
-            </a:pPr>
             <a:r>
               <a:rPr lang="en-IN" sz="1600" dirty="0">
                 <a:solidFill>
@@ -13229,7 +13223,7 @@
                 <a:cs typeface="Calibri"/>
                 <a:sym typeface="Calibri"/>
               </a:rPr>
-              <a:t>Yes</a:t>
+              <a:t>Possibly Yes</a:t>
             </a:r>
           </a:p>
         </p:txBody>
@@ -13380,8 +13374,8 @@
         </p:nvSpPr>
         <p:spPr>
           <a:xfrm>
-            <a:off x="5778500" y="524935"/>
-            <a:ext cx="2362200" cy="584775"/>
+            <a:off x="5778500" y="524724"/>
+            <a:ext cx="2681932" cy="584775"/>
           </a:xfrm>
           <a:prstGeom prst="rect">
             <a:avLst/>
@@ -13410,7 +13404,7 @@
               <a:buNone/>
             </a:pPr>
             <a:r>
-              <a:rPr lang="en-IN" sz="1600" b="1">
+              <a:rPr lang="en-IN" sz="1600" b="1" dirty="0">
                 <a:solidFill>
                   <a:schemeClr val="dk1"/>
                 </a:solidFill>
@@ -13419,20 +13413,17 @@
                 <a:cs typeface="Calibri"/>
                 <a:sym typeface="Calibri"/>
               </a:rPr>
-              <a:t>Admin</a:t>
+              <a:t>Login as admin role (desktop client or web client)</a:t>
             </a:r>
-            <a:r>
-              <a:rPr lang="en-IN" sz="1600">
-                <a:solidFill>
-                  <a:schemeClr val="dk1"/>
-                </a:solidFill>
-                <a:latin typeface="Calibri"/>
-                <a:ea typeface="Calibri"/>
-                <a:cs typeface="Calibri"/>
-                <a:sym typeface="Calibri"/>
-              </a:rPr>
-              <a:t> machine with storage device connected</a:t>
-            </a:r>
+            <a:endParaRPr lang="en-IN" sz="1600" dirty="0">
+              <a:solidFill>
+                <a:schemeClr val="dk1"/>
+              </a:solidFill>
+              <a:latin typeface="Calibri"/>
+              <a:ea typeface="Calibri"/>
+              <a:cs typeface="Calibri"/>
+              <a:sym typeface="Calibri"/>
+            </a:endParaRPr>
           </a:p>
         </p:txBody>
       </p:sp>
@@ -13444,8 +13435,8 @@
         </p:nvSpPr>
         <p:spPr>
           <a:xfrm>
-            <a:off x="5181600" y="1464735"/>
-            <a:ext cx="3759200" cy="338554"/>
+            <a:off x="5181599" y="1464734"/>
+            <a:ext cx="3854893" cy="492839"/>
           </a:xfrm>
           <a:prstGeom prst="rect">
             <a:avLst/>
@@ -13474,7 +13465,7 @@
               <a:buNone/>
             </a:pPr>
             <a:r>
-              <a:rPr lang="en-IN" sz="1600">
+              <a:rPr lang="en-IN" sz="1600" dirty="0">
                 <a:solidFill>
                   <a:schemeClr val="dk1"/>
                 </a:solidFill>
@@ -13483,8 +13474,25 @@
                 <a:cs typeface="Calibri"/>
                 <a:sym typeface="Calibri"/>
               </a:rPr>
-              <a:t>Acquire mac address of the storage device</a:t>
+              <a:t>Enter the MAC id of the storage device in a form</a:t>
             </a:r>
+          </a:p>
+          <a:p>
+            <a:pPr marL="0" marR="0" lvl="0" indent="0" algn="l" rtl="0">
+              <a:spcBef>
+                <a:spcPts val="0"/>
+              </a:spcBef>
+              <a:buNone/>
+            </a:pPr>
+            <a:endParaRPr lang="en-IN" sz="1600" dirty="0">
+              <a:solidFill>
+                <a:schemeClr val="dk1"/>
+              </a:solidFill>
+              <a:latin typeface="Calibri"/>
+              <a:ea typeface="Calibri"/>
+              <a:cs typeface="Calibri"/>
+              <a:sym typeface="Calibri"/>
+            </a:endParaRPr>
           </a:p>
         </p:txBody>
       </p:sp>
@@ -13496,7 +13504,7 @@
         </p:nvSpPr>
         <p:spPr>
           <a:xfrm>
-            <a:off x="5778500" y="2132914"/>
+            <a:off x="5778500" y="2246864"/>
             <a:ext cx="3035300" cy="338554"/>
           </a:xfrm>
           <a:prstGeom prst="rect">
@@ -13544,14 +13552,16 @@
         <p:nvCxnSpPr>
           <p:cNvPr id="131" name="Shape 131"/>
           <p:cNvCxnSpPr>
+            <a:cxnSpLocks/>
             <a:stCxn id="128" idx="2"/>
+            <a:endCxn id="129" idx="0"/>
           </p:cNvCxnSpPr>
           <p:nvPr/>
         </p:nvCxnSpPr>
         <p:spPr>
-          <a:xfrm>
-            <a:off x="6959600" y="1109710"/>
-            <a:ext cx="0" cy="342300"/>
+          <a:xfrm flipH="1">
+            <a:off x="7109046" y="1109499"/>
+            <a:ext cx="10420" cy="355235"/>
           </a:xfrm>
           <a:prstGeom prst="straightConnector1">
             <a:avLst/>
@@ -13576,7 +13586,7 @@
         </p:nvCxnSpPr>
         <p:spPr>
           <a:xfrm>
-            <a:off x="6959600" y="1790589"/>
+            <a:off x="6959599" y="1892131"/>
             <a:ext cx="0" cy="342325"/>
           </a:xfrm>
           <a:prstGeom prst="straightConnector1">
@@ -13654,8 +13664,8 @@
         </p:nvSpPr>
         <p:spPr>
           <a:xfrm>
-            <a:off x="5778500" y="3540392"/>
-            <a:ext cx="2574924" cy="338554"/>
+            <a:off x="5778500" y="3540391"/>
+            <a:ext cx="2574910" cy="536675"/>
           </a:xfrm>
           <a:prstGeom prst="rect">
             <a:avLst/>
@@ -13684,7 +13694,7 @@
               <a:buNone/>
             </a:pPr>
             <a:r>
-              <a:rPr lang="en-IN" sz="1600">
+              <a:rPr lang="en-IN" sz="1600" dirty="0">
                 <a:solidFill>
                   <a:schemeClr val="dk1"/>
                 </a:solidFill>
@@ -13693,7 +13703,7 @@
                 <a:cs typeface="Calibri"/>
                 <a:sym typeface="Calibri"/>
               </a:rPr>
-              <a:t>Put the encrypted file in USB</a:t>
+              <a:t>Put the encrypted filesystem on USB</a:t>
             </a:r>
           </a:p>
         </p:txBody>

</xml_diff>

<commit_message>
added team and college info
</commit_message>
<xml_diff>
--- a/Gov_templates/USB_whitelist.pptx
+++ b/Gov_templates/USB_whitelist.pptx
@@ -5212,17 +5212,37 @@
                 <a:latin typeface="Calibri"/>
                 <a:ea typeface="Calibri"/>
               </a:rPr>
-              <a:t>:  #MOD7				</a:t>
-            </a:r>
-            <a:r>
-              <a:rPr lang="en-IN" sz="1800" b="1" strike="noStrike" spc="-1" dirty="0">
+              <a:t>:  #MOD7			</a:t>
+            </a:r>
+            <a:r>
+              <a:rPr lang="en-IN" sz="1800" b="0" strike="noStrike" spc="-1" dirty="0" smtClean="0">
                 <a:solidFill>
                   <a:srgbClr val="000000"/>
                 </a:solidFill>
                 <a:latin typeface="Calibri"/>
                 <a:ea typeface="Calibri"/>
               </a:rPr>
-              <a:t>Team Name:  X-GEN</a:t>
+              <a:t>         </a:t>
+            </a:r>
+            <a:r>
+              <a:rPr lang="en-IN" sz="1800" b="1" strike="noStrike" spc="-1" dirty="0" smtClean="0">
+                <a:solidFill>
+                  <a:srgbClr val="000000"/>
+                </a:solidFill>
+                <a:latin typeface="Calibri"/>
+                <a:ea typeface="Calibri"/>
+              </a:rPr>
+              <a:t>Team </a:t>
+            </a:r>
+            <a:r>
+              <a:rPr lang="en-IN" sz="1800" b="1" strike="noStrike" spc="-1" dirty="0">
+                <a:solidFill>
+                  <a:srgbClr val="000000"/>
+                </a:solidFill>
+                <a:latin typeface="Calibri"/>
+                <a:ea typeface="Calibri"/>
+              </a:rPr>
+              <a:t>Name:  X-GEN</a:t>
             </a:r>
             <a:endParaRPr lang="en-IN" sz="1800" b="0" strike="noStrike" spc="-1" dirty="0">
               <a:solidFill>
@@ -5258,67 +5278,37 @@
                 <a:latin typeface="Calibri"/>
                 <a:ea typeface="Calibri"/>
               </a:rPr>
-              <a:t>: </a:t>
-            </a:r>
-            <a:r>
-              <a:rPr lang="en-IN" sz="1800" b="0" strike="noStrike" spc="-1" dirty="0" err="1">
+              <a:t>: Akshata  Jahagirdar	</a:t>
+            </a:r>
+            <a:r>
+              <a:rPr lang="en-IN" sz="1800" b="0" strike="noStrike" spc="-1" dirty="0" smtClean="0">
                 <a:solidFill>
                   <a:srgbClr val="000000"/>
                 </a:solidFill>
                 <a:latin typeface="Calibri"/>
                 <a:ea typeface="Calibri"/>
               </a:rPr>
-              <a:t>Akshata</a:t>
-            </a:r>
-            <a:r>
-              <a:rPr lang="en-IN" sz="1800" b="0" strike="noStrike" spc="-1" dirty="0">
+              <a:t>         </a:t>
+            </a:r>
+            <a:r>
+              <a:rPr lang="en-IN" sz="1800" b="1" strike="noStrike" spc="-1" dirty="0" smtClean="0">
                 <a:solidFill>
                   <a:srgbClr val="000000"/>
                 </a:solidFill>
                 <a:latin typeface="Calibri"/>
                 <a:ea typeface="Calibri"/>
               </a:rPr>
-              <a:t>  </a:t>
-            </a:r>
-            <a:r>
-              <a:rPr lang="en-IN" sz="1800" b="0" strike="noStrike" spc="-1" dirty="0" err="1">
+              <a:t>College Code</a:t>
+            </a:r>
+            <a:r>
+              <a:rPr lang="en-IN" sz="1800" b="0" strike="noStrike" spc="-1" dirty="0" smtClean="0">
                 <a:solidFill>
                   <a:srgbClr val="000000"/>
                 </a:solidFill>
                 <a:latin typeface="Calibri"/>
                 <a:ea typeface="Calibri"/>
               </a:rPr>
-              <a:t>Jahagirdar</a:t>
-            </a:r>
-            <a:r>
-              <a:rPr lang="en-IN" sz="1800" b="0" strike="noStrike" spc="-1" dirty="0">
-                <a:solidFill>
-                  <a:srgbClr val="000000"/>
-                </a:solidFill>
-                <a:latin typeface="Calibri"/>
-                <a:ea typeface="Calibri"/>
-              </a:rPr>
-              <a:t>		</a:t>
-            </a:r>
-            <a:r>
-              <a:rPr lang="en-IN" sz="1800" b="1" strike="noStrike" spc="-1" dirty="0">
-                <a:solidFill>
-                  <a:srgbClr val="000000"/>
-                </a:solidFill>
-                <a:latin typeface="Calibri"/>
-                <a:ea typeface="Calibri"/>
-              </a:rPr>
-              <a:t>College Code</a:t>
-            </a:r>
-            <a:r>
-              <a:rPr lang="en-IN" sz="1800" b="0" strike="noStrike" spc="-1" dirty="0">
-                <a:solidFill>
-                  <a:srgbClr val="000000"/>
-                </a:solidFill>
-                <a:latin typeface="Calibri"/>
-                <a:ea typeface="Calibri"/>
-              </a:rPr>
-              <a:t>:</a:t>
+              <a:t>:1-3328028571</a:t>
             </a:r>
             <a:endParaRPr lang="en-IN" sz="1800" b="0" strike="noStrike" spc="-1" dirty="0">
               <a:solidFill>
@@ -5370,7 +5360,7 @@
               </a:lnSpc>
             </a:pPr>
             <a:r>
-              <a:rPr lang="en-IN" sz="2000" b="1" strike="noStrike" spc="-1">
+              <a:rPr lang="en-IN" sz="2000" b="1" strike="noStrike" spc="-1" dirty="0">
                 <a:solidFill>
                   <a:srgbClr val="000000"/>
                 </a:solidFill>
@@ -5379,7 +5369,7 @@
               </a:rPr>
               <a:t>IDEA / SOLUTION / PROTOTYPE</a:t>
             </a:r>
-            <a:endParaRPr lang="en-IN" sz="2000" b="0" strike="noStrike" spc="-1">
+            <a:endParaRPr lang="en-IN" sz="2000" b="0" strike="noStrike" spc="-1" dirty="0">
               <a:latin typeface="Arial"/>
             </a:endParaRPr>
           </a:p>
@@ -5431,7 +5421,7 @@
               <a:buChar char="•"/>
             </a:pPr>
             <a:r>
-              <a:rPr lang="en-IN" sz="1600" b="0" strike="noStrike" spc="-1">
+              <a:rPr lang="en-IN" sz="1600" b="0" strike="noStrike" spc="-1" dirty="0">
                 <a:solidFill>
                   <a:srgbClr val="000000"/>
                 </a:solidFill>
@@ -5440,7 +5430,7 @@
               </a:rPr>
               <a:t>Creating  a distributed database with encryption which consists of whitelisted MAC addresses.</a:t>
             </a:r>
-            <a:endParaRPr lang="en-IN" sz="1600" b="0" strike="noStrike" spc="-1">
+            <a:endParaRPr lang="en-IN" sz="1600" b="0" strike="noStrike" spc="-1" dirty="0">
               <a:latin typeface="Arial"/>
             </a:endParaRPr>
           </a:p>
@@ -5456,7 +5446,7 @@
               <a:buChar char="•"/>
             </a:pPr>
             <a:r>
-              <a:rPr lang="en-IN" sz="1600" b="0" strike="noStrike" spc="-1">
+              <a:rPr lang="en-IN" sz="1600" b="0" strike="noStrike" spc="-1" dirty="0">
                 <a:solidFill>
                   <a:srgbClr val="000000"/>
                 </a:solidFill>
@@ -5465,7 +5455,7 @@
               </a:rPr>
               <a:t>This can be implemented using Blockchain system which provides tamper-proof dataset e.g. – Hyperledger. We will implement encryption on top of blockchain infrastructure.</a:t>
             </a:r>
-            <a:endParaRPr lang="en-IN" sz="1600" b="0" strike="noStrike" spc="-1">
+            <a:endParaRPr lang="en-IN" sz="1600" b="0" strike="noStrike" spc="-1" dirty="0">
               <a:latin typeface="Arial"/>
             </a:endParaRPr>
           </a:p>
@@ -5481,7 +5471,7 @@
               <a:buChar char="•"/>
             </a:pPr>
             <a:r>
-              <a:rPr lang="en-IN" sz="1600" b="0" strike="noStrike" spc="-1">
+              <a:rPr lang="en-IN" sz="1600" b="0" strike="noStrike" spc="-1" dirty="0">
                 <a:solidFill>
                   <a:srgbClr val="000000"/>
                 </a:solidFill>
@@ -5490,7 +5480,7 @@
               </a:rPr>
               <a:t>When the storage device is connected to the computer a program will extract the MAC address, generate a hash and check if hash is present in the local database. A local probabilistic database (e.g. like bloom filter) will be used to check if the hash of the MAC address is whitelisted. If hash is not on the whitelist then the OS event will notify the admin regarding the same and block it. Use of Probabilistic database will protect the system working on internet/intranet and disconnected computers from the unauthorized storage devices. The program used, handles the connectivity of storage devices with the computer.</a:t>
             </a:r>
-            <a:endParaRPr lang="en-IN" sz="1600" b="0" strike="noStrike" spc="-1">
+            <a:endParaRPr lang="en-IN" sz="1600" b="0" strike="noStrike" spc="-1" dirty="0">
               <a:latin typeface="Arial"/>
             </a:endParaRPr>
           </a:p>
@@ -5506,7 +5496,7 @@
               <a:buChar char="•"/>
             </a:pPr>
             <a:r>
-              <a:rPr lang="en-IN" sz="1600" b="0" strike="noStrike" spc="-1">
+              <a:rPr lang="en-IN" sz="1600" b="0" strike="noStrike" spc="-1" dirty="0">
                 <a:solidFill>
                   <a:srgbClr val="000000"/>
                 </a:solidFill>
@@ -5515,7 +5505,7 @@
               </a:rPr>
               <a:t>Another level of security will be to create an encrypted file system on storage device and  a decryption algorithm for the same on authorized computer. This prevents data transfer from authorized storage device to unauthorized computer. File system will get decrypted automatically when a whitelisted storage device is connected to an authorized computer. If decrypted correctly, only then data transfer or access between storage device and computer is possible. </a:t>
             </a:r>
-            <a:endParaRPr lang="en-IN" sz="1600" b="0" strike="noStrike" spc="-1">
+            <a:endParaRPr lang="en-IN" sz="1600" b="0" strike="noStrike" spc="-1" dirty="0">
               <a:latin typeface="Arial"/>
             </a:endParaRPr>
           </a:p>
@@ -5581,8 +5571,8 @@
         </p:nvSpPr>
         <p:spPr>
           <a:xfrm>
-            <a:off x="177840" y="280080"/>
-            <a:ext cx="8838720" cy="2284200"/>
+            <a:off x="277091" y="280080"/>
+            <a:ext cx="8434909" cy="2284200"/>
           </a:xfrm>
           <a:prstGeom prst="rect">
             <a:avLst/>
@@ -5619,7 +5609,7 @@
               <a:buChar char="•"/>
             </a:pPr>
             <a:r>
-              <a:rPr lang="en-IN" sz="1600" b="0" strike="noStrike" spc="-1">
+              <a:rPr lang="en-IN" sz="1600" b="0" strike="noStrike" spc="-1" dirty="0">
                 <a:solidFill>
                   <a:srgbClr val="000000"/>
                 </a:solidFill>
@@ -5628,7 +5618,7 @@
               </a:rPr>
               <a:t>The encrypted file system will be created on the storage device when it is connected to the blockchain system for the first time for registration on the database. </a:t>
             </a:r>
-            <a:endParaRPr lang="en-IN" sz="1600" b="0" strike="noStrike" spc="-1">
+            <a:endParaRPr lang="en-IN" sz="1600" b="0" strike="noStrike" spc="-1" dirty="0">
               <a:latin typeface="Arial"/>
             </a:endParaRPr>
           </a:p>
@@ -5644,7 +5634,7 @@
               <a:buChar char="•"/>
             </a:pPr>
             <a:r>
-              <a:rPr lang="en-IN" sz="1600" b="0" strike="noStrike" spc="-1">
+              <a:rPr lang="en-IN" sz="1600" b="0" strike="noStrike" spc="-1" dirty="0">
                 <a:solidFill>
                   <a:srgbClr val="000000"/>
                 </a:solidFill>
@@ -5653,7 +5643,7 @@
               </a:rPr>
               <a:t>The computers which are offline will also use a probabilistic database of authorized MAC addresses (e.g. like Bloom filter). The driver program on the computer will check the storage device against this probabilistic database. The driver program will block the devices which are not on the whitelist. </a:t>
             </a:r>
-            <a:endParaRPr lang="en-IN" sz="1600" b="0" strike="noStrike" spc="-1">
+            <a:endParaRPr lang="en-IN" sz="1600" b="0" strike="noStrike" spc="-1" dirty="0">
               <a:latin typeface="Arial"/>
             </a:endParaRPr>
           </a:p>
@@ -5669,7 +5659,7 @@
               <a:buChar char="•"/>
             </a:pPr>
             <a:r>
-              <a:rPr lang="en-IN" sz="1600" b="0" strike="noStrike" spc="-1">
+              <a:rPr lang="en-IN" sz="1600" b="0" strike="noStrike" spc="-1" dirty="0">
                 <a:solidFill>
                   <a:srgbClr val="000000"/>
                 </a:solidFill>
@@ -5678,7 +5668,7 @@
               </a:rPr>
               <a:t>The Bloom filter database will be updated when it is connected to the internet periodically. To update, the whole database is not replaced, instead the delta i.e. difference between the existing database on the Bloom filter and the local database is found and then added to the database of Bloom filter.</a:t>
             </a:r>
-            <a:endParaRPr lang="en-IN" sz="1600" b="0" strike="noStrike" spc="-1">
+            <a:endParaRPr lang="en-IN" sz="1600" b="0" strike="noStrike" spc="-1" dirty="0">
               <a:latin typeface="Arial"/>
             </a:endParaRPr>
           </a:p>
@@ -5688,7 +5678,7 @@
                 <a:spcPct val="100000"/>
               </a:lnSpc>
             </a:pPr>
-            <a:endParaRPr lang="en-IN" sz="1600" b="0" strike="noStrike" spc="-1">
+            <a:endParaRPr lang="en-IN" sz="1600" b="0" strike="noStrike" spc="-1" dirty="0">
               <a:latin typeface="Arial"/>
             </a:endParaRPr>
           </a:p>
@@ -5698,7 +5688,7 @@
                 <a:spcPct val="100000"/>
               </a:lnSpc>
             </a:pPr>
-            <a:endParaRPr lang="en-IN" sz="1600" b="0" strike="noStrike" spc="-1">
+            <a:endParaRPr lang="en-IN" sz="1600" b="0" strike="noStrike" spc="-1" dirty="0">
               <a:latin typeface="Arial"/>
             </a:endParaRPr>
           </a:p>
@@ -5712,7 +5702,7 @@
         </p:nvSpPr>
         <p:spPr>
           <a:xfrm>
-            <a:off x="482760" y="2565000"/>
+            <a:off x="482760" y="2828357"/>
             <a:ext cx="8229240" cy="345600"/>
           </a:xfrm>
           <a:prstGeom prst="rect">
@@ -5745,7 +5735,7 @@
               </a:lnSpc>
             </a:pPr>
             <a:r>
-              <a:rPr lang="en-IN" sz="2000" b="1" strike="noStrike" spc="-1">
+              <a:rPr lang="en-IN" sz="2000" b="1" strike="noStrike" spc="-1" dirty="0">
                 <a:solidFill>
                   <a:srgbClr val="000000"/>
                 </a:solidFill>
@@ -5754,7 +5744,7 @@
               </a:rPr>
               <a:t>TECHNOLOGY STACK</a:t>
             </a:r>
-            <a:endParaRPr lang="en-IN" sz="2000" b="0" strike="noStrike" spc="-1">
+            <a:endParaRPr lang="en-IN" sz="2000" b="0" strike="noStrike" spc="-1" dirty="0">
               <a:latin typeface="Arial"/>
             </a:endParaRPr>
           </a:p>
@@ -5768,8 +5758,8 @@
         </p:nvSpPr>
         <p:spPr>
           <a:xfrm>
-            <a:off x="114480" y="2910960"/>
-            <a:ext cx="8826120" cy="1597680"/>
+            <a:off x="277090" y="3185902"/>
+            <a:ext cx="8676109" cy="1411658"/>
           </a:xfrm>
           <a:prstGeom prst="rect">
             <a:avLst/>
@@ -5806,7 +5796,7 @@
               <a:buChar char="•"/>
             </a:pPr>
             <a:r>
-              <a:rPr lang="en-IN" sz="1600" b="0" strike="noStrike" spc="-1">
+              <a:rPr lang="en-IN" sz="1600" b="0" strike="noStrike" spc="-1" dirty="0">
                 <a:solidFill>
                   <a:srgbClr val="000000"/>
                 </a:solidFill>
@@ -5815,7 +5805,7 @@
               </a:rPr>
               <a:t>Open Source Blockchain distributed database like Hyperledger</a:t>
             </a:r>
-            <a:endParaRPr lang="en-IN" sz="1600" b="0" strike="noStrike" spc="-1">
+            <a:endParaRPr lang="en-IN" sz="1600" b="0" strike="noStrike" spc="-1" dirty="0">
               <a:latin typeface="Arial"/>
             </a:endParaRPr>
           </a:p>
@@ -5831,7 +5821,7 @@
               <a:buChar char="•"/>
             </a:pPr>
             <a:r>
-              <a:rPr lang="en-IN" sz="1600" b="0" strike="noStrike" spc="-1">
+              <a:rPr lang="en-IN" sz="1600" b="0" strike="noStrike" spc="-1" dirty="0">
                 <a:solidFill>
                   <a:srgbClr val="000000"/>
                 </a:solidFill>
@@ -5840,7 +5830,7 @@
               </a:rPr>
               <a:t>Browser/desktop based front-end for admin</a:t>
             </a:r>
-            <a:endParaRPr lang="en-IN" sz="1600" b="0" strike="noStrike" spc="-1">
+            <a:endParaRPr lang="en-IN" sz="1600" b="0" strike="noStrike" spc="-1" dirty="0">
               <a:latin typeface="Arial"/>
             </a:endParaRPr>
           </a:p>
@@ -5856,7 +5846,7 @@
               <a:buChar char="•"/>
             </a:pPr>
             <a:r>
-              <a:rPr lang="en-IN" sz="1600" b="0" strike="noStrike" spc="-1">
+              <a:rPr lang="en-IN" sz="1600" b="0" strike="noStrike" spc="-1" dirty="0">
                 <a:solidFill>
                   <a:srgbClr val="000000"/>
                 </a:solidFill>
@@ -5865,7 +5855,7 @@
               </a:rPr>
               <a:t>Windows service for detecting/blocking connected USB storage device</a:t>
             </a:r>
-            <a:endParaRPr lang="en-IN" sz="1600" b="0" strike="noStrike" spc="-1">
+            <a:endParaRPr lang="en-IN" sz="1600" b="0" strike="noStrike" spc="-1" dirty="0">
               <a:latin typeface="Arial"/>
             </a:endParaRPr>
           </a:p>
@@ -5881,7 +5871,7 @@
               <a:buChar char="•"/>
             </a:pPr>
             <a:r>
-              <a:rPr lang="en-IN" sz="1600" b="0" strike="noStrike" spc="-1">
+              <a:rPr lang="en-IN" sz="1600" b="0" strike="noStrike" spc="-1" dirty="0">
                 <a:solidFill>
                   <a:srgbClr val="000000"/>
                 </a:solidFill>
@@ -5890,7 +5880,7 @@
               </a:rPr>
               <a:t>E-mail / SMS notification service</a:t>
             </a:r>
-            <a:endParaRPr lang="en-IN" sz="1600" b="0" strike="noStrike" spc="-1">
+            <a:endParaRPr lang="en-IN" sz="1600" b="0" strike="noStrike" spc="-1" dirty="0">
               <a:latin typeface="Arial"/>
             </a:endParaRPr>
           </a:p>
@@ -5906,7 +5896,7 @@
               <a:buChar char="•"/>
             </a:pPr>
             <a:r>
-              <a:rPr lang="en-IN" sz="1600" b="0" strike="noStrike" spc="-1">
+              <a:rPr lang="en-IN" sz="1600" b="0" strike="noStrike" spc="-1" dirty="0">
                 <a:solidFill>
                   <a:srgbClr val="000000"/>
                 </a:solidFill>
@@ -5915,7 +5905,7 @@
               </a:rPr>
               <a:t>Language used: Go / Rust, Python</a:t>
             </a:r>
-            <a:endParaRPr lang="en-IN" sz="1600" b="0" strike="noStrike" spc="-1">
+            <a:endParaRPr lang="en-IN" sz="1600" b="0" strike="noStrike" spc="-1" dirty="0">
               <a:latin typeface="Arial"/>
             </a:endParaRPr>
           </a:p>
@@ -5985,8 +5975,8 @@
         </p:nvSpPr>
         <p:spPr>
           <a:xfrm>
-            <a:off x="114480" y="5105520"/>
-            <a:ext cx="8838720" cy="1477080"/>
+            <a:off x="277090" y="5105520"/>
+            <a:ext cx="8676109" cy="1477080"/>
           </a:xfrm>
           <a:prstGeom prst="rect">
             <a:avLst/>
@@ -6023,7 +6013,7 @@
               <a:buChar char="•"/>
             </a:pPr>
             <a:r>
-              <a:rPr lang="en-IN" sz="1600" b="0" strike="noStrike" spc="-1">
+              <a:rPr lang="en-IN" sz="1600" b="0" strike="noStrike" spc="-1" dirty="0">
                 <a:solidFill>
                   <a:srgbClr val="000000"/>
                 </a:solidFill>
@@ -6032,7 +6022,7 @@
               </a:rPr>
               <a:t>Probabilistic data structures are not 100% accurate. In extremely rare case authorized device may get blocked if computer is offline</a:t>
             </a:r>
-            <a:endParaRPr lang="en-IN" sz="1600" b="0" strike="noStrike" spc="-1">
+            <a:endParaRPr lang="en-IN" sz="1600" b="0" strike="noStrike" spc="-1" dirty="0">
               <a:latin typeface="Arial"/>
             </a:endParaRPr>
           </a:p>
@@ -6048,7 +6038,7 @@
               <a:buChar char="•"/>
             </a:pPr>
             <a:r>
-              <a:rPr lang="en-IN" sz="1600" b="0" strike="noStrike" spc="-1">
+              <a:rPr lang="en-IN" sz="1600" b="0" strike="noStrike" spc="-1" dirty="0">
                 <a:solidFill>
                   <a:srgbClr val="000000"/>
                 </a:solidFill>
@@ -6057,7 +6047,7 @@
               </a:rPr>
               <a:t>The offline devices have to be connected to the internet or intranet for updating it periodically. This can give access to the devices which have been removed from the whitelist and won’t give access to the newly added devices.</a:t>
             </a:r>
-            <a:endParaRPr lang="en-IN" sz="1600" b="0" strike="noStrike" spc="-1">
+            <a:endParaRPr lang="en-IN" sz="1600" b="0" strike="noStrike" spc="-1" dirty="0">
               <a:latin typeface="Arial"/>
             </a:endParaRPr>
           </a:p>
@@ -8120,7 +8110,7 @@
         <p:spPr>
           <a:xfrm>
             <a:off x="170280" y="764640"/>
-            <a:ext cx="8712720" cy="1367640"/>
+            <a:ext cx="8712720" cy="1471680"/>
           </a:xfrm>
           <a:prstGeom prst="rect">
             <a:avLst/>
@@ -8149,7 +8139,7 @@
               <a:buChar char="•"/>
             </a:pPr>
             <a:r>
-              <a:rPr lang="en-IN" sz="1600" b="0" strike="noStrike" spc="-1">
+              <a:rPr lang="en-IN" sz="1600" b="0" strike="noStrike" spc="-1" dirty="0">
                 <a:solidFill>
                   <a:srgbClr val="000000"/>
                 </a:solidFill>
@@ -8159,7 +8149,7 @@
               <a:t> Use of </a:t>
             </a:r>
             <a:r>
-              <a:rPr lang="en-IN" sz="1600" b="0" i="1" strike="noStrike" spc="-1">
+              <a:rPr lang="en-IN" sz="1600" b="0" i="1" strike="noStrike" spc="-1" dirty="0">
                 <a:solidFill>
                   <a:srgbClr val="000000"/>
                 </a:solidFill>
@@ -8169,7 +8159,7 @@
               <a:t>blockchain</a:t>
             </a:r>
             <a:r>
-              <a:rPr lang="en-IN" sz="1600" b="0" strike="noStrike" spc="-1">
+              <a:rPr lang="en-IN" sz="1600" b="0" strike="noStrike" spc="-1" dirty="0">
                 <a:solidFill>
                   <a:srgbClr val="000000"/>
                 </a:solidFill>
@@ -8178,7 +8168,7 @@
               </a:rPr>
               <a:t> based systems to provide tamper-proof, distributed database of registered devices.</a:t>
             </a:r>
-            <a:endParaRPr lang="en-IN" sz="1600" b="0" strike="noStrike" spc="-1">
+            <a:endParaRPr lang="en-IN" sz="1600" b="0" strike="noStrike" spc="-1" dirty="0">
               <a:solidFill>
                 <a:srgbClr val="000000"/>
               </a:solidFill>
@@ -8201,7 +8191,7 @@
               <a:buChar char="•"/>
             </a:pPr>
             <a:r>
-              <a:rPr lang="en-IN" sz="1600" b="0" strike="noStrike" spc="-1">
+              <a:rPr lang="en-IN" sz="1600" b="0" strike="noStrike" spc="-1" dirty="0">
                 <a:solidFill>
                   <a:srgbClr val="000000"/>
                 </a:solidFill>
@@ -8210,7 +8200,7 @@
               </a:rPr>
               <a:t> The local probabilistic data base is space-efficient and provides high accuracy for ‘offline’ access.</a:t>
             </a:r>
-            <a:endParaRPr lang="en-IN" sz="1600" b="0" strike="noStrike" spc="-1">
+            <a:endParaRPr lang="en-IN" sz="1600" b="0" strike="noStrike" spc="-1" dirty="0">
               <a:solidFill>
                 <a:srgbClr val="000000"/>
               </a:solidFill>
@@ -8227,7 +8217,7 @@
               </a:spcBef>
             </a:pPr>
             <a:r>
-              <a:rPr lang="en-IN" sz="1600" b="0" strike="noStrike" spc="-1">
+              <a:rPr lang="en-IN" sz="1600" b="0" strike="noStrike" spc="-1" dirty="0">
                 <a:solidFill>
                   <a:srgbClr val="000000"/>
                 </a:solidFill>
@@ -8236,7 +8226,7 @@
               </a:rPr>
               <a:t>    e.g. A bloom filter with 1 million items in the filter with error of 0.001% (1 in ten thousand) requires about 3 MB memory.</a:t>
             </a:r>
-            <a:endParaRPr lang="en-IN" sz="1600" b="0" strike="noStrike" spc="-1">
+            <a:endParaRPr lang="en-IN" sz="1600" b="0" strike="noStrike" spc="-1" dirty="0">
               <a:solidFill>
                 <a:srgbClr val="000000"/>
               </a:solidFill>
@@ -8283,7 +8273,7 @@
               <a:buChar char="•"/>
             </a:pPr>
             <a:r>
-              <a:rPr lang="en-IN" sz="1600" b="0" strike="noStrike" spc="-1">
+              <a:rPr lang="en-IN" sz="1600" b="0" strike="noStrike" spc="-1" dirty="0">
                 <a:solidFill>
                   <a:srgbClr val="000000"/>
                 </a:solidFill>
@@ -8292,7 +8282,7 @@
               </a:rPr>
               <a:t>Our solution provides a facility to protect an authorized computer from an unauthorized USB storage devices in online/offline mode efficiently  using combination of both bloom filter and blockchain.</a:t>
             </a:r>
-            <a:endParaRPr lang="en-IN" sz="1600" b="0" strike="noStrike" spc="-1">
+            <a:endParaRPr lang="en-IN" sz="1600" b="0" strike="noStrike" spc="-1" dirty="0">
               <a:solidFill>
                 <a:srgbClr val="000000"/>
               </a:solidFill>
@@ -8315,7 +8305,7 @@
               <a:buChar char="•"/>
             </a:pPr>
             <a:r>
-              <a:rPr lang="en-IN" sz="1600" b="0" strike="noStrike" spc="-1">
+              <a:rPr lang="en-IN" sz="1600" b="0" strike="noStrike" spc="-1" dirty="0">
                 <a:solidFill>
                   <a:srgbClr val="000000"/>
                 </a:solidFill>
@@ -8324,7 +8314,7 @@
               </a:rPr>
               <a:t>Block chain system keeps a track of the USB devices connected to a machine, and the devices added and removed from the whitelist. It also records the timestamp of the above mentioned activities, MAC address of the respective  machines and the user IDs.  Blockchain ‘audit trail’ is tamper-proof. Therefore, suspicious activities can be traced back.</a:t>
             </a:r>
-            <a:endParaRPr lang="en-IN" sz="1600" b="0" strike="noStrike" spc="-1">
+            <a:endParaRPr lang="en-IN" sz="1600" b="0" strike="noStrike" spc="-1" dirty="0">
               <a:solidFill>
                 <a:srgbClr val="000000"/>
               </a:solidFill>
@@ -8347,7 +8337,7 @@
               <a:buChar char="•"/>
             </a:pPr>
             <a:r>
-              <a:rPr lang="en-IN" sz="1600" b="0" strike="noStrike" spc="-1">
+              <a:rPr lang="en-IN" sz="1600" b="0" strike="noStrike" spc="-1" dirty="0">
                 <a:solidFill>
                   <a:srgbClr val="000000"/>
                 </a:solidFill>
@@ -8356,7 +8346,7 @@
               </a:rPr>
               <a:t>Even if the probabilistic database is stolen, the MAC address of registered devices cannot be retrieved. </a:t>
             </a:r>
-            <a:endParaRPr lang="en-IN" sz="1600" b="0" strike="noStrike" spc="-1">
+            <a:endParaRPr lang="en-IN" sz="1600" b="0" strike="noStrike" spc="-1" dirty="0">
               <a:solidFill>
                 <a:srgbClr val="000000"/>
               </a:solidFill>
@@ -8379,7 +8369,7 @@
               <a:buChar char="•"/>
             </a:pPr>
             <a:r>
-              <a:rPr lang="en-IN" sz="1600" b="0" strike="noStrike" spc="-1">
+              <a:rPr lang="en-IN" sz="1600" b="0" strike="noStrike" spc="-1" dirty="0">
                 <a:solidFill>
                   <a:srgbClr val="000000"/>
                 </a:solidFill>
@@ -8388,7 +8378,7 @@
               </a:rPr>
               <a:t>The encrypted file system in the storage device protects the authorized storage device from connecting to an unauthorized machine.</a:t>
             </a:r>
-            <a:endParaRPr lang="en-IN" sz="1600" b="0" strike="noStrike" spc="-1">
+            <a:endParaRPr lang="en-IN" sz="1600" b="0" strike="noStrike" spc="-1" dirty="0">
               <a:solidFill>
                 <a:srgbClr val="000000"/>
               </a:solidFill>
@@ -8411,7 +8401,7 @@
               <a:buChar char="•"/>
             </a:pPr>
             <a:r>
-              <a:rPr lang="en-IN" sz="1600" b="0" strike="noStrike" spc="-1">
+              <a:rPr lang="en-IN" sz="1600" b="0" strike="noStrike" spc="-1" dirty="0">
                 <a:solidFill>
                   <a:srgbClr val="000000"/>
                 </a:solidFill>
@@ -8420,7 +8410,7 @@
               </a:rPr>
               <a:t>Use of compiled languages like Rust/Go which avoid security issues like buffer overflow.</a:t>
             </a:r>
-            <a:endParaRPr lang="en-IN" sz="1600" b="0" strike="noStrike" spc="-1">
+            <a:endParaRPr lang="en-IN" sz="1600" b="0" strike="noStrike" spc="-1" dirty="0">
               <a:solidFill>
                 <a:srgbClr val="000000"/>
               </a:solidFill>
@@ -9069,7 +9059,7 @@
     </a:clrScheme>
     <a:fontScheme name="Office">
       <a:majorFont>
-        <a:latin typeface="Calibri Light" panose="020F0302020204030204"/>
+        <a:latin typeface="Calibri Light"/>
         <a:ea typeface=""/>
         <a:cs typeface=""/>
         <a:font script="Jpan" typeface="游ゴシック Light"/>
@@ -9121,7 +9111,7 @@
         <a:font script="Tfng" typeface="Ebrima"/>
       </a:majorFont>
       <a:minorFont>
-        <a:latin typeface="Calibri" panose="020F0502020204030204"/>
+        <a:latin typeface="Calibri"/>
         <a:ea typeface=""/>
         <a:cs typeface=""/>
         <a:font script="Jpan" typeface="游ゴシック"/>
@@ -9315,7 +9305,7 @@
   <a:extraClrSchemeLst/>
   <a:extLst>
     <a:ext uri="{05A4C25C-085E-4340-85A3-A5531E510DB2}">
-      <thm15:themeFamily xmlns:thm15="http://schemas.microsoft.com/office/thememl/2012/main" name="Office Theme" id="{62F939B6-93AF-4DB8-9C6B-D6C7DFDC589F}" vid="{4A3C46E8-61CC-4603-A589-7422A47A8E4A}"/>
+      <thm15:themeFamily xmlns:thm15="http://schemas.microsoft.com/office/thememl/2012/main" xmlns="" name="Office Theme" id="{62F939B6-93AF-4DB8-9C6B-D6C7DFDC589F}" vid="{4A3C46E8-61CC-4603-A589-7422A47A8E4A}"/>
     </a:ext>
   </a:extLst>
 </a:theme>

</xml_diff>

<commit_message>
Created rough draft of customized animation
</commit_message>
<xml_diff>
--- a/Gov_templates/USB_whitelist.pptx
+++ b/Gov_templates/USB_whitelist.pptx
@@ -8280,7 +8280,27 @@
                 <a:latin typeface="Calibri"/>
                 <a:ea typeface="Calibri"/>
               </a:rPr>
-              <a:t>Our solution provides a facility to protect an authorized computer from an unauthorized USB storage devices in online/offline mode efficiently  using combination of both bloom filter and blockchain.</a:t>
+              <a:t>Our solution provides a facility to protect an authorized computer from an unauthorized USB storage devices in online/offline mode efficiently  using combination of </a:t>
+            </a:r>
+            <a:r>
+              <a:rPr lang="en-IN" sz="1600" b="0" strike="noStrike" spc="-1" dirty="0" smtClean="0">
+                <a:solidFill>
+                  <a:srgbClr val="000000"/>
+                </a:solidFill>
+                <a:latin typeface="Calibri"/>
+                <a:ea typeface="Calibri"/>
+              </a:rPr>
+              <a:t>both, probabilistic  database and </a:t>
+            </a:r>
+            <a:r>
+              <a:rPr lang="en-IN" sz="1600" b="0" strike="noStrike" spc="-1" dirty="0">
+                <a:solidFill>
+                  <a:srgbClr val="000000"/>
+                </a:solidFill>
+                <a:latin typeface="Calibri"/>
+                <a:ea typeface="Calibri"/>
+              </a:rPr>
+              <a:t>blockchain.</a:t>
             </a:r>
             <a:endParaRPr lang="en-IN" sz="1600" b="0" strike="noStrike" spc="-1" dirty="0">
               <a:solidFill>
@@ -9305,7 +9325,7 @@
   <a:extraClrSchemeLst/>
   <a:extLst>
     <a:ext uri="{05A4C25C-085E-4340-85A3-A5531E510DB2}">
-      <thm15:themeFamily xmlns:thm15="http://schemas.microsoft.com/office/thememl/2012/main" xmlns="" name="Office Theme" id="{62F939B6-93AF-4DB8-9C6B-D6C7DFDC589F}" vid="{4A3C46E8-61CC-4603-A589-7422A47A8E4A}"/>
+      <thm15:themeFamily xmlns="" xmlns:thm15="http://schemas.microsoft.com/office/thememl/2012/main" name="Office Theme" id="{62F939B6-93AF-4DB8-9C6B-D6C7DFDC589F}" vid="{4A3C46E8-61CC-4603-A589-7422A47A8E4A}"/>
     </a:ext>
   </a:extLst>
 </a:theme>

</xml_diff>